<commit_message>
figure updated and references added in bib file
</commit_message>
<xml_diff>
--- a/analyses/figures/figures_simulation.pptx
+++ b/analyses/figures/figures_simulation.pptx
@@ -4,8 +4,13 @@
   <p:sldMasterIdLst>
     <p:sldMasterId id="2147483648" r:id="rId1"/>
   </p:sldMasterIdLst>
+  <p:notesMasterIdLst>
+    <p:notesMasterId r:id="rId5"/>
+  </p:notesMasterIdLst>
   <p:sldIdLst>
     <p:sldId id="256" r:id="rId2"/>
+    <p:sldId id="258" r:id="rId3"/>
+    <p:sldId id="260" r:id="rId4"/>
   </p:sldIdLst>
   <p:sldSz cx="12192000" cy="6858000"/>
   <p:notesSz cx="6858000" cy="9144000"/>
@@ -119,8 +124,539 @@
         </p15:guide>
       </p15:sldGuideLst>
     </p:ext>
+    <p:ext uri="{2D200454-40CA-4A62-9FC3-DE9A4176ACB9}">
+      <p15:notesGuideLst xmlns:p15="http://schemas.microsoft.com/office/powerpoint/2012/main">
+        <p15:guide id="1" orient="horz" pos="2880" userDrawn="1">
+          <p15:clr>
+            <a:srgbClr val="A4A3A4"/>
+          </p15:clr>
+        </p15:guide>
+        <p15:guide id="2" pos="2160" userDrawn="1">
+          <p15:clr>
+            <a:srgbClr val="A4A3A4"/>
+          </p15:clr>
+        </p15:guide>
+      </p15:notesGuideLst>
+    </p:ext>
   </p:extLst>
 </p:presentation>
+</file>
+
+<file path=ppt/notesMasters/notesMaster1.xml><?xml version="1.0" encoding="utf-8"?>
+<p:notesMaster xmlns:a="http://schemas.openxmlformats.org/drawingml/2006/main" xmlns:r="http://schemas.openxmlformats.org/officeDocument/2006/relationships" xmlns:p="http://schemas.openxmlformats.org/presentationml/2006/main">
+  <p:cSld>
+    <p:bg>
+      <p:bgRef idx="1001">
+        <a:schemeClr val="bg1"/>
+      </p:bgRef>
+    </p:bg>
+    <p:spTree>
+      <p:nvGrpSpPr>
+        <p:cNvPr id="1" name=""/>
+        <p:cNvGrpSpPr/>
+        <p:nvPr/>
+      </p:nvGrpSpPr>
+      <p:grpSpPr>
+        <a:xfrm>
+          <a:off x="0" y="0"/>
+          <a:ext cx="0" cy="0"/>
+          <a:chOff x="0" y="0"/>
+          <a:chExt cx="0" cy="0"/>
+        </a:xfrm>
+      </p:grpSpPr>
+      <p:sp>
+        <p:nvSpPr>
+          <p:cNvPr id="2" name="Header Placeholder 1"/>
+          <p:cNvSpPr>
+            <a:spLocks noGrp="1"/>
+          </p:cNvSpPr>
+          <p:nvPr>
+            <p:ph type="hdr" sz="quarter"/>
+          </p:nvPr>
+        </p:nvSpPr>
+        <p:spPr>
+          <a:xfrm>
+            <a:off x="0" y="0"/>
+            <a:ext cx="2971800" cy="458788"/>
+          </a:xfrm>
+          <a:prstGeom prst="rect">
+            <a:avLst/>
+          </a:prstGeom>
+        </p:spPr>
+        <p:txBody>
+          <a:bodyPr vert="horz" lIns="91440" tIns="45720" rIns="91440" bIns="45720" rtlCol="0"/>
+          <a:lstStyle>
+            <a:lvl1pPr algn="l">
+              <a:defRPr sz="1200"/>
+            </a:lvl1pPr>
+          </a:lstStyle>
+          <a:p>
+            <a:endParaRPr lang="en-US"/>
+          </a:p>
+        </p:txBody>
+      </p:sp>
+      <p:sp>
+        <p:nvSpPr>
+          <p:cNvPr id="3" name="Date Placeholder 2"/>
+          <p:cNvSpPr>
+            <a:spLocks noGrp="1"/>
+          </p:cNvSpPr>
+          <p:nvPr>
+            <p:ph type="dt" idx="1"/>
+          </p:nvPr>
+        </p:nvSpPr>
+        <p:spPr>
+          <a:xfrm>
+            <a:off x="3884613" y="0"/>
+            <a:ext cx="2971800" cy="458788"/>
+          </a:xfrm>
+          <a:prstGeom prst="rect">
+            <a:avLst/>
+          </a:prstGeom>
+        </p:spPr>
+        <p:txBody>
+          <a:bodyPr vert="horz" lIns="91440" tIns="45720" rIns="91440" bIns="45720" rtlCol="0"/>
+          <a:lstStyle>
+            <a:lvl1pPr algn="r">
+              <a:defRPr sz="1200"/>
+            </a:lvl1pPr>
+          </a:lstStyle>
+          <a:p>
+            <a:fld id="{2F135446-6881-F24D-BECD-617636E10D62}" type="datetimeFigureOut">
+              <a:rPr lang="en-US" smtClean="0"/>
+              <a:t>6/12/24</a:t>
+            </a:fld>
+            <a:endParaRPr lang="en-US"/>
+          </a:p>
+        </p:txBody>
+      </p:sp>
+      <p:sp>
+        <p:nvSpPr>
+          <p:cNvPr id="4" name="Slide Image Placeholder 3"/>
+          <p:cNvSpPr>
+            <a:spLocks noGrp="1" noRot="1" noChangeAspect="1"/>
+          </p:cNvSpPr>
+          <p:nvPr>
+            <p:ph type="sldImg" idx="2"/>
+          </p:nvPr>
+        </p:nvSpPr>
+        <p:spPr>
+          <a:xfrm>
+            <a:off x="685800" y="1143000"/>
+            <a:ext cx="5486400" cy="3086100"/>
+          </a:xfrm>
+          <a:prstGeom prst="rect">
+            <a:avLst/>
+          </a:prstGeom>
+          <a:noFill/>
+          <a:ln w="12700">
+            <a:solidFill>
+              <a:prstClr val="black"/>
+            </a:solidFill>
+          </a:ln>
+        </p:spPr>
+        <p:txBody>
+          <a:bodyPr vert="horz" lIns="91440" tIns="45720" rIns="91440" bIns="45720" rtlCol="0" anchor="ctr"/>
+          <a:lstStyle/>
+          <a:p>
+            <a:endParaRPr lang="en-US"/>
+          </a:p>
+        </p:txBody>
+      </p:sp>
+      <p:sp>
+        <p:nvSpPr>
+          <p:cNvPr id="5" name="Notes Placeholder 4"/>
+          <p:cNvSpPr>
+            <a:spLocks noGrp="1"/>
+          </p:cNvSpPr>
+          <p:nvPr>
+            <p:ph type="body" sz="quarter" idx="3"/>
+          </p:nvPr>
+        </p:nvSpPr>
+        <p:spPr>
+          <a:xfrm>
+            <a:off x="685800" y="4400550"/>
+            <a:ext cx="5486400" cy="3600450"/>
+          </a:xfrm>
+          <a:prstGeom prst="rect">
+            <a:avLst/>
+          </a:prstGeom>
+        </p:spPr>
+        <p:txBody>
+          <a:bodyPr vert="horz" lIns="91440" tIns="45720" rIns="91440" bIns="45720" rtlCol="0"/>
+          <a:lstStyle/>
+          <a:p>
+            <a:pPr lvl="0"/>
+            <a:r>
+              <a:rPr lang="en-US"/>
+              <a:t>Click to edit Master text styles</a:t>
+            </a:r>
+          </a:p>
+          <a:p>
+            <a:pPr lvl="1"/>
+            <a:r>
+              <a:rPr lang="en-US"/>
+              <a:t>Second level</a:t>
+            </a:r>
+          </a:p>
+          <a:p>
+            <a:pPr lvl="2"/>
+            <a:r>
+              <a:rPr lang="en-US"/>
+              <a:t>Third level</a:t>
+            </a:r>
+          </a:p>
+          <a:p>
+            <a:pPr lvl="3"/>
+            <a:r>
+              <a:rPr lang="en-US"/>
+              <a:t>Fourth level</a:t>
+            </a:r>
+          </a:p>
+          <a:p>
+            <a:pPr lvl="4"/>
+            <a:r>
+              <a:rPr lang="en-US"/>
+              <a:t>Fifth level</a:t>
+            </a:r>
+          </a:p>
+        </p:txBody>
+      </p:sp>
+      <p:sp>
+        <p:nvSpPr>
+          <p:cNvPr id="6" name="Footer Placeholder 5"/>
+          <p:cNvSpPr>
+            <a:spLocks noGrp="1"/>
+          </p:cNvSpPr>
+          <p:nvPr>
+            <p:ph type="ftr" sz="quarter" idx="4"/>
+          </p:nvPr>
+        </p:nvSpPr>
+        <p:spPr>
+          <a:xfrm>
+            <a:off x="0" y="8685213"/>
+            <a:ext cx="2971800" cy="458787"/>
+          </a:xfrm>
+          <a:prstGeom prst="rect">
+            <a:avLst/>
+          </a:prstGeom>
+        </p:spPr>
+        <p:txBody>
+          <a:bodyPr vert="horz" lIns="91440" tIns="45720" rIns="91440" bIns="45720" rtlCol="0" anchor="b"/>
+          <a:lstStyle>
+            <a:lvl1pPr algn="l">
+              <a:defRPr sz="1200"/>
+            </a:lvl1pPr>
+          </a:lstStyle>
+          <a:p>
+            <a:endParaRPr lang="en-US"/>
+          </a:p>
+        </p:txBody>
+      </p:sp>
+      <p:sp>
+        <p:nvSpPr>
+          <p:cNvPr id="7" name="Slide Number Placeholder 6"/>
+          <p:cNvSpPr>
+            <a:spLocks noGrp="1"/>
+          </p:cNvSpPr>
+          <p:nvPr>
+            <p:ph type="sldNum" sz="quarter" idx="5"/>
+          </p:nvPr>
+        </p:nvSpPr>
+        <p:spPr>
+          <a:xfrm>
+            <a:off x="3884613" y="8685213"/>
+            <a:ext cx="2971800" cy="458787"/>
+          </a:xfrm>
+          <a:prstGeom prst="rect">
+            <a:avLst/>
+          </a:prstGeom>
+        </p:spPr>
+        <p:txBody>
+          <a:bodyPr vert="horz" lIns="91440" tIns="45720" rIns="91440" bIns="45720" rtlCol="0" anchor="b"/>
+          <a:lstStyle>
+            <a:lvl1pPr algn="r">
+              <a:defRPr sz="1200"/>
+            </a:lvl1pPr>
+          </a:lstStyle>
+          <a:p>
+            <a:fld id="{7A8E2C04-F9EB-A24A-A9A4-BA7CC3377982}" type="slidenum">
+              <a:rPr lang="en-US" smtClean="0"/>
+              <a:t>‹#›</a:t>
+            </a:fld>
+            <a:endParaRPr lang="en-US"/>
+          </a:p>
+        </p:txBody>
+      </p:sp>
+    </p:spTree>
+    <p:extLst>
+      <p:ext uri="{BB962C8B-B14F-4D97-AF65-F5344CB8AC3E}">
+        <p14:creationId xmlns:p14="http://schemas.microsoft.com/office/powerpoint/2010/main" val="4179121384"/>
+      </p:ext>
+    </p:extLst>
+  </p:cSld>
+  <p:clrMap bg1="lt1" tx1="dk1" bg2="lt2" tx2="dk2" accent1="accent1" accent2="accent2" accent3="accent3" accent4="accent4" accent5="accent5" accent6="accent6" hlink="hlink" folHlink="folHlink"/>
+  <p:notesStyle>
+    <a:lvl1pPr marL="0" algn="l" defTabSz="914400" rtl="0" eaLnBrk="1" latinLnBrk="0" hangingPunct="1">
+      <a:defRPr sz="1200" kern="1200">
+        <a:solidFill>
+          <a:schemeClr val="tx1"/>
+        </a:solidFill>
+        <a:latin typeface="+mn-lt"/>
+        <a:ea typeface="+mn-ea"/>
+        <a:cs typeface="+mn-cs"/>
+      </a:defRPr>
+    </a:lvl1pPr>
+    <a:lvl2pPr marL="457200" algn="l" defTabSz="914400" rtl="0" eaLnBrk="1" latinLnBrk="0" hangingPunct="1">
+      <a:defRPr sz="1200" kern="1200">
+        <a:solidFill>
+          <a:schemeClr val="tx1"/>
+        </a:solidFill>
+        <a:latin typeface="+mn-lt"/>
+        <a:ea typeface="+mn-ea"/>
+        <a:cs typeface="+mn-cs"/>
+      </a:defRPr>
+    </a:lvl2pPr>
+    <a:lvl3pPr marL="914400" algn="l" defTabSz="914400" rtl="0" eaLnBrk="1" latinLnBrk="0" hangingPunct="1">
+      <a:defRPr sz="1200" kern="1200">
+        <a:solidFill>
+          <a:schemeClr val="tx1"/>
+        </a:solidFill>
+        <a:latin typeface="+mn-lt"/>
+        <a:ea typeface="+mn-ea"/>
+        <a:cs typeface="+mn-cs"/>
+      </a:defRPr>
+    </a:lvl3pPr>
+    <a:lvl4pPr marL="1371600" algn="l" defTabSz="914400" rtl="0" eaLnBrk="1" latinLnBrk="0" hangingPunct="1">
+      <a:defRPr sz="1200" kern="1200">
+        <a:solidFill>
+          <a:schemeClr val="tx1"/>
+        </a:solidFill>
+        <a:latin typeface="+mn-lt"/>
+        <a:ea typeface="+mn-ea"/>
+        <a:cs typeface="+mn-cs"/>
+      </a:defRPr>
+    </a:lvl4pPr>
+    <a:lvl5pPr marL="1828800" algn="l" defTabSz="914400" rtl="0" eaLnBrk="1" latinLnBrk="0" hangingPunct="1">
+      <a:defRPr sz="1200" kern="1200">
+        <a:solidFill>
+          <a:schemeClr val="tx1"/>
+        </a:solidFill>
+        <a:latin typeface="+mn-lt"/>
+        <a:ea typeface="+mn-ea"/>
+        <a:cs typeface="+mn-cs"/>
+      </a:defRPr>
+    </a:lvl5pPr>
+    <a:lvl6pPr marL="2286000" algn="l" defTabSz="914400" rtl="0" eaLnBrk="1" latinLnBrk="0" hangingPunct="1">
+      <a:defRPr sz="1200" kern="1200">
+        <a:solidFill>
+          <a:schemeClr val="tx1"/>
+        </a:solidFill>
+        <a:latin typeface="+mn-lt"/>
+        <a:ea typeface="+mn-ea"/>
+        <a:cs typeface="+mn-cs"/>
+      </a:defRPr>
+    </a:lvl6pPr>
+    <a:lvl7pPr marL="2743200" algn="l" defTabSz="914400" rtl="0" eaLnBrk="1" latinLnBrk="0" hangingPunct="1">
+      <a:defRPr sz="1200" kern="1200">
+        <a:solidFill>
+          <a:schemeClr val="tx1"/>
+        </a:solidFill>
+        <a:latin typeface="+mn-lt"/>
+        <a:ea typeface="+mn-ea"/>
+        <a:cs typeface="+mn-cs"/>
+      </a:defRPr>
+    </a:lvl7pPr>
+    <a:lvl8pPr marL="3200400" algn="l" defTabSz="914400" rtl="0" eaLnBrk="1" latinLnBrk="0" hangingPunct="1">
+      <a:defRPr sz="1200" kern="1200">
+        <a:solidFill>
+          <a:schemeClr val="tx1"/>
+        </a:solidFill>
+        <a:latin typeface="+mn-lt"/>
+        <a:ea typeface="+mn-ea"/>
+        <a:cs typeface="+mn-cs"/>
+      </a:defRPr>
+    </a:lvl8pPr>
+    <a:lvl9pPr marL="3657600" algn="l" defTabSz="914400" rtl="0" eaLnBrk="1" latinLnBrk="0" hangingPunct="1">
+      <a:defRPr sz="1200" kern="1200">
+        <a:solidFill>
+          <a:schemeClr val="tx1"/>
+        </a:solidFill>
+        <a:latin typeface="+mn-lt"/>
+        <a:ea typeface="+mn-ea"/>
+        <a:cs typeface="+mn-cs"/>
+      </a:defRPr>
+    </a:lvl9pPr>
+  </p:notesStyle>
+</p:notesMaster>
+</file>
+
+<file path=ppt/notesSlides/notesSlide1.xml><?xml version="1.0" encoding="utf-8"?>
+<p:notes xmlns:a="http://schemas.openxmlformats.org/drawingml/2006/main" xmlns:r="http://schemas.openxmlformats.org/officeDocument/2006/relationships" xmlns:p="http://schemas.openxmlformats.org/presentationml/2006/main">
+  <p:cSld>
+    <p:spTree>
+      <p:nvGrpSpPr>
+        <p:cNvPr id="1" name=""/>
+        <p:cNvGrpSpPr/>
+        <p:nvPr/>
+      </p:nvGrpSpPr>
+      <p:grpSpPr>
+        <a:xfrm>
+          <a:off x="0" y="0"/>
+          <a:ext cx="0" cy="0"/>
+          <a:chOff x="0" y="0"/>
+          <a:chExt cx="0" cy="0"/>
+        </a:xfrm>
+      </p:grpSpPr>
+      <p:sp>
+        <p:nvSpPr>
+          <p:cNvPr id="2" name="Slide Image Placeholder 1"/>
+          <p:cNvSpPr>
+            <a:spLocks noGrp="1" noRot="1" noChangeAspect="1"/>
+          </p:cNvSpPr>
+          <p:nvPr>
+            <p:ph type="sldImg"/>
+          </p:nvPr>
+        </p:nvSpPr>
+        <p:spPr/>
+      </p:sp>
+      <p:sp>
+        <p:nvSpPr>
+          <p:cNvPr id="3" name="Notes Placeholder 2"/>
+          <p:cNvSpPr>
+            <a:spLocks noGrp="1"/>
+          </p:cNvSpPr>
+          <p:nvPr>
+            <p:ph type="body" idx="1"/>
+          </p:nvPr>
+        </p:nvSpPr>
+        <p:spPr/>
+        <p:txBody>
+          <a:bodyPr/>
+          <a:lstStyle/>
+          <a:p>
+            <a:endParaRPr lang="en-US"/>
+          </a:p>
+        </p:txBody>
+      </p:sp>
+      <p:sp>
+        <p:nvSpPr>
+          <p:cNvPr id="4" name="Slide Number Placeholder 3"/>
+          <p:cNvSpPr>
+            <a:spLocks noGrp="1"/>
+          </p:cNvSpPr>
+          <p:nvPr>
+            <p:ph type="sldNum" sz="quarter" idx="5"/>
+          </p:nvPr>
+        </p:nvSpPr>
+        <p:spPr/>
+        <p:txBody>
+          <a:bodyPr/>
+          <a:lstStyle/>
+          <a:p>
+            <a:fld id="{7A8E2C04-F9EB-A24A-A9A4-BA7CC3377982}" type="slidenum">
+              <a:rPr lang="en-US" smtClean="0"/>
+              <a:t>1</a:t>
+            </a:fld>
+            <a:endParaRPr lang="en-US"/>
+          </a:p>
+        </p:txBody>
+      </p:sp>
+    </p:spTree>
+    <p:extLst>
+      <p:ext uri="{BB962C8B-B14F-4D97-AF65-F5344CB8AC3E}">
+        <p14:creationId xmlns:p14="http://schemas.microsoft.com/office/powerpoint/2010/main" val="356222971"/>
+      </p:ext>
+    </p:extLst>
+  </p:cSld>
+  <p:clrMapOvr>
+    <a:masterClrMapping/>
+  </p:clrMapOvr>
+</p:notes>
+</file>
+
+<file path=ppt/notesSlides/notesSlide2.xml><?xml version="1.0" encoding="utf-8"?>
+<p:notes xmlns:a="http://schemas.openxmlformats.org/drawingml/2006/main" xmlns:r="http://schemas.openxmlformats.org/officeDocument/2006/relationships" xmlns:p="http://schemas.openxmlformats.org/presentationml/2006/main">
+  <p:cSld>
+    <p:spTree>
+      <p:nvGrpSpPr>
+        <p:cNvPr id="1" name=""/>
+        <p:cNvGrpSpPr/>
+        <p:nvPr/>
+      </p:nvGrpSpPr>
+      <p:grpSpPr>
+        <a:xfrm>
+          <a:off x="0" y="0"/>
+          <a:ext cx="0" cy="0"/>
+          <a:chOff x="0" y="0"/>
+          <a:chExt cx="0" cy="0"/>
+        </a:xfrm>
+      </p:grpSpPr>
+      <p:sp>
+        <p:nvSpPr>
+          <p:cNvPr id="2" name="Slide Image Placeholder 1"/>
+          <p:cNvSpPr>
+            <a:spLocks noGrp="1" noRot="1" noChangeAspect="1"/>
+          </p:cNvSpPr>
+          <p:nvPr>
+            <p:ph type="sldImg"/>
+          </p:nvPr>
+        </p:nvSpPr>
+        <p:spPr/>
+      </p:sp>
+      <p:sp>
+        <p:nvSpPr>
+          <p:cNvPr id="3" name="Notes Placeholder 2"/>
+          <p:cNvSpPr>
+            <a:spLocks noGrp="1"/>
+          </p:cNvSpPr>
+          <p:nvPr>
+            <p:ph type="body" idx="1"/>
+          </p:nvPr>
+        </p:nvSpPr>
+        <p:spPr/>
+        <p:txBody>
+          <a:bodyPr/>
+          <a:lstStyle/>
+          <a:p>
+            <a:endParaRPr lang="en-US"/>
+          </a:p>
+        </p:txBody>
+      </p:sp>
+      <p:sp>
+        <p:nvSpPr>
+          <p:cNvPr id="4" name="Slide Number Placeholder 3"/>
+          <p:cNvSpPr>
+            <a:spLocks noGrp="1"/>
+          </p:cNvSpPr>
+          <p:nvPr>
+            <p:ph type="sldNum" sz="quarter" idx="5"/>
+          </p:nvPr>
+        </p:nvSpPr>
+        <p:spPr/>
+        <p:txBody>
+          <a:bodyPr/>
+          <a:lstStyle/>
+          <a:p>
+            <a:fld id="{7A8E2C04-F9EB-A24A-A9A4-BA7CC3377982}" type="slidenum">
+              <a:rPr lang="en-US" smtClean="0"/>
+              <a:t>2</a:t>
+            </a:fld>
+            <a:endParaRPr lang="en-US"/>
+          </a:p>
+        </p:txBody>
+      </p:sp>
+    </p:spTree>
+    <p:extLst>
+      <p:ext uri="{BB962C8B-B14F-4D97-AF65-F5344CB8AC3E}">
+        <p14:creationId xmlns:p14="http://schemas.microsoft.com/office/powerpoint/2010/main" val="3897042590"/>
+      </p:ext>
+    </p:extLst>
+  </p:cSld>
+  <p:clrMapOvr>
+    <a:masterClrMapping/>
+  </p:clrMapOvr>
+</p:notes>
 </file>
 
 <file path=ppt/slideLayouts/slideLayout1.xml><?xml version="1.0" encoding="utf-8"?>
@@ -270,7 +806,7 @@
           <a:p>
             <a:fld id="{7A0C4CA1-6CF3-4D46-A80D-8B75430028DB}" type="datetimeFigureOut">
               <a:rPr lang="en-US" smtClean="0"/>
-              <a:t>6/6/24</a:t>
+              <a:t>6/12/24</a:t>
             </a:fld>
             <a:endParaRPr lang="en-US"/>
           </a:p>
@@ -468,7 +1004,7 @@
           <a:p>
             <a:fld id="{7A0C4CA1-6CF3-4D46-A80D-8B75430028DB}" type="datetimeFigureOut">
               <a:rPr lang="en-US" smtClean="0"/>
-              <a:t>6/6/24</a:t>
+              <a:t>6/12/24</a:t>
             </a:fld>
             <a:endParaRPr lang="en-US"/>
           </a:p>
@@ -676,7 +1212,7 @@
           <a:p>
             <a:fld id="{7A0C4CA1-6CF3-4D46-A80D-8B75430028DB}" type="datetimeFigureOut">
               <a:rPr lang="en-US" smtClean="0"/>
-              <a:t>6/6/24</a:t>
+              <a:t>6/12/24</a:t>
             </a:fld>
             <a:endParaRPr lang="en-US"/>
           </a:p>
@@ -874,7 +1410,7 @@
           <a:p>
             <a:fld id="{7A0C4CA1-6CF3-4D46-A80D-8B75430028DB}" type="datetimeFigureOut">
               <a:rPr lang="en-US" smtClean="0"/>
-              <a:t>6/6/24</a:t>
+              <a:t>6/12/24</a:t>
             </a:fld>
             <a:endParaRPr lang="en-US"/>
           </a:p>
@@ -1149,7 +1685,7 @@
           <a:p>
             <a:fld id="{7A0C4CA1-6CF3-4D46-A80D-8B75430028DB}" type="datetimeFigureOut">
               <a:rPr lang="en-US" smtClean="0"/>
-              <a:t>6/6/24</a:t>
+              <a:t>6/12/24</a:t>
             </a:fld>
             <a:endParaRPr lang="en-US"/>
           </a:p>
@@ -1414,7 +1950,7 @@
           <a:p>
             <a:fld id="{7A0C4CA1-6CF3-4D46-A80D-8B75430028DB}" type="datetimeFigureOut">
               <a:rPr lang="en-US" smtClean="0"/>
-              <a:t>6/6/24</a:t>
+              <a:t>6/12/24</a:t>
             </a:fld>
             <a:endParaRPr lang="en-US"/>
           </a:p>
@@ -1826,7 +2362,7 @@
           <a:p>
             <a:fld id="{7A0C4CA1-6CF3-4D46-A80D-8B75430028DB}" type="datetimeFigureOut">
               <a:rPr lang="en-US" smtClean="0"/>
-              <a:t>6/6/24</a:t>
+              <a:t>6/12/24</a:t>
             </a:fld>
             <a:endParaRPr lang="en-US"/>
           </a:p>
@@ -1967,7 +2503,7 @@
           <a:p>
             <a:fld id="{7A0C4CA1-6CF3-4D46-A80D-8B75430028DB}" type="datetimeFigureOut">
               <a:rPr lang="en-US" smtClean="0"/>
-              <a:t>6/6/24</a:t>
+              <a:t>6/12/24</a:t>
             </a:fld>
             <a:endParaRPr lang="en-US"/>
           </a:p>
@@ -2080,7 +2616,7 @@
           <a:p>
             <a:fld id="{7A0C4CA1-6CF3-4D46-A80D-8B75430028DB}" type="datetimeFigureOut">
               <a:rPr lang="en-US" smtClean="0"/>
-              <a:t>6/6/24</a:t>
+              <a:t>6/12/24</a:t>
             </a:fld>
             <a:endParaRPr lang="en-US"/>
           </a:p>
@@ -2391,7 +2927,7 @@
           <a:p>
             <a:fld id="{7A0C4CA1-6CF3-4D46-A80D-8B75430028DB}" type="datetimeFigureOut">
               <a:rPr lang="en-US" smtClean="0"/>
-              <a:t>6/6/24</a:t>
+              <a:t>6/12/24</a:t>
             </a:fld>
             <a:endParaRPr lang="en-US"/>
           </a:p>
@@ -2679,7 +3215,7 @@
           <a:p>
             <a:fld id="{7A0C4CA1-6CF3-4D46-A80D-8B75430028DB}" type="datetimeFigureOut">
               <a:rPr lang="en-US" smtClean="0"/>
-              <a:t>6/6/24</a:t>
+              <a:t>6/12/24</a:t>
             </a:fld>
             <a:endParaRPr lang="en-US"/>
           </a:p>
@@ -2920,7 +3456,7 @@
           <a:p>
             <a:fld id="{7A0C4CA1-6CF3-4D46-A80D-8B75430028DB}" type="datetimeFigureOut">
               <a:rPr lang="en-US" smtClean="0"/>
-              <a:t>6/6/24</a:t>
+              <a:t>6/12/24</a:t>
             </a:fld>
             <a:endParaRPr lang="en-US"/>
           </a:p>
@@ -4859,10 +5395,3546 @@
           </p:style>
         </p:cxnSp>
       </p:grpSp>
+      <p:grpSp>
+        <p:nvGrpSpPr>
+          <p:cNvPr id="3" name="Group 2">
+            <a:extLst>
+              <a:ext uri="{FF2B5EF4-FFF2-40B4-BE49-F238E27FC236}">
+                <a16:creationId xmlns:a16="http://schemas.microsoft.com/office/drawing/2014/main" id="{8F487548-E97D-BE2E-398D-7898A118B6B7}"/>
+              </a:ext>
+            </a:extLst>
+          </p:cNvPr>
+          <p:cNvGrpSpPr/>
+          <p:nvPr/>
+        </p:nvGrpSpPr>
+        <p:grpSpPr>
+          <a:xfrm>
+            <a:off x="0" y="0"/>
+            <a:ext cx="11651136" cy="6858000"/>
+            <a:chOff x="-1" y="0"/>
+            <a:chExt cx="11651136" cy="6858000"/>
+          </a:xfrm>
+        </p:grpSpPr>
+        <p:sp>
+          <p:nvSpPr>
+            <p:cNvPr id="4" name="Rectangle 3">
+              <a:extLst>
+                <a:ext uri="{FF2B5EF4-FFF2-40B4-BE49-F238E27FC236}">
+                  <a16:creationId xmlns:a16="http://schemas.microsoft.com/office/drawing/2014/main" id="{8E3FC73C-6A0D-8995-B4C5-C44A82D7E6B8}"/>
+                </a:ext>
+              </a:extLst>
+            </p:cNvPr>
+            <p:cNvSpPr/>
+            <p:nvPr/>
+          </p:nvSpPr>
+          <p:spPr>
+            <a:xfrm>
+              <a:off x="5408765" y="1458825"/>
+              <a:ext cx="3611586" cy="4890042"/>
+            </a:xfrm>
+            <a:prstGeom prst="rect">
+              <a:avLst/>
+            </a:prstGeom>
+            <a:solidFill>
+              <a:schemeClr val="accent6">
+                <a:lumMod val="40000"/>
+                <a:lumOff val="60000"/>
+              </a:schemeClr>
+            </a:solidFill>
+          </p:spPr>
+          <p:style>
+            <a:lnRef idx="2">
+              <a:schemeClr val="accent1">
+                <a:shade val="15000"/>
+              </a:schemeClr>
+            </a:lnRef>
+            <a:fillRef idx="1">
+              <a:schemeClr val="accent1"/>
+            </a:fillRef>
+            <a:effectRef idx="0">
+              <a:schemeClr val="accent1"/>
+            </a:effectRef>
+            <a:fontRef idx="minor">
+              <a:schemeClr val="lt1"/>
+            </a:fontRef>
+          </p:style>
+          <p:txBody>
+            <a:bodyPr rtlCol="0" anchor="ctr"/>
+            <a:lstStyle/>
+            <a:p>
+              <a:pPr algn="ctr"/>
+              <a:endParaRPr lang="en-US"/>
+            </a:p>
+          </p:txBody>
+        </p:sp>
+        <p:sp>
+          <p:nvSpPr>
+            <p:cNvPr id="5" name="Rectangle 4">
+              <a:extLst>
+                <a:ext uri="{FF2B5EF4-FFF2-40B4-BE49-F238E27FC236}">
+                  <a16:creationId xmlns:a16="http://schemas.microsoft.com/office/drawing/2014/main" id="{13E2A399-3FBD-6DB2-9156-5949ED2CFDA8}"/>
+                </a:ext>
+              </a:extLst>
+            </p:cNvPr>
+            <p:cNvSpPr/>
+            <p:nvPr/>
+          </p:nvSpPr>
+          <p:spPr>
+            <a:xfrm>
+              <a:off x="-1" y="0"/>
+              <a:ext cx="2416829" cy="6858000"/>
+            </a:xfrm>
+            <a:prstGeom prst="rect">
+              <a:avLst/>
+            </a:prstGeom>
+            <a:solidFill>
+              <a:schemeClr val="accent1">
+                <a:lumMod val="40000"/>
+                <a:lumOff val="60000"/>
+                <a:alpha val="65000"/>
+              </a:schemeClr>
+            </a:solidFill>
+          </p:spPr>
+          <p:style>
+            <a:lnRef idx="2">
+              <a:schemeClr val="accent1">
+                <a:shade val="15000"/>
+              </a:schemeClr>
+            </a:lnRef>
+            <a:fillRef idx="1">
+              <a:schemeClr val="accent1"/>
+            </a:fillRef>
+            <a:effectRef idx="0">
+              <a:schemeClr val="accent1"/>
+            </a:effectRef>
+            <a:fontRef idx="minor">
+              <a:schemeClr val="lt1"/>
+            </a:fontRef>
+          </p:style>
+          <p:txBody>
+            <a:bodyPr rtlCol="0" anchor="ctr"/>
+            <a:lstStyle/>
+            <a:p>
+              <a:pPr algn="ctr"/>
+              <a:endParaRPr lang="en-US"/>
+            </a:p>
+          </p:txBody>
+        </p:sp>
+        <p:sp>
+          <p:nvSpPr>
+            <p:cNvPr id="6" name="TextBox 5">
+              <a:extLst>
+                <a:ext uri="{FF2B5EF4-FFF2-40B4-BE49-F238E27FC236}">
+                  <a16:creationId xmlns:a16="http://schemas.microsoft.com/office/drawing/2014/main" id="{511B16B7-D41C-E66E-199E-86E13EC38DF0}"/>
+                </a:ext>
+              </a:extLst>
+            </p:cNvPr>
+            <p:cNvSpPr txBox="1"/>
+            <p:nvPr/>
+          </p:nvSpPr>
+          <p:spPr>
+            <a:xfrm>
+              <a:off x="5942448" y="1825834"/>
+              <a:ext cx="2924014" cy="523220"/>
+            </a:xfrm>
+            <a:prstGeom prst="rect">
+              <a:avLst/>
+            </a:prstGeom>
+            <a:noFill/>
+            <a:ln>
+              <a:solidFill>
+                <a:schemeClr val="tx1"/>
+              </a:solidFill>
+            </a:ln>
+          </p:spPr>
+          <p:txBody>
+            <a:bodyPr wrap="square" rtlCol="0">
+              <a:spAutoFit/>
+            </a:bodyPr>
+            <a:lstStyle/>
+            <a:p>
+              <a:r>
+                <a:rPr lang="en-US" sz="1400" dirty="0"/>
+                <a:t>Mechanistic model of how we think the world works</a:t>
+              </a:r>
+            </a:p>
+          </p:txBody>
+        </p:sp>
+        <p:cxnSp>
+          <p:nvCxnSpPr>
+            <p:cNvPr id="8" name="Straight Arrow Connector 7">
+              <a:extLst>
+                <a:ext uri="{FF2B5EF4-FFF2-40B4-BE49-F238E27FC236}">
+                  <a16:creationId xmlns:a16="http://schemas.microsoft.com/office/drawing/2014/main" id="{6B9ABE94-9A51-3C66-0AD7-71A878CF7494}"/>
+                </a:ext>
+              </a:extLst>
+            </p:cNvPr>
+            <p:cNvCxnSpPr>
+              <a:cxnSpLocks/>
+            </p:cNvCxnSpPr>
+            <p:nvPr/>
+          </p:nvCxnSpPr>
+          <p:spPr>
+            <a:xfrm>
+              <a:off x="2394451" y="2145458"/>
+              <a:ext cx="2416828" cy="0"/>
+            </a:xfrm>
+            <a:prstGeom prst="straightConnector1">
+              <a:avLst/>
+            </a:prstGeom>
+            <a:ln w="44450">
+              <a:solidFill>
+                <a:srgbClr val="FF0000"/>
+              </a:solidFill>
+              <a:tailEnd type="triangle"/>
+            </a:ln>
+          </p:spPr>
+          <p:style>
+            <a:lnRef idx="1">
+              <a:schemeClr val="accent1"/>
+            </a:lnRef>
+            <a:fillRef idx="0">
+              <a:schemeClr val="accent1"/>
+            </a:fillRef>
+            <a:effectRef idx="0">
+              <a:schemeClr val="accent1"/>
+            </a:effectRef>
+            <a:fontRef idx="minor">
+              <a:schemeClr val="tx1"/>
+            </a:fontRef>
+          </p:style>
+        </p:cxnSp>
+        <p:sp>
+          <p:nvSpPr>
+            <p:cNvPr id="18" name="TextBox 17">
+              <a:extLst>
+                <a:ext uri="{FF2B5EF4-FFF2-40B4-BE49-F238E27FC236}">
+                  <a16:creationId xmlns:a16="http://schemas.microsoft.com/office/drawing/2014/main" id="{5F80CCF5-0F9B-97DB-F09A-8ED7F7B855D4}"/>
+                </a:ext>
+              </a:extLst>
+            </p:cNvPr>
+            <p:cNvSpPr txBox="1"/>
+            <p:nvPr/>
+          </p:nvSpPr>
+          <p:spPr>
+            <a:xfrm>
+              <a:off x="2575345" y="1004507"/>
+              <a:ext cx="2924015" cy="523220"/>
+            </a:xfrm>
+            <a:prstGeom prst="rect">
+              <a:avLst/>
+            </a:prstGeom>
+            <a:noFill/>
+          </p:spPr>
+          <p:txBody>
+            <a:bodyPr wrap="square" rtlCol="0">
+              <a:spAutoFit/>
+            </a:bodyPr>
+            <a:lstStyle/>
+            <a:p>
+              <a:r>
+                <a:rPr lang="en-US" sz="1400" dirty="0">
+                  <a:solidFill>
+                    <a:srgbClr val="FF0000"/>
+                  </a:solidFill>
+                </a:rPr>
+                <a:t>Formulation of mathematical model</a:t>
+              </a:r>
+            </a:p>
+            <a:p>
+              <a:r>
+                <a:rPr lang="en-US" sz="1400" dirty="0" err="1">
+                  <a:solidFill>
+                    <a:srgbClr val="FF0000"/>
+                  </a:solidFill>
+                </a:rPr>
+                <a:t>Objectivising</a:t>
+              </a:r>
+              <a:r>
+                <a:rPr lang="en-US" sz="1400" dirty="0">
+                  <a:solidFill>
+                    <a:srgbClr val="FF0000"/>
+                  </a:solidFill>
+                </a:rPr>
+                <a:t> the hypothesis</a:t>
+              </a:r>
+            </a:p>
+          </p:txBody>
+        </p:sp>
+        <p:cxnSp>
+          <p:nvCxnSpPr>
+            <p:cNvPr id="19" name="Straight Arrow Connector 18">
+              <a:extLst>
+                <a:ext uri="{FF2B5EF4-FFF2-40B4-BE49-F238E27FC236}">
+                  <a16:creationId xmlns:a16="http://schemas.microsoft.com/office/drawing/2014/main" id="{FD962679-EA18-A6A1-2E45-4A05294BCE95}"/>
+                </a:ext>
+              </a:extLst>
+            </p:cNvPr>
+            <p:cNvCxnSpPr>
+              <a:cxnSpLocks/>
+            </p:cNvCxnSpPr>
+            <p:nvPr/>
+          </p:nvCxnSpPr>
+          <p:spPr>
+            <a:xfrm>
+              <a:off x="2400074" y="3103725"/>
+              <a:ext cx="2178124" cy="0"/>
+            </a:xfrm>
+            <a:prstGeom prst="straightConnector1">
+              <a:avLst/>
+            </a:prstGeom>
+            <a:ln w="44450">
+              <a:solidFill>
+                <a:srgbClr val="FF0000"/>
+              </a:solidFill>
+              <a:tailEnd type="triangle"/>
+            </a:ln>
+          </p:spPr>
+          <p:style>
+            <a:lnRef idx="1">
+              <a:schemeClr val="accent1"/>
+            </a:lnRef>
+            <a:fillRef idx="0">
+              <a:schemeClr val="accent1"/>
+            </a:fillRef>
+            <a:effectRef idx="0">
+              <a:schemeClr val="accent1"/>
+            </a:effectRef>
+            <a:fontRef idx="minor">
+              <a:schemeClr val="tx1"/>
+            </a:fontRef>
+          </p:style>
+        </p:cxnSp>
+        <p:sp>
+          <p:nvSpPr>
+            <p:cNvPr id="25" name="TextBox 24">
+              <a:extLst>
+                <a:ext uri="{FF2B5EF4-FFF2-40B4-BE49-F238E27FC236}">
+                  <a16:creationId xmlns:a16="http://schemas.microsoft.com/office/drawing/2014/main" id="{82AEF7D8-55E1-CD96-44BB-DA2E553DA9C9}"/>
+                </a:ext>
+              </a:extLst>
+            </p:cNvPr>
+            <p:cNvSpPr txBox="1"/>
+            <p:nvPr/>
+          </p:nvSpPr>
+          <p:spPr>
+            <a:xfrm>
+              <a:off x="6389567" y="184058"/>
+              <a:ext cx="5261568" cy="1384995"/>
+            </a:xfrm>
+            <a:prstGeom prst="rect">
+              <a:avLst/>
+            </a:prstGeom>
+            <a:noFill/>
+          </p:spPr>
+          <p:txBody>
+            <a:bodyPr wrap="square" rtlCol="0">
+              <a:spAutoFit/>
+            </a:bodyPr>
+            <a:lstStyle/>
+            <a:p>
+              <a:pPr marL="285750" indent="-285750">
+                <a:buFont typeface="Arial" panose="020B0604020202020204" pitchFamily="34" charset="0"/>
+                <a:buChar char="•"/>
+              </a:pPr>
+              <a:r>
+                <a:rPr lang="en-US" sz="1200" dirty="0"/>
+                <a:t>What variables influence y?</a:t>
+              </a:r>
+            </a:p>
+            <a:p>
+              <a:pPr marL="285750" indent="-285750">
+                <a:buFont typeface="Arial" panose="020B0604020202020204" pitchFamily="34" charset="0"/>
+                <a:buChar char="•"/>
+              </a:pPr>
+              <a:r>
+                <a:rPr lang="en-US" sz="1200" dirty="0"/>
+                <a:t>In what way? Linear/nonlinear relationship?</a:t>
+              </a:r>
+            </a:p>
+            <a:p>
+              <a:pPr marL="285750" indent="-285750">
+                <a:buFont typeface="Arial" panose="020B0604020202020204" pitchFamily="34" charset="0"/>
+                <a:buChar char="•"/>
+              </a:pPr>
+              <a:r>
+                <a:rPr lang="en-US" sz="1200" dirty="0"/>
+                <a:t>How much/effect sizes?</a:t>
+              </a:r>
+            </a:p>
+            <a:p>
+              <a:pPr marL="285750" indent="-285750">
+                <a:buFont typeface="Arial" panose="020B0604020202020204" pitchFamily="34" charset="0"/>
+                <a:buChar char="•"/>
+              </a:pPr>
+              <a:r>
+                <a:rPr lang="en-US" sz="1200" dirty="0"/>
+                <a:t>How consistent </a:t>
+              </a:r>
+              <a:r>
+                <a:rPr lang="en-US" sz="1200" dirty="0" err="1"/>
+                <a:t>eg.</a:t>
+              </a:r>
+              <a:r>
+                <a:rPr lang="en-US" sz="1200" dirty="0"/>
+                <a:t> What variation can be expected?</a:t>
+              </a:r>
+            </a:p>
+            <a:p>
+              <a:pPr marL="285750" indent="-285750">
+                <a:buFont typeface="Arial" panose="020B0604020202020204" pitchFamily="34" charset="0"/>
+                <a:buChar char="•"/>
+              </a:pPr>
+              <a:r>
+                <a:rPr lang="en-US" sz="1200" dirty="0"/>
+                <a:t>Background noise: Given all other factors, how much additional ‘unexplained’ variation can be expected?</a:t>
+              </a:r>
+            </a:p>
+            <a:p>
+              <a:pPr marL="285750" indent="-285750">
+                <a:buFont typeface="Arial" panose="020B0604020202020204" pitchFamily="34" charset="0"/>
+                <a:buChar char="•"/>
+              </a:pPr>
+              <a:endParaRPr lang="en-US" sz="1200" dirty="0"/>
+            </a:p>
+          </p:txBody>
+        </p:sp>
+        <p:sp>
+          <p:nvSpPr>
+            <p:cNvPr id="26" name="TextBox 25">
+              <a:extLst>
+                <a:ext uri="{FF2B5EF4-FFF2-40B4-BE49-F238E27FC236}">
+                  <a16:creationId xmlns:a16="http://schemas.microsoft.com/office/drawing/2014/main" id="{879FC27E-78D1-B706-2DB6-D1354782277A}"/>
+                </a:ext>
+              </a:extLst>
+            </p:cNvPr>
+            <p:cNvSpPr txBox="1"/>
+            <p:nvPr/>
+          </p:nvSpPr>
+          <p:spPr>
+            <a:xfrm>
+              <a:off x="776416" y="3014655"/>
+              <a:ext cx="1098298" cy="307777"/>
+            </a:xfrm>
+            <a:prstGeom prst="rect">
+              <a:avLst/>
+            </a:prstGeom>
+            <a:noFill/>
+            <a:ln>
+              <a:solidFill>
+                <a:schemeClr val="tx1"/>
+              </a:solidFill>
+            </a:ln>
+          </p:spPr>
+          <p:txBody>
+            <a:bodyPr wrap="square" rtlCol="0">
+              <a:spAutoFit/>
+            </a:bodyPr>
+            <a:lstStyle/>
+            <a:p>
+              <a:r>
+                <a:rPr lang="en-US" sz="1400" dirty="0"/>
+                <a:t>Experiment</a:t>
+              </a:r>
+            </a:p>
+          </p:txBody>
+        </p:sp>
+        <p:sp>
+          <p:nvSpPr>
+            <p:cNvPr id="28" name="TextBox 27">
+              <a:extLst>
+                <a:ext uri="{FF2B5EF4-FFF2-40B4-BE49-F238E27FC236}">
+                  <a16:creationId xmlns:a16="http://schemas.microsoft.com/office/drawing/2014/main" id="{854C5920-BCE8-1121-6743-5D72B6AB0396}"/>
+                </a:ext>
+              </a:extLst>
+            </p:cNvPr>
+            <p:cNvSpPr txBox="1"/>
+            <p:nvPr/>
+          </p:nvSpPr>
+          <p:spPr>
+            <a:xfrm>
+              <a:off x="776416" y="4423123"/>
+              <a:ext cx="1264494" cy="307777"/>
+            </a:xfrm>
+            <a:prstGeom prst="rect">
+              <a:avLst/>
+            </a:prstGeom>
+            <a:noFill/>
+            <a:ln>
+              <a:solidFill>
+                <a:schemeClr val="tx1"/>
+              </a:solidFill>
+            </a:ln>
+          </p:spPr>
+          <p:txBody>
+            <a:bodyPr wrap="square" rtlCol="0">
+              <a:spAutoFit/>
+            </a:bodyPr>
+            <a:lstStyle/>
+            <a:p>
+              <a:r>
+                <a:rPr lang="en-US" sz="1400" dirty="0"/>
+                <a:t>Stats/Analysis</a:t>
+              </a:r>
+            </a:p>
+          </p:txBody>
+        </p:sp>
+        <p:sp>
+          <p:nvSpPr>
+            <p:cNvPr id="29" name="TextBox 28">
+              <a:extLst>
+                <a:ext uri="{FF2B5EF4-FFF2-40B4-BE49-F238E27FC236}">
+                  <a16:creationId xmlns:a16="http://schemas.microsoft.com/office/drawing/2014/main" id="{7DE9669E-0903-8CDA-B10C-4FD2CD01C5EE}"/>
+                </a:ext>
+              </a:extLst>
+            </p:cNvPr>
+            <p:cNvSpPr txBox="1"/>
+            <p:nvPr/>
+          </p:nvSpPr>
+          <p:spPr>
+            <a:xfrm>
+              <a:off x="776416" y="5725010"/>
+              <a:ext cx="1014801" cy="307777"/>
+            </a:xfrm>
+            <a:prstGeom prst="rect">
+              <a:avLst/>
+            </a:prstGeom>
+            <a:noFill/>
+            <a:ln>
+              <a:solidFill>
+                <a:schemeClr val="tx1"/>
+              </a:solidFill>
+            </a:ln>
+          </p:spPr>
+          <p:txBody>
+            <a:bodyPr wrap="square" rtlCol="0">
+              <a:spAutoFit/>
+            </a:bodyPr>
+            <a:lstStyle/>
+            <a:p>
+              <a:r>
+                <a:rPr lang="en-US" sz="1400" dirty="0"/>
+                <a:t>Conclusion</a:t>
+              </a:r>
+            </a:p>
+          </p:txBody>
+        </p:sp>
+        <p:sp>
+          <p:nvSpPr>
+            <p:cNvPr id="30" name="TextBox 29">
+              <a:extLst>
+                <a:ext uri="{FF2B5EF4-FFF2-40B4-BE49-F238E27FC236}">
+                  <a16:creationId xmlns:a16="http://schemas.microsoft.com/office/drawing/2014/main" id="{496652DF-3AED-2DDD-0B4E-C042C4551240}"/>
+                </a:ext>
+              </a:extLst>
+            </p:cNvPr>
+            <p:cNvSpPr txBox="1"/>
+            <p:nvPr/>
+          </p:nvSpPr>
+          <p:spPr>
+            <a:xfrm>
+              <a:off x="776416" y="2084025"/>
+              <a:ext cx="1014803" cy="307777"/>
+            </a:xfrm>
+            <a:prstGeom prst="rect">
+              <a:avLst/>
+            </a:prstGeom>
+            <a:noFill/>
+            <a:ln>
+              <a:solidFill>
+                <a:schemeClr val="tx1"/>
+              </a:solidFill>
+            </a:ln>
+          </p:spPr>
+          <p:txBody>
+            <a:bodyPr wrap="square" rtlCol="0">
+              <a:spAutoFit/>
+            </a:bodyPr>
+            <a:lstStyle/>
+            <a:p>
+              <a:r>
+                <a:rPr lang="en-US" sz="1400" dirty="0"/>
+                <a:t>Hypothesis</a:t>
+              </a:r>
+            </a:p>
+          </p:txBody>
+        </p:sp>
+        <p:cxnSp>
+          <p:nvCxnSpPr>
+            <p:cNvPr id="31" name="Straight Arrow Connector 30">
+              <a:extLst>
+                <a:ext uri="{FF2B5EF4-FFF2-40B4-BE49-F238E27FC236}">
+                  <a16:creationId xmlns:a16="http://schemas.microsoft.com/office/drawing/2014/main" id="{C86732B2-2FDF-6860-F8D5-AC78D6451489}"/>
+                </a:ext>
+              </a:extLst>
+            </p:cNvPr>
+            <p:cNvCxnSpPr>
+              <a:cxnSpLocks/>
+            </p:cNvCxnSpPr>
+            <p:nvPr/>
+          </p:nvCxnSpPr>
+          <p:spPr>
+            <a:xfrm>
+              <a:off x="1354424" y="2491435"/>
+              <a:ext cx="0" cy="523220"/>
+            </a:xfrm>
+            <a:prstGeom prst="straightConnector1">
+              <a:avLst/>
+            </a:prstGeom>
+            <a:ln w="44450">
+              <a:tailEnd type="triangle"/>
+            </a:ln>
+          </p:spPr>
+          <p:style>
+            <a:lnRef idx="1">
+              <a:schemeClr val="accent1"/>
+            </a:lnRef>
+            <a:fillRef idx="0">
+              <a:schemeClr val="accent1"/>
+            </a:fillRef>
+            <a:effectRef idx="0">
+              <a:schemeClr val="accent1"/>
+            </a:effectRef>
+            <a:fontRef idx="minor">
+              <a:schemeClr val="tx1"/>
+            </a:fontRef>
+          </p:style>
+        </p:cxnSp>
+        <p:sp>
+          <p:nvSpPr>
+            <p:cNvPr id="32" name="TextBox 31">
+              <a:extLst>
+                <a:ext uri="{FF2B5EF4-FFF2-40B4-BE49-F238E27FC236}">
+                  <a16:creationId xmlns:a16="http://schemas.microsoft.com/office/drawing/2014/main" id="{743DED6C-2953-4BBF-A90D-D8C75EDA8FD8}"/>
+                </a:ext>
+              </a:extLst>
+            </p:cNvPr>
+            <p:cNvSpPr txBox="1"/>
+            <p:nvPr/>
+          </p:nvSpPr>
+          <p:spPr>
+            <a:xfrm>
+              <a:off x="2353072" y="2171917"/>
+              <a:ext cx="2416829" cy="400110"/>
+            </a:xfrm>
+            <a:prstGeom prst="rect">
+              <a:avLst/>
+            </a:prstGeom>
+            <a:noFill/>
+          </p:spPr>
+          <p:txBody>
+            <a:bodyPr wrap="square" rtlCol="0">
+              <a:spAutoFit/>
+            </a:bodyPr>
+            <a:lstStyle/>
+            <a:p>
+              <a:r>
+                <a:rPr lang="en-US" sz="1000" dirty="0"/>
+                <a:t>Not testable (</a:t>
+              </a:r>
+              <a:r>
+                <a:rPr lang="en-US" sz="1000" dirty="0" err="1"/>
+                <a:t>vage</a:t>
+              </a:r>
+              <a:r>
+                <a:rPr lang="en-US" sz="1000" dirty="0"/>
+                <a:t>, subjective, unrealistic)</a:t>
+              </a:r>
+            </a:p>
+            <a:p>
+              <a:r>
+                <a:rPr lang="en-US" sz="1000" dirty="0" err="1"/>
+                <a:t>i.E</a:t>
+              </a:r>
+              <a:r>
+                <a:rPr lang="en-US" sz="1000" dirty="0"/>
+                <a:t> null hypothesis gets rejected in any case</a:t>
+              </a:r>
+            </a:p>
+          </p:txBody>
+        </p:sp>
+        <p:cxnSp>
+          <p:nvCxnSpPr>
+            <p:cNvPr id="35" name="Straight Arrow Connector 34">
+              <a:extLst>
+                <a:ext uri="{FF2B5EF4-FFF2-40B4-BE49-F238E27FC236}">
+                  <a16:creationId xmlns:a16="http://schemas.microsoft.com/office/drawing/2014/main" id="{6A986273-638F-1EC0-D3AF-88B4732D04AE}"/>
+                </a:ext>
+              </a:extLst>
+            </p:cNvPr>
+            <p:cNvCxnSpPr>
+              <a:cxnSpLocks/>
+            </p:cNvCxnSpPr>
+            <p:nvPr/>
+          </p:nvCxnSpPr>
+          <p:spPr>
+            <a:xfrm>
+              <a:off x="2400074" y="4566206"/>
+              <a:ext cx="1315450" cy="0"/>
+            </a:xfrm>
+            <a:prstGeom prst="straightConnector1">
+              <a:avLst/>
+            </a:prstGeom>
+            <a:ln w="44450">
+              <a:solidFill>
+                <a:srgbClr val="FF0000"/>
+              </a:solidFill>
+              <a:tailEnd type="triangle"/>
+            </a:ln>
+          </p:spPr>
+          <p:style>
+            <a:lnRef idx="1">
+              <a:schemeClr val="accent1"/>
+            </a:lnRef>
+            <a:fillRef idx="0">
+              <a:schemeClr val="accent1"/>
+            </a:fillRef>
+            <a:effectRef idx="0">
+              <a:schemeClr val="accent1"/>
+            </a:effectRef>
+            <a:fontRef idx="minor">
+              <a:schemeClr val="tx1"/>
+            </a:fontRef>
+          </p:style>
+        </p:cxnSp>
+        <p:sp>
+          <p:nvSpPr>
+            <p:cNvPr id="36" name="TextBox 35">
+              <a:extLst>
+                <a:ext uri="{FF2B5EF4-FFF2-40B4-BE49-F238E27FC236}">
+                  <a16:creationId xmlns:a16="http://schemas.microsoft.com/office/drawing/2014/main" id="{23027BBC-C960-2B4B-0AEF-B8ED2962E7D7}"/>
+                </a:ext>
+              </a:extLst>
+            </p:cNvPr>
+            <p:cNvSpPr txBox="1"/>
+            <p:nvPr/>
+          </p:nvSpPr>
+          <p:spPr>
+            <a:xfrm>
+              <a:off x="2400074" y="4601826"/>
+              <a:ext cx="1875145" cy="246221"/>
+            </a:xfrm>
+            <a:prstGeom prst="rect">
+              <a:avLst/>
+            </a:prstGeom>
+            <a:noFill/>
+          </p:spPr>
+          <p:txBody>
+            <a:bodyPr wrap="square" rtlCol="0">
+              <a:spAutoFit/>
+            </a:bodyPr>
+            <a:lstStyle/>
+            <a:p>
+              <a:r>
+                <a:rPr lang="en-US" sz="1000" dirty="0"/>
+                <a:t>Mathematical artefact, </a:t>
+              </a:r>
+            </a:p>
+          </p:txBody>
+        </p:sp>
+        <p:cxnSp>
+          <p:nvCxnSpPr>
+            <p:cNvPr id="43" name="Straight Arrow Connector 42">
+              <a:extLst>
+                <a:ext uri="{FF2B5EF4-FFF2-40B4-BE49-F238E27FC236}">
+                  <a16:creationId xmlns:a16="http://schemas.microsoft.com/office/drawing/2014/main" id="{7D1DA685-5138-FE17-63C5-BBDBD2F44B73}"/>
+                </a:ext>
+              </a:extLst>
+            </p:cNvPr>
+            <p:cNvCxnSpPr>
+              <a:cxnSpLocks/>
+            </p:cNvCxnSpPr>
+            <p:nvPr/>
+          </p:nvCxnSpPr>
+          <p:spPr>
+            <a:xfrm flipV="1">
+              <a:off x="2404588" y="5868093"/>
+              <a:ext cx="1376956" cy="10805"/>
+            </a:xfrm>
+            <a:prstGeom prst="straightConnector1">
+              <a:avLst/>
+            </a:prstGeom>
+            <a:ln w="44450">
+              <a:solidFill>
+                <a:srgbClr val="FF0000"/>
+              </a:solidFill>
+              <a:tailEnd type="triangle"/>
+            </a:ln>
+          </p:spPr>
+          <p:style>
+            <a:lnRef idx="1">
+              <a:schemeClr val="accent1"/>
+            </a:lnRef>
+            <a:fillRef idx="0">
+              <a:schemeClr val="accent1"/>
+            </a:fillRef>
+            <a:effectRef idx="0">
+              <a:schemeClr val="accent1"/>
+            </a:effectRef>
+            <a:fontRef idx="minor">
+              <a:schemeClr val="tx1"/>
+            </a:fontRef>
+          </p:style>
+        </p:cxnSp>
+        <p:sp>
+          <p:nvSpPr>
+            <p:cNvPr id="44" name="TextBox 43">
+              <a:extLst>
+                <a:ext uri="{FF2B5EF4-FFF2-40B4-BE49-F238E27FC236}">
+                  <a16:creationId xmlns:a16="http://schemas.microsoft.com/office/drawing/2014/main" id="{8E52623E-948C-DEA9-14CF-396CC1A0A2FC}"/>
+                </a:ext>
+              </a:extLst>
+            </p:cNvPr>
+            <p:cNvSpPr txBox="1"/>
+            <p:nvPr/>
+          </p:nvSpPr>
+          <p:spPr>
+            <a:xfrm>
+              <a:off x="2388325" y="5923195"/>
+              <a:ext cx="2317730" cy="246221"/>
+            </a:xfrm>
+            <a:prstGeom prst="rect">
+              <a:avLst/>
+            </a:prstGeom>
+            <a:noFill/>
+          </p:spPr>
+          <p:txBody>
+            <a:bodyPr wrap="square" rtlCol="0">
+              <a:spAutoFit/>
+            </a:bodyPr>
+            <a:lstStyle/>
+            <a:p>
+              <a:r>
+                <a:rPr lang="en-US" sz="1000" dirty="0"/>
+                <a:t>Overconfident, yes/no simplification</a:t>
+              </a:r>
+            </a:p>
+          </p:txBody>
+        </p:sp>
+        <p:cxnSp>
+          <p:nvCxnSpPr>
+            <p:cNvPr id="45" name="Straight Arrow Connector 44">
+              <a:extLst>
+                <a:ext uri="{FF2B5EF4-FFF2-40B4-BE49-F238E27FC236}">
+                  <a16:creationId xmlns:a16="http://schemas.microsoft.com/office/drawing/2014/main" id="{8233E279-5CB1-CD7F-8AB2-02A886FC4543}"/>
+                </a:ext>
+              </a:extLst>
+            </p:cNvPr>
+            <p:cNvCxnSpPr>
+              <a:cxnSpLocks/>
+            </p:cNvCxnSpPr>
+            <p:nvPr/>
+          </p:nvCxnSpPr>
+          <p:spPr>
+            <a:xfrm>
+              <a:off x="1478070" y="1614940"/>
+              <a:ext cx="10241" cy="405605"/>
+            </a:xfrm>
+            <a:prstGeom prst="straightConnector1">
+              <a:avLst/>
+            </a:prstGeom>
+            <a:ln w="44450">
+              <a:tailEnd type="triangle"/>
+            </a:ln>
+          </p:spPr>
+          <p:style>
+            <a:lnRef idx="1">
+              <a:schemeClr val="accent1"/>
+            </a:lnRef>
+            <a:fillRef idx="0">
+              <a:schemeClr val="accent1"/>
+            </a:fillRef>
+            <a:effectRef idx="0">
+              <a:schemeClr val="accent1"/>
+            </a:effectRef>
+            <a:fontRef idx="minor">
+              <a:schemeClr val="tx1"/>
+            </a:fontRef>
+          </p:style>
+        </p:cxnSp>
+        <p:cxnSp>
+          <p:nvCxnSpPr>
+            <p:cNvPr id="46" name="Straight Arrow Connector 45">
+              <a:extLst>
+                <a:ext uri="{FF2B5EF4-FFF2-40B4-BE49-F238E27FC236}">
+                  <a16:creationId xmlns:a16="http://schemas.microsoft.com/office/drawing/2014/main" id="{9DA904A4-E4B0-3C95-2AF4-279BB11F3288}"/>
+                </a:ext>
+              </a:extLst>
+            </p:cNvPr>
+            <p:cNvCxnSpPr>
+              <a:cxnSpLocks/>
+            </p:cNvCxnSpPr>
+            <p:nvPr/>
+          </p:nvCxnSpPr>
+          <p:spPr>
+            <a:xfrm>
+              <a:off x="1354424" y="3630209"/>
+              <a:ext cx="0" cy="653692"/>
+            </a:xfrm>
+            <a:prstGeom prst="straightConnector1">
+              <a:avLst/>
+            </a:prstGeom>
+            <a:ln w="44450">
+              <a:tailEnd type="triangle"/>
+            </a:ln>
+          </p:spPr>
+          <p:style>
+            <a:lnRef idx="1">
+              <a:schemeClr val="accent1"/>
+            </a:lnRef>
+            <a:fillRef idx="0">
+              <a:schemeClr val="accent1"/>
+            </a:fillRef>
+            <a:effectRef idx="0">
+              <a:schemeClr val="accent1"/>
+            </a:effectRef>
+            <a:fontRef idx="minor">
+              <a:schemeClr val="tx1"/>
+            </a:fontRef>
+          </p:style>
+        </p:cxnSp>
+        <p:cxnSp>
+          <p:nvCxnSpPr>
+            <p:cNvPr id="47" name="Straight Arrow Connector 46">
+              <a:extLst>
+                <a:ext uri="{FF2B5EF4-FFF2-40B4-BE49-F238E27FC236}">
+                  <a16:creationId xmlns:a16="http://schemas.microsoft.com/office/drawing/2014/main" id="{71E20B54-E9C3-4022-FEA0-409E83565807}"/>
+                </a:ext>
+              </a:extLst>
+            </p:cNvPr>
+            <p:cNvCxnSpPr>
+              <a:cxnSpLocks/>
+            </p:cNvCxnSpPr>
+            <p:nvPr/>
+          </p:nvCxnSpPr>
+          <p:spPr>
+            <a:xfrm flipH="1">
+              <a:off x="1454912" y="4947781"/>
+              <a:ext cx="23158" cy="576916"/>
+            </a:xfrm>
+            <a:prstGeom prst="straightConnector1">
+              <a:avLst/>
+            </a:prstGeom>
+            <a:ln w="44450">
+              <a:tailEnd type="triangle"/>
+            </a:ln>
+          </p:spPr>
+          <p:style>
+            <a:lnRef idx="1">
+              <a:schemeClr val="accent1"/>
+            </a:lnRef>
+            <a:fillRef idx="0">
+              <a:schemeClr val="accent1"/>
+            </a:fillRef>
+            <a:effectRef idx="0">
+              <a:schemeClr val="accent1"/>
+            </a:effectRef>
+            <a:fontRef idx="minor">
+              <a:schemeClr val="tx1"/>
+            </a:fontRef>
+          </p:style>
+        </p:cxnSp>
+        <p:sp>
+          <p:nvSpPr>
+            <p:cNvPr id="48" name="TextBox 47">
+              <a:extLst>
+                <a:ext uri="{FF2B5EF4-FFF2-40B4-BE49-F238E27FC236}">
+                  <a16:creationId xmlns:a16="http://schemas.microsoft.com/office/drawing/2014/main" id="{8042DB62-3D72-A8E1-4DEF-A983EBFC3552}"/>
+                </a:ext>
+              </a:extLst>
+            </p:cNvPr>
+            <p:cNvSpPr txBox="1"/>
+            <p:nvPr/>
+          </p:nvSpPr>
+          <p:spPr>
+            <a:xfrm>
+              <a:off x="5940688" y="3769208"/>
+              <a:ext cx="1441078" cy="307777"/>
+            </a:xfrm>
+            <a:prstGeom prst="rect">
+              <a:avLst/>
+            </a:prstGeom>
+            <a:noFill/>
+            <a:ln>
+              <a:solidFill>
+                <a:schemeClr val="tx1"/>
+              </a:solidFill>
+            </a:ln>
+          </p:spPr>
+          <p:txBody>
+            <a:bodyPr wrap="square" rtlCol="0">
+              <a:spAutoFit/>
+            </a:bodyPr>
+            <a:lstStyle/>
+            <a:p>
+              <a:r>
+                <a:rPr lang="en-US" sz="1400" dirty="0"/>
+                <a:t>Fake dataset</a:t>
+              </a:r>
+            </a:p>
+          </p:txBody>
+        </p:sp>
+        <p:sp>
+          <p:nvSpPr>
+            <p:cNvPr id="49" name="TextBox 48">
+              <a:extLst>
+                <a:ext uri="{FF2B5EF4-FFF2-40B4-BE49-F238E27FC236}">
+                  <a16:creationId xmlns:a16="http://schemas.microsoft.com/office/drawing/2014/main" id="{E2E0642C-D2D8-BEC7-2EF7-FA701F08C0AE}"/>
+                </a:ext>
+              </a:extLst>
+            </p:cNvPr>
+            <p:cNvSpPr txBox="1"/>
+            <p:nvPr/>
+          </p:nvSpPr>
+          <p:spPr>
+            <a:xfrm>
+              <a:off x="5524609" y="4872449"/>
+              <a:ext cx="3187965" cy="954107"/>
+            </a:xfrm>
+            <a:prstGeom prst="rect">
+              <a:avLst/>
+            </a:prstGeom>
+            <a:noFill/>
+            <a:ln>
+              <a:solidFill>
+                <a:schemeClr val="tx1"/>
+              </a:solidFill>
+            </a:ln>
+          </p:spPr>
+          <p:txBody>
+            <a:bodyPr wrap="square" rtlCol="0">
+              <a:spAutoFit/>
+            </a:bodyPr>
+            <a:lstStyle/>
+            <a:p>
+              <a:r>
+                <a:rPr lang="en-US" sz="1400" dirty="0"/>
+                <a:t>Is this the pattern we expect? </a:t>
+              </a:r>
+            </a:p>
+            <a:p>
+              <a:r>
+                <a:rPr lang="en-US" sz="1400" dirty="0"/>
+                <a:t>Statistical power? </a:t>
+              </a:r>
+            </a:p>
+            <a:p>
+              <a:r>
+                <a:rPr lang="en-US" sz="1400" dirty="0"/>
+                <a:t>Enough confidence for predictions?</a:t>
+              </a:r>
+            </a:p>
+            <a:p>
+              <a:r>
+                <a:rPr lang="en-US" sz="1400" dirty="0"/>
+                <a:t>Is our model appropriate?  </a:t>
+              </a:r>
+            </a:p>
+          </p:txBody>
+        </p:sp>
+        <p:cxnSp>
+          <p:nvCxnSpPr>
+            <p:cNvPr id="50" name="Straight Arrow Connector 49">
+              <a:extLst>
+                <a:ext uri="{FF2B5EF4-FFF2-40B4-BE49-F238E27FC236}">
+                  <a16:creationId xmlns:a16="http://schemas.microsoft.com/office/drawing/2014/main" id="{B9DA8960-09DC-2F9A-BE1D-0DC96D027105}"/>
+                </a:ext>
+              </a:extLst>
+            </p:cNvPr>
+            <p:cNvCxnSpPr>
+              <a:cxnSpLocks/>
+            </p:cNvCxnSpPr>
+            <p:nvPr/>
+          </p:nvCxnSpPr>
+          <p:spPr>
+            <a:xfrm>
+              <a:off x="6110568" y="2349054"/>
+              <a:ext cx="5383" cy="1399049"/>
+            </a:xfrm>
+            <a:prstGeom prst="straightConnector1">
+              <a:avLst/>
+            </a:prstGeom>
+            <a:ln w="44450">
+              <a:tailEnd type="triangle"/>
+            </a:ln>
+          </p:spPr>
+          <p:style>
+            <a:lnRef idx="1">
+              <a:schemeClr val="accent1"/>
+            </a:lnRef>
+            <a:fillRef idx="0">
+              <a:schemeClr val="accent1"/>
+            </a:fillRef>
+            <a:effectRef idx="0">
+              <a:schemeClr val="accent1"/>
+            </a:effectRef>
+            <a:fontRef idx="minor">
+              <a:schemeClr val="tx1"/>
+            </a:fontRef>
+          </p:style>
+        </p:cxnSp>
+        <p:sp>
+          <p:nvSpPr>
+            <p:cNvPr id="51" name="TextBox 50">
+              <a:extLst>
+                <a:ext uri="{FF2B5EF4-FFF2-40B4-BE49-F238E27FC236}">
+                  <a16:creationId xmlns:a16="http://schemas.microsoft.com/office/drawing/2014/main" id="{323662D7-B227-4490-C1F1-0204D72D9B1F}"/>
+                </a:ext>
+              </a:extLst>
+            </p:cNvPr>
+            <p:cNvSpPr txBox="1"/>
+            <p:nvPr/>
+          </p:nvSpPr>
+          <p:spPr>
+            <a:xfrm>
+              <a:off x="2353072" y="3199321"/>
+              <a:ext cx="2352983" cy="246221"/>
+            </a:xfrm>
+            <a:prstGeom prst="rect">
+              <a:avLst/>
+            </a:prstGeom>
+            <a:noFill/>
+          </p:spPr>
+          <p:txBody>
+            <a:bodyPr wrap="square" rtlCol="0">
+              <a:spAutoFit/>
+            </a:bodyPr>
+            <a:lstStyle/>
+            <a:p>
+              <a:r>
+                <a:rPr lang="en-US" sz="1000" dirty="0"/>
+                <a:t>Poor design, not enough replication</a:t>
+              </a:r>
+            </a:p>
+          </p:txBody>
+        </p:sp>
+        <p:sp>
+          <p:nvSpPr>
+            <p:cNvPr id="52" name="TextBox 51">
+              <a:extLst>
+                <a:ext uri="{FF2B5EF4-FFF2-40B4-BE49-F238E27FC236}">
+                  <a16:creationId xmlns:a16="http://schemas.microsoft.com/office/drawing/2014/main" id="{256841DC-7123-5863-FD2D-7717E3AA36FB}"/>
+                </a:ext>
+              </a:extLst>
+            </p:cNvPr>
+            <p:cNvSpPr txBox="1"/>
+            <p:nvPr/>
+          </p:nvSpPr>
+          <p:spPr>
+            <a:xfrm>
+              <a:off x="23480" y="184058"/>
+              <a:ext cx="2464230" cy="307777"/>
+            </a:xfrm>
+            <a:prstGeom prst="rect">
+              <a:avLst/>
+            </a:prstGeom>
+            <a:noFill/>
+            <a:ln>
+              <a:solidFill>
+                <a:schemeClr val="tx1"/>
+              </a:solidFill>
+            </a:ln>
+          </p:spPr>
+          <p:txBody>
+            <a:bodyPr wrap="square" rtlCol="0">
+              <a:spAutoFit/>
+            </a:bodyPr>
+            <a:lstStyle/>
+            <a:p>
+              <a:r>
+                <a:rPr lang="en-US" sz="1400" dirty="0"/>
+                <a:t>Scientific Knowledge/Literature</a:t>
+              </a:r>
+            </a:p>
+          </p:txBody>
+        </p:sp>
+        <p:sp>
+          <p:nvSpPr>
+            <p:cNvPr id="53" name="TextBox 52">
+              <a:extLst>
+                <a:ext uri="{FF2B5EF4-FFF2-40B4-BE49-F238E27FC236}">
+                  <a16:creationId xmlns:a16="http://schemas.microsoft.com/office/drawing/2014/main" id="{611B7C20-5D66-67F7-55E1-9D1D3BBE55DC}"/>
+                </a:ext>
+              </a:extLst>
+            </p:cNvPr>
+            <p:cNvSpPr txBox="1"/>
+            <p:nvPr/>
+          </p:nvSpPr>
+          <p:spPr>
+            <a:xfrm>
+              <a:off x="776416" y="1283618"/>
+              <a:ext cx="1353005" cy="307777"/>
+            </a:xfrm>
+            <a:prstGeom prst="rect">
+              <a:avLst/>
+            </a:prstGeom>
+            <a:noFill/>
+            <a:ln>
+              <a:solidFill>
+                <a:schemeClr val="tx1"/>
+              </a:solidFill>
+            </a:ln>
+          </p:spPr>
+          <p:txBody>
+            <a:bodyPr wrap="square" rtlCol="0">
+              <a:spAutoFit/>
+            </a:bodyPr>
+            <a:lstStyle/>
+            <a:p>
+              <a:r>
+                <a:rPr lang="en-US" sz="1400" dirty="0"/>
+                <a:t>Knowledge gap</a:t>
+              </a:r>
+            </a:p>
+          </p:txBody>
+        </p:sp>
+        <p:sp>
+          <p:nvSpPr>
+            <p:cNvPr id="54" name="TextBox 53">
+              <a:extLst>
+                <a:ext uri="{FF2B5EF4-FFF2-40B4-BE49-F238E27FC236}">
+                  <a16:creationId xmlns:a16="http://schemas.microsoft.com/office/drawing/2014/main" id="{56DF4311-B876-B2ED-B731-D07A9E818DEB}"/>
+                </a:ext>
+              </a:extLst>
+            </p:cNvPr>
+            <p:cNvSpPr txBox="1"/>
+            <p:nvPr/>
+          </p:nvSpPr>
+          <p:spPr>
+            <a:xfrm rot="16200000">
+              <a:off x="-1510521" y="2816773"/>
+              <a:ext cx="3520478" cy="307777"/>
+            </a:xfrm>
+            <a:prstGeom prst="rect">
+              <a:avLst/>
+            </a:prstGeom>
+            <a:noFill/>
+            <a:ln>
+              <a:noFill/>
+            </a:ln>
+          </p:spPr>
+          <p:txBody>
+            <a:bodyPr wrap="square" rtlCol="0">
+              <a:spAutoFit/>
+            </a:bodyPr>
+            <a:lstStyle/>
+            <a:p>
+              <a:r>
+                <a:rPr lang="en-US" sz="1400" dirty="0"/>
+                <a:t>Common scientific workflow</a:t>
+              </a:r>
+            </a:p>
+          </p:txBody>
+        </p:sp>
+        <p:cxnSp>
+          <p:nvCxnSpPr>
+            <p:cNvPr id="58" name="Straight Arrow Connector 57">
+              <a:extLst>
+                <a:ext uri="{FF2B5EF4-FFF2-40B4-BE49-F238E27FC236}">
+                  <a16:creationId xmlns:a16="http://schemas.microsoft.com/office/drawing/2014/main" id="{FA1CE337-D935-858B-3CC9-65DE80AA1202}"/>
+                </a:ext>
+              </a:extLst>
+            </p:cNvPr>
+            <p:cNvCxnSpPr>
+              <a:cxnSpLocks/>
+            </p:cNvCxnSpPr>
+            <p:nvPr/>
+          </p:nvCxnSpPr>
+          <p:spPr>
+            <a:xfrm>
+              <a:off x="1478070" y="645724"/>
+              <a:ext cx="0" cy="620393"/>
+            </a:xfrm>
+            <a:prstGeom prst="straightConnector1">
+              <a:avLst/>
+            </a:prstGeom>
+            <a:ln w="44450">
+              <a:tailEnd type="triangle"/>
+            </a:ln>
+          </p:spPr>
+          <p:style>
+            <a:lnRef idx="1">
+              <a:schemeClr val="accent1"/>
+            </a:lnRef>
+            <a:fillRef idx="0">
+              <a:schemeClr val="accent1"/>
+            </a:fillRef>
+            <a:effectRef idx="0">
+              <a:schemeClr val="accent1"/>
+            </a:effectRef>
+            <a:fontRef idx="minor">
+              <a:schemeClr val="tx1"/>
+            </a:fontRef>
+          </p:style>
+        </p:cxnSp>
+        <p:sp>
+          <p:nvSpPr>
+            <p:cNvPr id="59" name="TextBox 58">
+              <a:extLst>
+                <a:ext uri="{FF2B5EF4-FFF2-40B4-BE49-F238E27FC236}">
+                  <a16:creationId xmlns:a16="http://schemas.microsoft.com/office/drawing/2014/main" id="{D6A646A7-41CF-F5CC-3532-A55BB8DDBC9B}"/>
+                </a:ext>
+              </a:extLst>
+            </p:cNvPr>
+            <p:cNvSpPr txBox="1"/>
+            <p:nvPr/>
+          </p:nvSpPr>
+          <p:spPr>
+            <a:xfrm>
+              <a:off x="6159579" y="2630073"/>
+              <a:ext cx="1926769" cy="954107"/>
+            </a:xfrm>
+            <a:prstGeom prst="rect">
+              <a:avLst/>
+            </a:prstGeom>
+            <a:noFill/>
+          </p:spPr>
+          <p:txBody>
+            <a:bodyPr wrap="square" rtlCol="0">
+              <a:spAutoFit/>
+            </a:bodyPr>
+            <a:lstStyle/>
+            <a:p>
+              <a:r>
+                <a:rPr lang="en-US" sz="1400" dirty="0">
+                  <a:solidFill>
+                    <a:srgbClr val="FF0000"/>
+                  </a:solidFill>
+                </a:rPr>
+                <a:t>Simulation: </a:t>
+              </a:r>
+            </a:p>
+            <a:p>
+              <a:r>
+                <a:rPr lang="en-US" sz="1400" dirty="0">
+                  <a:solidFill>
+                    <a:srgbClr val="FF0000"/>
+                  </a:solidFill>
+                </a:rPr>
+                <a:t>play with replication, effect sizes and variance</a:t>
+              </a:r>
+            </a:p>
+          </p:txBody>
+        </p:sp>
+        <p:sp>
+          <p:nvSpPr>
+            <p:cNvPr id="60" name="TextBox 59">
+              <a:extLst>
+                <a:ext uri="{FF2B5EF4-FFF2-40B4-BE49-F238E27FC236}">
+                  <a16:creationId xmlns:a16="http://schemas.microsoft.com/office/drawing/2014/main" id="{558E93A7-EC26-7352-A9A5-8C48CEC83D4B}"/>
+                </a:ext>
+              </a:extLst>
+            </p:cNvPr>
+            <p:cNvSpPr txBox="1"/>
+            <p:nvPr/>
+          </p:nvSpPr>
+          <p:spPr>
+            <a:xfrm>
+              <a:off x="6184098" y="4511408"/>
+              <a:ext cx="1204604" cy="307777"/>
+            </a:xfrm>
+            <a:prstGeom prst="rect">
+              <a:avLst/>
+            </a:prstGeom>
+            <a:noFill/>
+          </p:spPr>
+          <p:txBody>
+            <a:bodyPr wrap="square" rtlCol="0">
+              <a:spAutoFit/>
+            </a:bodyPr>
+            <a:lstStyle/>
+            <a:p>
+              <a:r>
+                <a:rPr lang="en-US" sz="1400" dirty="0">
+                  <a:solidFill>
+                    <a:srgbClr val="FF0000"/>
+                  </a:solidFill>
+                </a:rPr>
+                <a:t>Test Analysis</a:t>
+              </a:r>
+            </a:p>
+          </p:txBody>
+        </p:sp>
+        <p:cxnSp>
+          <p:nvCxnSpPr>
+            <p:cNvPr id="61" name="Straight Arrow Connector 60">
+              <a:extLst>
+                <a:ext uri="{FF2B5EF4-FFF2-40B4-BE49-F238E27FC236}">
+                  <a16:creationId xmlns:a16="http://schemas.microsoft.com/office/drawing/2014/main" id="{0B39C6E1-EB1A-63B8-571E-D4F6B7A0986F}"/>
+                </a:ext>
+              </a:extLst>
+            </p:cNvPr>
+            <p:cNvCxnSpPr>
+              <a:cxnSpLocks/>
+            </p:cNvCxnSpPr>
+            <p:nvPr/>
+          </p:nvCxnSpPr>
+          <p:spPr>
+            <a:xfrm>
+              <a:off x="6110568" y="4055881"/>
+              <a:ext cx="0" cy="830997"/>
+            </a:xfrm>
+            <a:prstGeom prst="straightConnector1">
+              <a:avLst/>
+            </a:prstGeom>
+            <a:ln w="44450">
+              <a:tailEnd type="triangle"/>
+            </a:ln>
+          </p:spPr>
+          <p:style>
+            <a:lnRef idx="1">
+              <a:schemeClr val="accent1"/>
+            </a:lnRef>
+            <a:fillRef idx="0">
+              <a:schemeClr val="accent1"/>
+            </a:fillRef>
+            <a:effectRef idx="0">
+              <a:schemeClr val="accent1"/>
+            </a:effectRef>
+            <a:fontRef idx="minor">
+              <a:schemeClr val="tx1"/>
+            </a:fontRef>
+          </p:style>
+        </p:cxnSp>
+        <p:sp>
+          <p:nvSpPr>
+            <p:cNvPr id="62" name="TextBox 61">
+              <a:extLst>
+                <a:ext uri="{FF2B5EF4-FFF2-40B4-BE49-F238E27FC236}">
+                  <a16:creationId xmlns:a16="http://schemas.microsoft.com/office/drawing/2014/main" id="{DA61B1F3-2582-0FF4-03C6-12D80C8EA806}"/>
+                </a:ext>
+              </a:extLst>
+            </p:cNvPr>
+            <p:cNvSpPr txBox="1"/>
+            <p:nvPr/>
+          </p:nvSpPr>
+          <p:spPr>
+            <a:xfrm rot="16200000">
+              <a:off x="7810458" y="2538211"/>
+              <a:ext cx="2112009" cy="307777"/>
+            </a:xfrm>
+            <a:prstGeom prst="rect">
+              <a:avLst/>
+            </a:prstGeom>
+            <a:noFill/>
+            <a:ln>
+              <a:noFill/>
+            </a:ln>
+          </p:spPr>
+          <p:txBody>
+            <a:bodyPr wrap="square" rtlCol="0">
+              <a:spAutoFit/>
+            </a:bodyPr>
+            <a:lstStyle/>
+            <a:p>
+              <a:r>
+                <a:rPr lang="en-US" sz="1400" dirty="0"/>
+                <a:t>Solutions</a:t>
+              </a:r>
+            </a:p>
+          </p:txBody>
+        </p:sp>
+        <p:cxnSp>
+          <p:nvCxnSpPr>
+            <p:cNvPr id="63" name="Straight Arrow Connector 62">
+              <a:extLst>
+                <a:ext uri="{FF2B5EF4-FFF2-40B4-BE49-F238E27FC236}">
+                  <a16:creationId xmlns:a16="http://schemas.microsoft.com/office/drawing/2014/main" id="{CB286EA6-4AF3-73B8-C0F0-1BC68BA2DEE3}"/>
+                </a:ext>
+              </a:extLst>
+            </p:cNvPr>
+            <p:cNvCxnSpPr>
+              <a:cxnSpLocks/>
+            </p:cNvCxnSpPr>
+            <p:nvPr/>
+          </p:nvCxnSpPr>
+          <p:spPr>
+            <a:xfrm flipV="1">
+              <a:off x="8518209" y="2335896"/>
+              <a:ext cx="24131" cy="2550982"/>
+            </a:xfrm>
+            <a:prstGeom prst="straightConnector1">
+              <a:avLst/>
+            </a:prstGeom>
+            <a:ln w="44450">
+              <a:tailEnd type="triangle"/>
+            </a:ln>
+          </p:spPr>
+          <p:style>
+            <a:lnRef idx="1">
+              <a:schemeClr val="accent1"/>
+            </a:lnRef>
+            <a:fillRef idx="0">
+              <a:schemeClr val="accent1"/>
+            </a:fillRef>
+            <a:effectRef idx="0">
+              <a:schemeClr val="accent1"/>
+            </a:effectRef>
+            <a:fontRef idx="minor">
+              <a:schemeClr val="tx1"/>
+            </a:fontRef>
+          </p:style>
+        </p:cxnSp>
+        <p:cxnSp>
+          <p:nvCxnSpPr>
+            <p:cNvPr id="67" name="Straight Arrow Connector 66">
+              <a:extLst>
+                <a:ext uri="{FF2B5EF4-FFF2-40B4-BE49-F238E27FC236}">
+                  <a16:creationId xmlns:a16="http://schemas.microsoft.com/office/drawing/2014/main" id="{A47422EC-F8CC-69EA-7568-897321464761}"/>
+                </a:ext>
+              </a:extLst>
+            </p:cNvPr>
+            <p:cNvCxnSpPr>
+              <a:cxnSpLocks/>
+            </p:cNvCxnSpPr>
+            <p:nvPr/>
+          </p:nvCxnSpPr>
+          <p:spPr>
+            <a:xfrm flipV="1">
+              <a:off x="2008531" y="1596479"/>
+              <a:ext cx="3400234" cy="13377"/>
+            </a:xfrm>
+            <a:prstGeom prst="straightConnector1">
+              <a:avLst/>
+            </a:prstGeom>
+            <a:ln w="44450">
+              <a:tailEnd type="triangle"/>
+            </a:ln>
+          </p:spPr>
+          <p:style>
+            <a:lnRef idx="1">
+              <a:schemeClr val="accent1"/>
+            </a:lnRef>
+            <a:fillRef idx="0">
+              <a:schemeClr val="accent1"/>
+            </a:fillRef>
+            <a:effectRef idx="0">
+              <a:schemeClr val="accent1"/>
+            </a:effectRef>
+            <a:fontRef idx="minor">
+              <a:schemeClr val="tx1"/>
+            </a:fontRef>
+          </p:style>
+        </p:cxnSp>
+      </p:grpSp>
     </p:spTree>
     <p:extLst>
       <p:ext uri="{BB962C8B-B14F-4D97-AF65-F5344CB8AC3E}">
         <p14:creationId xmlns:p14="http://schemas.microsoft.com/office/powerpoint/2010/main" val="1740709950"/>
+      </p:ext>
+    </p:extLst>
+  </p:cSld>
+  <p:clrMapOvr>
+    <a:masterClrMapping/>
+  </p:clrMapOvr>
+</p:sld>
+</file>
+
+<file path=ppt/slides/slide2.xml><?xml version="1.0" encoding="utf-8"?>
+<p:sld xmlns:a="http://schemas.openxmlformats.org/drawingml/2006/main" xmlns:r="http://schemas.openxmlformats.org/officeDocument/2006/relationships" xmlns:p="http://schemas.openxmlformats.org/presentationml/2006/main">
+  <p:cSld>
+    <p:spTree>
+      <p:nvGrpSpPr>
+        <p:cNvPr id="1" name=""/>
+        <p:cNvGrpSpPr/>
+        <p:nvPr/>
+      </p:nvGrpSpPr>
+      <p:grpSpPr>
+        <a:xfrm>
+          <a:off x="0" y="0"/>
+          <a:ext cx="0" cy="0"/>
+          <a:chOff x="0" y="0"/>
+          <a:chExt cx="0" cy="0"/>
+        </a:xfrm>
+      </p:grpSpPr>
+      <p:grpSp>
+        <p:nvGrpSpPr>
+          <p:cNvPr id="2" name="Group 1">
+            <a:extLst>
+              <a:ext uri="{FF2B5EF4-FFF2-40B4-BE49-F238E27FC236}">
+                <a16:creationId xmlns:a16="http://schemas.microsoft.com/office/drawing/2014/main" id="{52EC9356-1007-EEE1-833A-E5692958E945}"/>
+              </a:ext>
+            </a:extLst>
+          </p:cNvPr>
+          <p:cNvGrpSpPr/>
+          <p:nvPr/>
+        </p:nvGrpSpPr>
+        <p:grpSpPr>
+          <a:xfrm>
+            <a:off x="270432" y="3220"/>
+            <a:ext cx="11651136" cy="6858000"/>
+            <a:chOff x="-1" y="0"/>
+            <a:chExt cx="11651136" cy="6858000"/>
+          </a:xfrm>
+        </p:grpSpPr>
+        <p:sp>
+          <p:nvSpPr>
+            <p:cNvPr id="79" name="Rectangle 78">
+              <a:extLst>
+                <a:ext uri="{FF2B5EF4-FFF2-40B4-BE49-F238E27FC236}">
+                  <a16:creationId xmlns:a16="http://schemas.microsoft.com/office/drawing/2014/main" id="{CD373FAB-D77F-BE1F-2F1A-6A3F9A2FC82D}"/>
+                </a:ext>
+              </a:extLst>
+            </p:cNvPr>
+            <p:cNvSpPr/>
+            <p:nvPr/>
+          </p:nvSpPr>
+          <p:spPr>
+            <a:xfrm>
+              <a:off x="5408765" y="1458825"/>
+              <a:ext cx="3611586" cy="4890042"/>
+            </a:xfrm>
+            <a:prstGeom prst="rect">
+              <a:avLst/>
+            </a:prstGeom>
+            <a:solidFill>
+              <a:schemeClr val="accent6">
+                <a:lumMod val="40000"/>
+                <a:lumOff val="60000"/>
+              </a:schemeClr>
+            </a:solidFill>
+          </p:spPr>
+          <p:style>
+            <a:lnRef idx="2">
+              <a:schemeClr val="accent1">
+                <a:shade val="15000"/>
+              </a:schemeClr>
+            </a:lnRef>
+            <a:fillRef idx="1">
+              <a:schemeClr val="accent1"/>
+            </a:fillRef>
+            <a:effectRef idx="0">
+              <a:schemeClr val="accent1"/>
+            </a:effectRef>
+            <a:fontRef idx="minor">
+              <a:schemeClr val="lt1"/>
+            </a:fontRef>
+          </p:style>
+          <p:txBody>
+            <a:bodyPr rtlCol="0" anchor="ctr"/>
+            <a:lstStyle/>
+            <a:p>
+              <a:pPr algn="ctr"/>
+              <a:endParaRPr lang="en-US"/>
+            </a:p>
+          </p:txBody>
+        </p:sp>
+        <p:sp>
+          <p:nvSpPr>
+            <p:cNvPr id="55" name="Rectangle 54">
+              <a:extLst>
+                <a:ext uri="{FF2B5EF4-FFF2-40B4-BE49-F238E27FC236}">
+                  <a16:creationId xmlns:a16="http://schemas.microsoft.com/office/drawing/2014/main" id="{F173E39E-D3F3-ACF9-0BF3-25CF71973377}"/>
+                </a:ext>
+              </a:extLst>
+            </p:cNvPr>
+            <p:cNvSpPr/>
+            <p:nvPr/>
+          </p:nvSpPr>
+          <p:spPr>
+            <a:xfrm>
+              <a:off x="-1" y="0"/>
+              <a:ext cx="2416829" cy="6858000"/>
+            </a:xfrm>
+            <a:prstGeom prst="rect">
+              <a:avLst/>
+            </a:prstGeom>
+            <a:solidFill>
+              <a:schemeClr val="accent1">
+                <a:lumMod val="40000"/>
+                <a:lumOff val="60000"/>
+                <a:alpha val="65000"/>
+              </a:schemeClr>
+            </a:solidFill>
+          </p:spPr>
+          <p:style>
+            <a:lnRef idx="2">
+              <a:schemeClr val="accent1">
+                <a:shade val="15000"/>
+              </a:schemeClr>
+            </a:lnRef>
+            <a:fillRef idx="1">
+              <a:schemeClr val="accent1"/>
+            </a:fillRef>
+            <a:effectRef idx="0">
+              <a:schemeClr val="accent1"/>
+            </a:effectRef>
+            <a:fontRef idx="minor">
+              <a:schemeClr val="lt1"/>
+            </a:fontRef>
+          </p:style>
+          <p:txBody>
+            <a:bodyPr rtlCol="0" anchor="ctr"/>
+            <a:lstStyle/>
+            <a:p>
+              <a:pPr algn="ctr"/>
+              <a:endParaRPr lang="en-US"/>
+            </a:p>
+          </p:txBody>
+        </p:sp>
+        <p:sp>
+          <p:nvSpPr>
+            <p:cNvPr id="7" name="TextBox 6">
+              <a:extLst>
+                <a:ext uri="{FF2B5EF4-FFF2-40B4-BE49-F238E27FC236}">
+                  <a16:creationId xmlns:a16="http://schemas.microsoft.com/office/drawing/2014/main" id="{F2386C30-C0CA-FF59-04D8-93346CE48104}"/>
+                </a:ext>
+              </a:extLst>
+            </p:cNvPr>
+            <p:cNvSpPr txBox="1"/>
+            <p:nvPr/>
+          </p:nvSpPr>
+          <p:spPr>
+            <a:xfrm>
+              <a:off x="5942448" y="1825834"/>
+              <a:ext cx="2924014" cy="523220"/>
+            </a:xfrm>
+            <a:prstGeom prst="rect">
+              <a:avLst/>
+            </a:prstGeom>
+            <a:noFill/>
+            <a:ln>
+              <a:solidFill>
+                <a:schemeClr val="tx1"/>
+              </a:solidFill>
+            </a:ln>
+          </p:spPr>
+          <p:txBody>
+            <a:bodyPr wrap="square" rtlCol="0">
+              <a:spAutoFit/>
+            </a:bodyPr>
+            <a:lstStyle/>
+            <a:p>
+              <a:r>
+                <a:rPr lang="en-US" sz="1400" dirty="0"/>
+                <a:t>Mechanistic model of how we think the world works</a:t>
+              </a:r>
+            </a:p>
+          </p:txBody>
+        </p:sp>
+        <p:cxnSp>
+          <p:nvCxnSpPr>
+            <p:cNvPr id="9" name="Straight Arrow Connector 8">
+              <a:extLst>
+                <a:ext uri="{FF2B5EF4-FFF2-40B4-BE49-F238E27FC236}">
+                  <a16:creationId xmlns:a16="http://schemas.microsoft.com/office/drawing/2014/main" id="{93514C66-EA38-D14D-B4A5-F5B9D8FE4C61}"/>
+                </a:ext>
+              </a:extLst>
+            </p:cNvPr>
+            <p:cNvCxnSpPr>
+              <a:cxnSpLocks/>
+            </p:cNvCxnSpPr>
+            <p:nvPr/>
+          </p:nvCxnSpPr>
+          <p:spPr>
+            <a:xfrm>
+              <a:off x="2394451" y="2145458"/>
+              <a:ext cx="2416828" cy="0"/>
+            </a:xfrm>
+            <a:prstGeom prst="straightConnector1">
+              <a:avLst/>
+            </a:prstGeom>
+            <a:ln w="44450">
+              <a:solidFill>
+                <a:srgbClr val="FF0000"/>
+              </a:solidFill>
+              <a:tailEnd type="triangle"/>
+            </a:ln>
+          </p:spPr>
+          <p:style>
+            <a:lnRef idx="1">
+              <a:schemeClr val="accent1"/>
+            </a:lnRef>
+            <a:fillRef idx="0">
+              <a:schemeClr val="accent1"/>
+            </a:fillRef>
+            <a:effectRef idx="0">
+              <a:schemeClr val="accent1"/>
+            </a:effectRef>
+            <a:fontRef idx="minor">
+              <a:schemeClr val="tx1"/>
+            </a:fontRef>
+          </p:style>
+        </p:cxnSp>
+        <p:sp>
+          <p:nvSpPr>
+            <p:cNvPr id="10" name="TextBox 9">
+              <a:extLst>
+                <a:ext uri="{FF2B5EF4-FFF2-40B4-BE49-F238E27FC236}">
+                  <a16:creationId xmlns:a16="http://schemas.microsoft.com/office/drawing/2014/main" id="{B20D8D8C-8929-931E-2677-B0E5ABCEE30B}"/>
+                </a:ext>
+              </a:extLst>
+            </p:cNvPr>
+            <p:cNvSpPr txBox="1"/>
+            <p:nvPr/>
+          </p:nvSpPr>
+          <p:spPr>
+            <a:xfrm>
+              <a:off x="2575345" y="1004507"/>
+              <a:ext cx="2924015" cy="523220"/>
+            </a:xfrm>
+            <a:prstGeom prst="rect">
+              <a:avLst/>
+            </a:prstGeom>
+            <a:noFill/>
+          </p:spPr>
+          <p:txBody>
+            <a:bodyPr wrap="square" rtlCol="0">
+              <a:spAutoFit/>
+            </a:bodyPr>
+            <a:lstStyle/>
+            <a:p>
+              <a:r>
+                <a:rPr lang="en-US" sz="1400" dirty="0">
+                  <a:solidFill>
+                    <a:srgbClr val="FF0000"/>
+                  </a:solidFill>
+                </a:rPr>
+                <a:t>Formulation of mathematical model</a:t>
+              </a:r>
+            </a:p>
+            <a:p>
+              <a:r>
+                <a:rPr lang="en-US" sz="1400" dirty="0" err="1">
+                  <a:solidFill>
+                    <a:srgbClr val="FF0000"/>
+                  </a:solidFill>
+                </a:rPr>
+                <a:t>Objectivising</a:t>
+              </a:r>
+              <a:r>
+                <a:rPr lang="en-US" sz="1400" dirty="0">
+                  <a:solidFill>
+                    <a:srgbClr val="FF0000"/>
+                  </a:solidFill>
+                </a:rPr>
+                <a:t> the hypothesis</a:t>
+              </a:r>
+            </a:p>
+          </p:txBody>
+        </p:sp>
+        <p:cxnSp>
+          <p:nvCxnSpPr>
+            <p:cNvPr id="11" name="Straight Arrow Connector 10">
+              <a:extLst>
+                <a:ext uri="{FF2B5EF4-FFF2-40B4-BE49-F238E27FC236}">
+                  <a16:creationId xmlns:a16="http://schemas.microsoft.com/office/drawing/2014/main" id="{75DC0105-964D-6FE6-87B2-50458A6B184F}"/>
+                </a:ext>
+              </a:extLst>
+            </p:cNvPr>
+            <p:cNvCxnSpPr>
+              <a:cxnSpLocks/>
+            </p:cNvCxnSpPr>
+            <p:nvPr/>
+          </p:nvCxnSpPr>
+          <p:spPr>
+            <a:xfrm>
+              <a:off x="2400074" y="3103725"/>
+              <a:ext cx="2178124" cy="0"/>
+            </a:xfrm>
+            <a:prstGeom prst="straightConnector1">
+              <a:avLst/>
+            </a:prstGeom>
+            <a:ln w="44450">
+              <a:solidFill>
+                <a:srgbClr val="FF0000"/>
+              </a:solidFill>
+              <a:tailEnd type="triangle"/>
+            </a:ln>
+          </p:spPr>
+          <p:style>
+            <a:lnRef idx="1">
+              <a:schemeClr val="accent1"/>
+            </a:lnRef>
+            <a:fillRef idx="0">
+              <a:schemeClr val="accent1"/>
+            </a:fillRef>
+            <a:effectRef idx="0">
+              <a:schemeClr val="accent1"/>
+            </a:effectRef>
+            <a:fontRef idx="minor">
+              <a:schemeClr val="tx1"/>
+            </a:fontRef>
+          </p:style>
+        </p:cxnSp>
+        <p:sp>
+          <p:nvSpPr>
+            <p:cNvPr id="12" name="TextBox 11">
+              <a:extLst>
+                <a:ext uri="{FF2B5EF4-FFF2-40B4-BE49-F238E27FC236}">
+                  <a16:creationId xmlns:a16="http://schemas.microsoft.com/office/drawing/2014/main" id="{A8CAF2C4-DA24-4092-D9A8-C97E5A751518}"/>
+                </a:ext>
+              </a:extLst>
+            </p:cNvPr>
+            <p:cNvSpPr txBox="1"/>
+            <p:nvPr/>
+          </p:nvSpPr>
+          <p:spPr>
+            <a:xfrm>
+              <a:off x="6389567" y="184058"/>
+              <a:ext cx="5261568" cy="1384995"/>
+            </a:xfrm>
+            <a:prstGeom prst="rect">
+              <a:avLst/>
+            </a:prstGeom>
+            <a:noFill/>
+          </p:spPr>
+          <p:txBody>
+            <a:bodyPr wrap="square" rtlCol="0">
+              <a:spAutoFit/>
+            </a:bodyPr>
+            <a:lstStyle/>
+            <a:p>
+              <a:pPr marL="285750" indent="-285750">
+                <a:buFont typeface="Arial" panose="020B0604020202020204" pitchFamily="34" charset="0"/>
+                <a:buChar char="•"/>
+              </a:pPr>
+              <a:r>
+                <a:rPr lang="en-US" sz="1200" dirty="0"/>
+                <a:t>What variables influence y?</a:t>
+              </a:r>
+            </a:p>
+            <a:p>
+              <a:pPr marL="285750" indent="-285750">
+                <a:buFont typeface="Arial" panose="020B0604020202020204" pitchFamily="34" charset="0"/>
+                <a:buChar char="•"/>
+              </a:pPr>
+              <a:r>
+                <a:rPr lang="en-US" sz="1200" dirty="0"/>
+                <a:t>In what way? Linear/nonlinear relationship?</a:t>
+              </a:r>
+            </a:p>
+            <a:p>
+              <a:pPr marL="285750" indent="-285750">
+                <a:buFont typeface="Arial" panose="020B0604020202020204" pitchFamily="34" charset="0"/>
+                <a:buChar char="•"/>
+              </a:pPr>
+              <a:r>
+                <a:rPr lang="en-US" sz="1200" dirty="0"/>
+                <a:t>How much/effect sizes?</a:t>
+              </a:r>
+            </a:p>
+            <a:p>
+              <a:pPr marL="285750" indent="-285750">
+                <a:buFont typeface="Arial" panose="020B0604020202020204" pitchFamily="34" charset="0"/>
+                <a:buChar char="•"/>
+              </a:pPr>
+              <a:r>
+                <a:rPr lang="en-US" sz="1200" dirty="0"/>
+                <a:t>How consistent </a:t>
+              </a:r>
+              <a:r>
+                <a:rPr lang="en-US" sz="1200" dirty="0" err="1"/>
+                <a:t>eg.</a:t>
+              </a:r>
+              <a:r>
+                <a:rPr lang="en-US" sz="1200" dirty="0"/>
+                <a:t> What variation can be expected?</a:t>
+              </a:r>
+            </a:p>
+            <a:p>
+              <a:pPr marL="285750" indent="-285750">
+                <a:buFont typeface="Arial" panose="020B0604020202020204" pitchFamily="34" charset="0"/>
+                <a:buChar char="•"/>
+              </a:pPr>
+              <a:r>
+                <a:rPr lang="en-US" sz="1200" dirty="0"/>
+                <a:t>Background noise: Given all other factors, how much additional ‘unexplained’ variation can be expected?</a:t>
+              </a:r>
+            </a:p>
+            <a:p>
+              <a:pPr marL="285750" indent="-285750">
+                <a:buFont typeface="Arial" panose="020B0604020202020204" pitchFamily="34" charset="0"/>
+                <a:buChar char="•"/>
+              </a:pPr>
+              <a:endParaRPr lang="en-US" sz="1200" dirty="0"/>
+            </a:p>
+          </p:txBody>
+        </p:sp>
+        <p:sp>
+          <p:nvSpPr>
+            <p:cNvPr id="13" name="TextBox 12">
+              <a:extLst>
+                <a:ext uri="{FF2B5EF4-FFF2-40B4-BE49-F238E27FC236}">
+                  <a16:creationId xmlns:a16="http://schemas.microsoft.com/office/drawing/2014/main" id="{602E4EC8-000A-89F3-B291-A8131B8DBC8F}"/>
+                </a:ext>
+              </a:extLst>
+            </p:cNvPr>
+            <p:cNvSpPr txBox="1"/>
+            <p:nvPr/>
+          </p:nvSpPr>
+          <p:spPr>
+            <a:xfrm>
+              <a:off x="776416" y="3014655"/>
+              <a:ext cx="1098298" cy="307777"/>
+            </a:xfrm>
+            <a:prstGeom prst="rect">
+              <a:avLst/>
+            </a:prstGeom>
+            <a:noFill/>
+            <a:ln>
+              <a:solidFill>
+                <a:schemeClr val="tx1"/>
+              </a:solidFill>
+            </a:ln>
+          </p:spPr>
+          <p:txBody>
+            <a:bodyPr wrap="square" rtlCol="0">
+              <a:spAutoFit/>
+            </a:bodyPr>
+            <a:lstStyle/>
+            <a:p>
+              <a:r>
+                <a:rPr lang="en-US" sz="1400" dirty="0"/>
+                <a:t>Experiment</a:t>
+              </a:r>
+            </a:p>
+          </p:txBody>
+        </p:sp>
+        <p:sp>
+          <p:nvSpPr>
+            <p:cNvPr id="14" name="TextBox 13">
+              <a:extLst>
+                <a:ext uri="{FF2B5EF4-FFF2-40B4-BE49-F238E27FC236}">
+                  <a16:creationId xmlns:a16="http://schemas.microsoft.com/office/drawing/2014/main" id="{E4915D2A-F31F-59B5-569B-FFA72D480B82}"/>
+                </a:ext>
+              </a:extLst>
+            </p:cNvPr>
+            <p:cNvSpPr txBox="1"/>
+            <p:nvPr/>
+          </p:nvSpPr>
+          <p:spPr>
+            <a:xfrm>
+              <a:off x="776416" y="4423123"/>
+              <a:ext cx="1264494" cy="307777"/>
+            </a:xfrm>
+            <a:prstGeom prst="rect">
+              <a:avLst/>
+            </a:prstGeom>
+            <a:noFill/>
+            <a:ln>
+              <a:solidFill>
+                <a:schemeClr val="tx1"/>
+              </a:solidFill>
+            </a:ln>
+          </p:spPr>
+          <p:txBody>
+            <a:bodyPr wrap="square" rtlCol="0">
+              <a:spAutoFit/>
+            </a:bodyPr>
+            <a:lstStyle/>
+            <a:p>
+              <a:r>
+                <a:rPr lang="en-US" sz="1400" dirty="0"/>
+                <a:t>Stats/Analysis</a:t>
+              </a:r>
+            </a:p>
+          </p:txBody>
+        </p:sp>
+        <p:sp>
+          <p:nvSpPr>
+            <p:cNvPr id="15" name="TextBox 14">
+              <a:extLst>
+                <a:ext uri="{FF2B5EF4-FFF2-40B4-BE49-F238E27FC236}">
+                  <a16:creationId xmlns:a16="http://schemas.microsoft.com/office/drawing/2014/main" id="{C2EE0128-022E-6BD7-1F0E-27A0B0083E27}"/>
+                </a:ext>
+              </a:extLst>
+            </p:cNvPr>
+            <p:cNvSpPr txBox="1"/>
+            <p:nvPr/>
+          </p:nvSpPr>
+          <p:spPr>
+            <a:xfrm>
+              <a:off x="776416" y="5725010"/>
+              <a:ext cx="1014801" cy="307777"/>
+            </a:xfrm>
+            <a:prstGeom prst="rect">
+              <a:avLst/>
+            </a:prstGeom>
+            <a:noFill/>
+            <a:ln>
+              <a:solidFill>
+                <a:schemeClr val="tx1"/>
+              </a:solidFill>
+            </a:ln>
+          </p:spPr>
+          <p:txBody>
+            <a:bodyPr wrap="square" rtlCol="0">
+              <a:spAutoFit/>
+            </a:bodyPr>
+            <a:lstStyle/>
+            <a:p>
+              <a:r>
+                <a:rPr lang="en-US" sz="1400" dirty="0"/>
+                <a:t>Conclusion</a:t>
+              </a:r>
+            </a:p>
+          </p:txBody>
+        </p:sp>
+        <p:sp>
+          <p:nvSpPr>
+            <p:cNvPr id="16" name="TextBox 15">
+              <a:extLst>
+                <a:ext uri="{FF2B5EF4-FFF2-40B4-BE49-F238E27FC236}">
+                  <a16:creationId xmlns:a16="http://schemas.microsoft.com/office/drawing/2014/main" id="{A351DDDC-93E4-DFC8-7386-F91460530D40}"/>
+                </a:ext>
+              </a:extLst>
+            </p:cNvPr>
+            <p:cNvSpPr txBox="1"/>
+            <p:nvPr/>
+          </p:nvSpPr>
+          <p:spPr>
+            <a:xfrm>
+              <a:off x="776416" y="2084025"/>
+              <a:ext cx="1014803" cy="307777"/>
+            </a:xfrm>
+            <a:prstGeom prst="rect">
+              <a:avLst/>
+            </a:prstGeom>
+            <a:noFill/>
+            <a:ln>
+              <a:solidFill>
+                <a:schemeClr val="tx1"/>
+              </a:solidFill>
+            </a:ln>
+          </p:spPr>
+          <p:txBody>
+            <a:bodyPr wrap="square" rtlCol="0">
+              <a:spAutoFit/>
+            </a:bodyPr>
+            <a:lstStyle/>
+            <a:p>
+              <a:r>
+                <a:rPr lang="en-US" sz="1400" dirty="0"/>
+                <a:t>Hypothesis</a:t>
+              </a:r>
+            </a:p>
+          </p:txBody>
+        </p:sp>
+        <p:cxnSp>
+          <p:nvCxnSpPr>
+            <p:cNvPr id="17" name="Straight Arrow Connector 16">
+              <a:extLst>
+                <a:ext uri="{FF2B5EF4-FFF2-40B4-BE49-F238E27FC236}">
+                  <a16:creationId xmlns:a16="http://schemas.microsoft.com/office/drawing/2014/main" id="{D885FF0A-823C-D2D6-B7C5-E458EE5556A6}"/>
+                </a:ext>
+              </a:extLst>
+            </p:cNvPr>
+            <p:cNvCxnSpPr>
+              <a:cxnSpLocks/>
+            </p:cNvCxnSpPr>
+            <p:nvPr/>
+          </p:nvCxnSpPr>
+          <p:spPr>
+            <a:xfrm>
+              <a:off x="1354424" y="2491435"/>
+              <a:ext cx="0" cy="523220"/>
+            </a:xfrm>
+            <a:prstGeom prst="straightConnector1">
+              <a:avLst/>
+            </a:prstGeom>
+            <a:ln w="44450">
+              <a:tailEnd type="triangle"/>
+            </a:ln>
+          </p:spPr>
+          <p:style>
+            <a:lnRef idx="1">
+              <a:schemeClr val="accent1"/>
+            </a:lnRef>
+            <a:fillRef idx="0">
+              <a:schemeClr val="accent1"/>
+            </a:fillRef>
+            <a:effectRef idx="0">
+              <a:schemeClr val="accent1"/>
+            </a:effectRef>
+            <a:fontRef idx="minor">
+              <a:schemeClr val="tx1"/>
+            </a:fontRef>
+          </p:style>
+        </p:cxnSp>
+        <p:sp>
+          <p:nvSpPr>
+            <p:cNvPr id="20" name="TextBox 19">
+              <a:extLst>
+                <a:ext uri="{FF2B5EF4-FFF2-40B4-BE49-F238E27FC236}">
+                  <a16:creationId xmlns:a16="http://schemas.microsoft.com/office/drawing/2014/main" id="{CF858E07-48A4-824C-8E7E-4A23DB854A95}"/>
+                </a:ext>
+              </a:extLst>
+            </p:cNvPr>
+            <p:cNvSpPr txBox="1"/>
+            <p:nvPr/>
+          </p:nvSpPr>
+          <p:spPr>
+            <a:xfrm>
+              <a:off x="2353072" y="2171917"/>
+              <a:ext cx="2416829" cy="400110"/>
+            </a:xfrm>
+            <a:prstGeom prst="rect">
+              <a:avLst/>
+            </a:prstGeom>
+            <a:noFill/>
+          </p:spPr>
+          <p:txBody>
+            <a:bodyPr wrap="square" rtlCol="0">
+              <a:spAutoFit/>
+            </a:bodyPr>
+            <a:lstStyle/>
+            <a:p>
+              <a:r>
+                <a:rPr lang="en-US" sz="1000" dirty="0"/>
+                <a:t>Not testable (</a:t>
+              </a:r>
+              <a:r>
+                <a:rPr lang="en-US" sz="1000" dirty="0" err="1"/>
+                <a:t>vage</a:t>
+              </a:r>
+              <a:r>
+                <a:rPr lang="en-US" sz="1000" dirty="0"/>
+                <a:t>, subjective, unrealistic)</a:t>
+              </a:r>
+            </a:p>
+            <a:p>
+              <a:r>
+                <a:rPr lang="en-US" sz="1000" dirty="0" err="1"/>
+                <a:t>i.E</a:t>
+              </a:r>
+              <a:r>
+                <a:rPr lang="en-US" sz="1000" dirty="0"/>
+                <a:t> null hypothesis gets rejected in any case</a:t>
+              </a:r>
+            </a:p>
+          </p:txBody>
+        </p:sp>
+        <p:cxnSp>
+          <p:nvCxnSpPr>
+            <p:cNvPr id="21" name="Straight Arrow Connector 20">
+              <a:extLst>
+                <a:ext uri="{FF2B5EF4-FFF2-40B4-BE49-F238E27FC236}">
+                  <a16:creationId xmlns:a16="http://schemas.microsoft.com/office/drawing/2014/main" id="{54355373-28A7-F198-D63B-F5443138AA01}"/>
+                </a:ext>
+              </a:extLst>
+            </p:cNvPr>
+            <p:cNvCxnSpPr>
+              <a:cxnSpLocks/>
+            </p:cNvCxnSpPr>
+            <p:nvPr/>
+          </p:nvCxnSpPr>
+          <p:spPr>
+            <a:xfrm>
+              <a:off x="2400074" y="4566206"/>
+              <a:ext cx="1315450" cy="0"/>
+            </a:xfrm>
+            <a:prstGeom prst="straightConnector1">
+              <a:avLst/>
+            </a:prstGeom>
+            <a:ln w="44450">
+              <a:solidFill>
+                <a:srgbClr val="FF0000"/>
+              </a:solidFill>
+              <a:tailEnd type="triangle"/>
+            </a:ln>
+          </p:spPr>
+          <p:style>
+            <a:lnRef idx="1">
+              <a:schemeClr val="accent1"/>
+            </a:lnRef>
+            <a:fillRef idx="0">
+              <a:schemeClr val="accent1"/>
+            </a:fillRef>
+            <a:effectRef idx="0">
+              <a:schemeClr val="accent1"/>
+            </a:effectRef>
+            <a:fontRef idx="minor">
+              <a:schemeClr val="tx1"/>
+            </a:fontRef>
+          </p:style>
+        </p:cxnSp>
+        <p:sp>
+          <p:nvSpPr>
+            <p:cNvPr id="22" name="TextBox 21">
+              <a:extLst>
+                <a:ext uri="{FF2B5EF4-FFF2-40B4-BE49-F238E27FC236}">
+                  <a16:creationId xmlns:a16="http://schemas.microsoft.com/office/drawing/2014/main" id="{BF5F8212-93D0-86BE-8409-639563395B20}"/>
+                </a:ext>
+              </a:extLst>
+            </p:cNvPr>
+            <p:cNvSpPr txBox="1"/>
+            <p:nvPr/>
+          </p:nvSpPr>
+          <p:spPr>
+            <a:xfrm>
+              <a:off x="2400074" y="4601826"/>
+              <a:ext cx="1875145" cy="246221"/>
+            </a:xfrm>
+            <a:prstGeom prst="rect">
+              <a:avLst/>
+            </a:prstGeom>
+            <a:noFill/>
+          </p:spPr>
+          <p:txBody>
+            <a:bodyPr wrap="square" rtlCol="0">
+              <a:spAutoFit/>
+            </a:bodyPr>
+            <a:lstStyle/>
+            <a:p>
+              <a:r>
+                <a:rPr lang="en-US" sz="1000" dirty="0"/>
+                <a:t>Mathematical artefact, </a:t>
+              </a:r>
+            </a:p>
+          </p:txBody>
+        </p:sp>
+        <p:cxnSp>
+          <p:nvCxnSpPr>
+            <p:cNvPr id="23" name="Straight Arrow Connector 22">
+              <a:extLst>
+                <a:ext uri="{FF2B5EF4-FFF2-40B4-BE49-F238E27FC236}">
+                  <a16:creationId xmlns:a16="http://schemas.microsoft.com/office/drawing/2014/main" id="{CDE94995-5F83-6A36-176C-D3CB825C3E9F}"/>
+                </a:ext>
+              </a:extLst>
+            </p:cNvPr>
+            <p:cNvCxnSpPr>
+              <a:cxnSpLocks/>
+            </p:cNvCxnSpPr>
+            <p:nvPr/>
+          </p:nvCxnSpPr>
+          <p:spPr>
+            <a:xfrm flipV="1">
+              <a:off x="2404588" y="5868093"/>
+              <a:ext cx="1376956" cy="10805"/>
+            </a:xfrm>
+            <a:prstGeom prst="straightConnector1">
+              <a:avLst/>
+            </a:prstGeom>
+            <a:ln w="44450">
+              <a:solidFill>
+                <a:srgbClr val="FF0000"/>
+              </a:solidFill>
+              <a:tailEnd type="triangle"/>
+            </a:ln>
+          </p:spPr>
+          <p:style>
+            <a:lnRef idx="1">
+              <a:schemeClr val="accent1"/>
+            </a:lnRef>
+            <a:fillRef idx="0">
+              <a:schemeClr val="accent1"/>
+            </a:fillRef>
+            <a:effectRef idx="0">
+              <a:schemeClr val="accent1"/>
+            </a:effectRef>
+            <a:fontRef idx="minor">
+              <a:schemeClr val="tx1"/>
+            </a:fontRef>
+          </p:style>
+        </p:cxnSp>
+        <p:sp>
+          <p:nvSpPr>
+            <p:cNvPr id="24" name="TextBox 23">
+              <a:extLst>
+                <a:ext uri="{FF2B5EF4-FFF2-40B4-BE49-F238E27FC236}">
+                  <a16:creationId xmlns:a16="http://schemas.microsoft.com/office/drawing/2014/main" id="{B2E543B3-41A0-FF8E-A23E-CC4CFB28CBE9}"/>
+                </a:ext>
+              </a:extLst>
+            </p:cNvPr>
+            <p:cNvSpPr txBox="1"/>
+            <p:nvPr/>
+          </p:nvSpPr>
+          <p:spPr>
+            <a:xfrm>
+              <a:off x="2388325" y="5923195"/>
+              <a:ext cx="2317730" cy="246221"/>
+            </a:xfrm>
+            <a:prstGeom prst="rect">
+              <a:avLst/>
+            </a:prstGeom>
+            <a:noFill/>
+          </p:spPr>
+          <p:txBody>
+            <a:bodyPr wrap="square" rtlCol="0">
+              <a:spAutoFit/>
+            </a:bodyPr>
+            <a:lstStyle/>
+            <a:p>
+              <a:r>
+                <a:rPr lang="en-US" sz="1000" dirty="0"/>
+                <a:t>Overconfident, yes/no simplification</a:t>
+              </a:r>
+            </a:p>
+          </p:txBody>
+        </p:sp>
+        <p:cxnSp>
+          <p:nvCxnSpPr>
+            <p:cNvPr id="27" name="Straight Arrow Connector 26">
+              <a:extLst>
+                <a:ext uri="{FF2B5EF4-FFF2-40B4-BE49-F238E27FC236}">
+                  <a16:creationId xmlns:a16="http://schemas.microsoft.com/office/drawing/2014/main" id="{8C72B8E2-AAEE-625D-639B-B10610A4E9C1}"/>
+                </a:ext>
+              </a:extLst>
+            </p:cNvPr>
+            <p:cNvCxnSpPr>
+              <a:cxnSpLocks/>
+            </p:cNvCxnSpPr>
+            <p:nvPr/>
+          </p:nvCxnSpPr>
+          <p:spPr>
+            <a:xfrm>
+              <a:off x="1478070" y="1614940"/>
+              <a:ext cx="10241" cy="405605"/>
+            </a:xfrm>
+            <a:prstGeom prst="straightConnector1">
+              <a:avLst/>
+            </a:prstGeom>
+            <a:ln w="44450">
+              <a:tailEnd type="triangle"/>
+            </a:ln>
+          </p:spPr>
+          <p:style>
+            <a:lnRef idx="1">
+              <a:schemeClr val="accent1"/>
+            </a:lnRef>
+            <a:fillRef idx="0">
+              <a:schemeClr val="accent1"/>
+            </a:fillRef>
+            <a:effectRef idx="0">
+              <a:schemeClr val="accent1"/>
+            </a:effectRef>
+            <a:fontRef idx="minor">
+              <a:schemeClr val="tx1"/>
+            </a:fontRef>
+          </p:style>
+        </p:cxnSp>
+        <p:cxnSp>
+          <p:nvCxnSpPr>
+            <p:cNvPr id="33" name="Straight Arrow Connector 32">
+              <a:extLst>
+                <a:ext uri="{FF2B5EF4-FFF2-40B4-BE49-F238E27FC236}">
+                  <a16:creationId xmlns:a16="http://schemas.microsoft.com/office/drawing/2014/main" id="{9029ED03-9E50-12A9-E50D-25B8578EA8C6}"/>
+                </a:ext>
+              </a:extLst>
+            </p:cNvPr>
+            <p:cNvCxnSpPr>
+              <a:cxnSpLocks/>
+            </p:cNvCxnSpPr>
+            <p:nvPr/>
+          </p:nvCxnSpPr>
+          <p:spPr>
+            <a:xfrm>
+              <a:off x="1354424" y="3630209"/>
+              <a:ext cx="0" cy="653692"/>
+            </a:xfrm>
+            <a:prstGeom prst="straightConnector1">
+              <a:avLst/>
+            </a:prstGeom>
+            <a:ln w="44450">
+              <a:tailEnd type="triangle"/>
+            </a:ln>
+          </p:spPr>
+          <p:style>
+            <a:lnRef idx="1">
+              <a:schemeClr val="accent1"/>
+            </a:lnRef>
+            <a:fillRef idx="0">
+              <a:schemeClr val="accent1"/>
+            </a:fillRef>
+            <a:effectRef idx="0">
+              <a:schemeClr val="accent1"/>
+            </a:effectRef>
+            <a:fontRef idx="minor">
+              <a:schemeClr val="tx1"/>
+            </a:fontRef>
+          </p:style>
+        </p:cxnSp>
+        <p:cxnSp>
+          <p:nvCxnSpPr>
+            <p:cNvPr id="34" name="Straight Arrow Connector 33">
+              <a:extLst>
+                <a:ext uri="{FF2B5EF4-FFF2-40B4-BE49-F238E27FC236}">
+                  <a16:creationId xmlns:a16="http://schemas.microsoft.com/office/drawing/2014/main" id="{2AD5E1AF-C16E-4D2C-9DEC-03F1E4D0EC20}"/>
+                </a:ext>
+              </a:extLst>
+            </p:cNvPr>
+            <p:cNvCxnSpPr>
+              <a:cxnSpLocks/>
+            </p:cNvCxnSpPr>
+            <p:nvPr/>
+          </p:nvCxnSpPr>
+          <p:spPr>
+            <a:xfrm flipH="1">
+              <a:off x="1454912" y="4947781"/>
+              <a:ext cx="23158" cy="576916"/>
+            </a:xfrm>
+            <a:prstGeom prst="straightConnector1">
+              <a:avLst/>
+            </a:prstGeom>
+            <a:ln w="44450">
+              <a:tailEnd type="triangle"/>
+            </a:ln>
+          </p:spPr>
+          <p:style>
+            <a:lnRef idx="1">
+              <a:schemeClr val="accent1"/>
+            </a:lnRef>
+            <a:fillRef idx="0">
+              <a:schemeClr val="accent1"/>
+            </a:fillRef>
+            <a:effectRef idx="0">
+              <a:schemeClr val="accent1"/>
+            </a:effectRef>
+            <a:fontRef idx="minor">
+              <a:schemeClr val="tx1"/>
+            </a:fontRef>
+          </p:style>
+        </p:cxnSp>
+        <p:sp>
+          <p:nvSpPr>
+            <p:cNvPr id="37" name="TextBox 36">
+              <a:extLst>
+                <a:ext uri="{FF2B5EF4-FFF2-40B4-BE49-F238E27FC236}">
+                  <a16:creationId xmlns:a16="http://schemas.microsoft.com/office/drawing/2014/main" id="{8E6C68ED-93DB-1DCD-501F-984C19E9AA23}"/>
+                </a:ext>
+              </a:extLst>
+            </p:cNvPr>
+            <p:cNvSpPr txBox="1"/>
+            <p:nvPr/>
+          </p:nvSpPr>
+          <p:spPr>
+            <a:xfrm>
+              <a:off x="5940688" y="3769208"/>
+              <a:ext cx="1441078" cy="307777"/>
+            </a:xfrm>
+            <a:prstGeom prst="rect">
+              <a:avLst/>
+            </a:prstGeom>
+            <a:noFill/>
+            <a:ln>
+              <a:solidFill>
+                <a:schemeClr val="tx1"/>
+              </a:solidFill>
+            </a:ln>
+          </p:spPr>
+          <p:txBody>
+            <a:bodyPr wrap="square" rtlCol="0">
+              <a:spAutoFit/>
+            </a:bodyPr>
+            <a:lstStyle/>
+            <a:p>
+              <a:r>
+                <a:rPr lang="en-US" sz="1400" dirty="0"/>
+                <a:t>Fake dataset</a:t>
+              </a:r>
+            </a:p>
+          </p:txBody>
+        </p:sp>
+        <p:sp>
+          <p:nvSpPr>
+            <p:cNvPr id="38" name="TextBox 37">
+              <a:extLst>
+                <a:ext uri="{FF2B5EF4-FFF2-40B4-BE49-F238E27FC236}">
+                  <a16:creationId xmlns:a16="http://schemas.microsoft.com/office/drawing/2014/main" id="{40C88CFB-E5D5-E752-7033-84A3463F85C2}"/>
+                </a:ext>
+              </a:extLst>
+            </p:cNvPr>
+            <p:cNvSpPr txBox="1"/>
+            <p:nvPr/>
+          </p:nvSpPr>
+          <p:spPr>
+            <a:xfrm>
+              <a:off x="5524609" y="4872449"/>
+              <a:ext cx="3187965" cy="954107"/>
+            </a:xfrm>
+            <a:prstGeom prst="rect">
+              <a:avLst/>
+            </a:prstGeom>
+            <a:noFill/>
+            <a:ln>
+              <a:solidFill>
+                <a:schemeClr val="tx1"/>
+              </a:solidFill>
+            </a:ln>
+          </p:spPr>
+          <p:txBody>
+            <a:bodyPr wrap="square" rtlCol="0">
+              <a:spAutoFit/>
+            </a:bodyPr>
+            <a:lstStyle/>
+            <a:p>
+              <a:r>
+                <a:rPr lang="en-US" sz="1400" dirty="0"/>
+                <a:t>Is this the pattern we expect? </a:t>
+              </a:r>
+            </a:p>
+            <a:p>
+              <a:r>
+                <a:rPr lang="en-US" sz="1400" dirty="0"/>
+                <a:t>Statistical power? </a:t>
+              </a:r>
+            </a:p>
+            <a:p>
+              <a:r>
+                <a:rPr lang="en-US" sz="1400" dirty="0"/>
+                <a:t>Enough confidence for predictions?</a:t>
+              </a:r>
+            </a:p>
+            <a:p>
+              <a:r>
+                <a:rPr lang="en-US" sz="1400" dirty="0"/>
+                <a:t>Is our model appropriate?  </a:t>
+              </a:r>
+            </a:p>
+          </p:txBody>
+        </p:sp>
+        <p:cxnSp>
+          <p:nvCxnSpPr>
+            <p:cNvPr id="39" name="Straight Arrow Connector 38">
+              <a:extLst>
+                <a:ext uri="{FF2B5EF4-FFF2-40B4-BE49-F238E27FC236}">
+                  <a16:creationId xmlns:a16="http://schemas.microsoft.com/office/drawing/2014/main" id="{ABC5A5FD-F74D-122D-CE3D-83F557B56A89}"/>
+                </a:ext>
+              </a:extLst>
+            </p:cNvPr>
+            <p:cNvCxnSpPr>
+              <a:cxnSpLocks/>
+            </p:cNvCxnSpPr>
+            <p:nvPr/>
+          </p:nvCxnSpPr>
+          <p:spPr>
+            <a:xfrm>
+              <a:off x="6110568" y="2349054"/>
+              <a:ext cx="5383" cy="1399049"/>
+            </a:xfrm>
+            <a:prstGeom prst="straightConnector1">
+              <a:avLst/>
+            </a:prstGeom>
+            <a:ln w="44450">
+              <a:tailEnd type="triangle"/>
+            </a:ln>
+          </p:spPr>
+          <p:style>
+            <a:lnRef idx="1">
+              <a:schemeClr val="accent1"/>
+            </a:lnRef>
+            <a:fillRef idx="0">
+              <a:schemeClr val="accent1"/>
+            </a:fillRef>
+            <a:effectRef idx="0">
+              <a:schemeClr val="accent1"/>
+            </a:effectRef>
+            <a:fontRef idx="minor">
+              <a:schemeClr val="tx1"/>
+            </a:fontRef>
+          </p:style>
+        </p:cxnSp>
+        <p:sp>
+          <p:nvSpPr>
+            <p:cNvPr id="40" name="TextBox 39">
+              <a:extLst>
+                <a:ext uri="{FF2B5EF4-FFF2-40B4-BE49-F238E27FC236}">
+                  <a16:creationId xmlns:a16="http://schemas.microsoft.com/office/drawing/2014/main" id="{A99C6D87-6D4B-55BB-57CD-D12928D0E610}"/>
+                </a:ext>
+              </a:extLst>
+            </p:cNvPr>
+            <p:cNvSpPr txBox="1"/>
+            <p:nvPr/>
+          </p:nvSpPr>
+          <p:spPr>
+            <a:xfrm>
+              <a:off x="2353072" y="3199321"/>
+              <a:ext cx="2352983" cy="246221"/>
+            </a:xfrm>
+            <a:prstGeom prst="rect">
+              <a:avLst/>
+            </a:prstGeom>
+            <a:noFill/>
+          </p:spPr>
+          <p:txBody>
+            <a:bodyPr wrap="square" rtlCol="0">
+              <a:spAutoFit/>
+            </a:bodyPr>
+            <a:lstStyle/>
+            <a:p>
+              <a:r>
+                <a:rPr lang="en-US" sz="1000" dirty="0"/>
+                <a:t>Poor design, not enough replication</a:t>
+              </a:r>
+            </a:p>
+          </p:txBody>
+        </p:sp>
+        <p:sp>
+          <p:nvSpPr>
+            <p:cNvPr id="41" name="TextBox 40">
+              <a:extLst>
+                <a:ext uri="{FF2B5EF4-FFF2-40B4-BE49-F238E27FC236}">
+                  <a16:creationId xmlns:a16="http://schemas.microsoft.com/office/drawing/2014/main" id="{653699F2-5679-FD73-FEC0-E1FDAA97102F}"/>
+                </a:ext>
+              </a:extLst>
+            </p:cNvPr>
+            <p:cNvSpPr txBox="1"/>
+            <p:nvPr/>
+          </p:nvSpPr>
+          <p:spPr>
+            <a:xfrm>
+              <a:off x="23480" y="184058"/>
+              <a:ext cx="2464230" cy="307777"/>
+            </a:xfrm>
+            <a:prstGeom prst="rect">
+              <a:avLst/>
+            </a:prstGeom>
+            <a:noFill/>
+            <a:ln>
+              <a:solidFill>
+                <a:schemeClr val="tx1"/>
+              </a:solidFill>
+            </a:ln>
+          </p:spPr>
+          <p:txBody>
+            <a:bodyPr wrap="square" rtlCol="0">
+              <a:spAutoFit/>
+            </a:bodyPr>
+            <a:lstStyle/>
+            <a:p>
+              <a:r>
+                <a:rPr lang="en-US" sz="1400" dirty="0"/>
+                <a:t>Scientific Knowledge/Literature</a:t>
+              </a:r>
+            </a:p>
+          </p:txBody>
+        </p:sp>
+        <p:sp>
+          <p:nvSpPr>
+            <p:cNvPr id="42" name="TextBox 41">
+              <a:extLst>
+                <a:ext uri="{FF2B5EF4-FFF2-40B4-BE49-F238E27FC236}">
+                  <a16:creationId xmlns:a16="http://schemas.microsoft.com/office/drawing/2014/main" id="{E90FBD47-27A3-9432-D3E6-5AF7092FDB5C}"/>
+                </a:ext>
+              </a:extLst>
+            </p:cNvPr>
+            <p:cNvSpPr txBox="1"/>
+            <p:nvPr/>
+          </p:nvSpPr>
+          <p:spPr>
+            <a:xfrm>
+              <a:off x="776416" y="1283618"/>
+              <a:ext cx="1353005" cy="307777"/>
+            </a:xfrm>
+            <a:prstGeom prst="rect">
+              <a:avLst/>
+            </a:prstGeom>
+            <a:noFill/>
+            <a:ln>
+              <a:solidFill>
+                <a:schemeClr val="tx1"/>
+              </a:solidFill>
+            </a:ln>
+          </p:spPr>
+          <p:txBody>
+            <a:bodyPr wrap="square" rtlCol="0">
+              <a:spAutoFit/>
+            </a:bodyPr>
+            <a:lstStyle/>
+            <a:p>
+              <a:r>
+                <a:rPr lang="en-US" sz="1400" dirty="0"/>
+                <a:t>Knowledge gap</a:t>
+              </a:r>
+            </a:p>
+          </p:txBody>
+        </p:sp>
+        <p:sp>
+          <p:nvSpPr>
+            <p:cNvPr id="56" name="TextBox 55">
+              <a:extLst>
+                <a:ext uri="{FF2B5EF4-FFF2-40B4-BE49-F238E27FC236}">
+                  <a16:creationId xmlns:a16="http://schemas.microsoft.com/office/drawing/2014/main" id="{F59662C8-7E70-19B9-5D01-A2ED4253D572}"/>
+                </a:ext>
+              </a:extLst>
+            </p:cNvPr>
+            <p:cNvSpPr txBox="1"/>
+            <p:nvPr/>
+          </p:nvSpPr>
+          <p:spPr>
+            <a:xfrm rot="16200000">
+              <a:off x="-1510521" y="2816773"/>
+              <a:ext cx="3520478" cy="307777"/>
+            </a:xfrm>
+            <a:prstGeom prst="rect">
+              <a:avLst/>
+            </a:prstGeom>
+            <a:noFill/>
+            <a:ln>
+              <a:noFill/>
+            </a:ln>
+          </p:spPr>
+          <p:txBody>
+            <a:bodyPr wrap="square" rtlCol="0">
+              <a:spAutoFit/>
+            </a:bodyPr>
+            <a:lstStyle/>
+            <a:p>
+              <a:r>
+                <a:rPr lang="en-US" sz="1400" dirty="0"/>
+                <a:t>Common scientific workflow</a:t>
+              </a:r>
+            </a:p>
+          </p:txBody>
+        </p:sp>
+        <p:cxnSp>
+          <p:nvCxnSpPr>
+            <p:cNvPr id="57" name="Straight Arrow Connector 56">
+              <a:extLst>
+                <a:ext uri="{FF2B5EF4-FFF2-40B4-BE49-F238E27FC236}">
+                  <a16:creationId xmlns:a16="http://schemas.microsoft.com/office/drawing/2014/main" id="{2AB761F9-52A0-5035-88D1-0DF99C8A54CF}"/>
+                </a:ext>
+              </a:extLst>
+            </p:cNvPr>
+            <p:cNvCxnSpPr>
+              <a:cxnSpLocks/>
+            </p:cNvCxnSpPr>
+            <p:nvPr/>
+          </p:nvCxnSpPr>
+          <p:spPr>
+            <a:xfrm>
+              <a:off x="1478070" y="645724"/>
+              <a:ext cx="0" cy="620393"/>
+            </a:xfrm>
+            <a:prstGeom prst="straightConnector1">
+              <a:avLst/>
+            </a:prstGeom>
+            <a:ln w="44450">
+              <a:tailEnd type="triangle"/>
+            </a:ln>
+          </p:spPr>
+          <p:style>
+            <a:lnRef idx="1">
+              <a:schemeClr val="accent1"/>
+            </a:lnRef>
+            <a:fillRef idx="0">
+              <a:schemeClr val="accent1"/>
+            </a:fillRef>
+            <a:effectRef idx="0">
+              <a:schemeClr val="accent1"/>
+            </a:effectRef>
+            <a:fontRef idx="minor">
+              <a:schemeClr val="tx1"/>
+            </a:fontRef>
+          </p:style>
+        </p:cxnSp>
+        <p:sp>
+          <p:nvSpPr>
+            <p:cNvPr id="64" name="TextBox 63">
+              <a:extLst>
+                <a:ext uri="{FF2B5EF4-FFF2-40B4-BE49-F238E27FC236}">
+                  <a16:creationId xmlns:a16="http://schemas.microsoft.com/office/drawing/2014/main" id="{A6E8F959-B76F-BE5E-16C4-1310479415AE}"/>
+                </a:ext>
+              </a:extLst>
+            </p:cNvPr>
+            <p:cNvSpPr txBox="1"/>
+            <p:nvPr/>
+          </p:nvSpPr>
+          <p:spPr>
+            <a:xfrm>
+              <a:off x="6159579" y="2630073"/>
+              <a:ext cx="1926769" cy="954107"/>
+            </a:xfrm>
+            <a:prstGeom prst="rect">
+              <a:avLst/>
+            </a:prstGeom>
+            <a:noFill/>
+          </p:spPr>
+          <p:txBody>
+            <a:bodyPr wrap="square" rtlCol="0">
+              <a:spAutoFit/>
+            </a:bodyPr>
+            <a:lstStyle/>
+            <a:p>
+              <a:r>
+                <a:rPr lang="en-US" sz="1400" dirty="0">
+                  <a:solidFill>
+                    <a:srgbClr val="FF0000"/>
+                  </a:solidFill>
+                </a:rPr>
+                <a:t>Simulation: </a:t>
+              </a:r>
+            </a:p>
+            <a:p>
+              <a:r>
+                <a:rPr lang="en-US" sz="1400" dirty="0">
+                  <a:solidFill>
+                    <a:srgbClr val="FF0000"/>
+                  </a:solidFill>
+                </a:rPr>
+                <a:t>play with replication, effect sizes and variance</a:t>
+              </a:r>
+            </a:p>
+          </p:txBody>
+        </p:sp>
+        <p:sp>
+          <p:nvSpPr>
+            <p:cNvPr id="65" name="TextBox 64">
+              <a:extLst>
+                <a:ext uri="{FF2B5EF4-FFF2-40B4-BE49-F238E27FC236}">
+                  <a16:creationId xmlns:a16="http://schemas.microsoft.com/office/drawing/2014/main" id="{5B409927-5030-77FC-0FB6-AC7D92DBC57A}"/>
+                </a:ext>
+              </a:extLst>
+            </p:cNvPr>
+            <p:cNvSpPr txBox="1"/>
+            <p:nvPr/>
+          </p:nvSpPr>
+          <p:spPr>
+            <a:xfrm>
+              <a:off x="6184098" y="4511408"/>
+              <a:ext cx="1204604" cy="307777"/>
+            </a:xfrm>
+            <a:prstGeom prst="rect">
+              <a:avLst/>
+            </a:prstGeom>
+            <a:noFill/>
+          </p:spPr>
+          <p:txBody>
+            <a:bodyPr wrap="square" rtlCol="0">
+              <a:spAutoFit/>
+            </a:bodyPr>
+            <a:lstStyle/>
+            <a:p>
+              <a:r>
+                <a:rPr lang="en-US" sz="1400" dirty="0">
+                  <a:solidFill>
+                    <a:srgbClr val="FF0000"/>
+                  </a:solidFill>
+                </a:rPr>
+                <a:t>Test Analysis</a:t>
+              </a:r>
+            </a:p>
+          </p:txBody>
+        </p:sp>
+        <p:cxnSp>
+          <p:nvCxnSpPr>
+            <p:cNvPr id="66" name="Straight Arrow Connector 65">
+              <a:extLst>
+                <a:ext uri="{FF2B5EF4-FFF2-40B4-BE49-F238E27FC236}">
+                  <a16:creationId xmlns:a16="http://schemas.microsoft.com/office/drawing/2014/main" id="{3E74AD90-82FF-4926-9CD3-C4F98CE5D0B5}"/>
+                </a:ext>
+              </a:extLst>
+            </p:cNvPr>
+            <p:cNvCxnSpPr>
+              <a:cxnSpLocks/>
+            </p:cNvCxnSpPr>
+            <p:nvPr/>
+          </p:nvCxnSpPr>
+          <p:spPr>
+            <a:xfrm>
+              <a:off x="6110568" y="4055881"/>
+              <a:ext cx="0" cy="830997"/>
+            </a:xfrm>
+            <a:prstGeom prst="straightConnector1">
+              <a:avLst/>
+            </a:prstGeom>
+            <a:ln w="44450">
+              <a:tailEnd type="triangle"/>
+            </a:ln>
+          </p:spPr>
+          <p:style>
+            <a:lnRef idx="1">
+              <a:schemeClr val="accent1"/>
+            </a:lnRef>
+            <a:fillRef idx="0">
+              <a:schemeClr val="accent1"/>
+            </a:fillRef>
+            <a:effectRef idx="0">
+              <a:schemeClr val="accent1"/>
+            </a:effectRef>
+            <a:fontRef idx="minor">
+              <a:schemeClr val="tx1"/>
+            </a:fontRef>
+          </p:style>
+        </p:cxnSp>
+        <p:sp>
+          <p:nvSpPr>
+            <p:cNvPr id="68" name="TextBox 67">
+              <a:extLst>
+                <a:ext uri="{FF2B5EF4-FFF2-40B4-BE49-F238E27FC236}">
+                  <a16:creationId xmlns:a16="http://schemas.microsoft.com/office/drawing/2014/main" id="{5693601D-6C46-7DF3-C071-C4E66FE532DA}"/>
+                </a:ext>
+              </a:extLst>
+            </p:cNvPr>
+            <p:cNvSpPr txBox="1"/>
+            <p:nvPr/>
+          </p:nvSpPr>
+          <p:spPr>
+            <a:xfrm rot="16200000">
+              <a:off x="7810458" y="2538211"/>
+              <a:ext cx="2112009" cy="307777"/>
+            </a:xfrm>
+            <a:prstGeom prst="rect">
+              <a:avLst/>
+            </a:prstGeom>
+            <a:noFill/>
+            <a:ln>
+              <a:noFill/>
+            </a:ln>
+          </p:spPr>
+          <p:txBody>
+            <a:bodyPr wrap="square" rtlCol="0">
+              <a:spAutoFit/>
+            </a:bodyPr>
+            <a:lstStyle/>
+            <a:p>
+              <a:r>
+                <a:rPr lang="en-US" sz="1400" dirty="0"/>
+                <a:t>Solutions</a:t>
+              </a:r>
+            </a:p>
+          </p:txBody>
+        </p:sp>
+        <p:cxnSp>
+          <p:nvCxnSpPr>
+            <p:cNvPr id="74" name="Straight Arrow Connector 73">
+              <a:extLst>
+                <a:ext uri="{FF2B5EF4-FFF2-40B4-BE49-F238E27FC236}">
+                  <a16:creationId xmlns:a16="http://schemas.microsoft.com/office/drawing/2014/main" id="{77E08B16-3899-2B4B-B229-F9E4D7D9EA9A}"/>
+                </a:ext>
+              </a:extLst>
+            </p:cNvPr>
+            <p:cNvCxnSpPr>
+              <a:cxnSpLocks/>
+            </p:cNvCxnSpPr>
+            <p:nvPr/>
+          </p:nvCxnSpPr>
+          <p:spPr>
+            <a:xfrm flipV="1">
+              <a:off x="8518209" y="2335896"/>
+              <a:ext cx="24131" cy="2550982"/>
+            </a:xfrm>
+            <a:prstGeom prst="straightConnector1">
+              <a:avLst/>
+            </a:prstGeom>
+            <a:ln w="44450">
+              <a:tailEnd type="triangle"/>
+            </a:ln>
+          </p:spPr>
+          <p:style>
+            <a:lnRef idx="1">
+              <a:schemeClr val="accent1"/>
+            </a:lnRef>
+            <a:fillRef idx="0">
+              <a:schemeClr val="accent1"/>
+            </a:fillRef>
+            <a:effectRef idx="0">
+              <a:schemeClr val="accent1"/>
+            </a:effectRef>
+            <a:fontRef idx="minor">
+              <a:schemeClr val="tx1"/>
+            </a:fontRef>
+          </p:style>
+        </p:cxnSp>
+        <p:cxnSp>
+          <p:nvCxnSpPr>
+            <p:cNvPr id="80" name="Straight Arrow Connector 79">
+              <a:extLst>
+                <a:ext uri="{FF2B5EF4-FFF2-40B4-BE49-F238E27FC236}">
+                  <a16:creationId xmlns:a16="http://schemas.microsoft.com/office/drawing/2014/main" id="{904E1B74-AAE6-073B-8428-E524619787E3}"/>
+                </a:ext>
+              </a:extLst>
+            </p:cNvPr>
+            <p:cNvCxnSpPr>
+              <a:cxnSpLocks/>
+            </p:cNvCxnSpPr>
+            <p:nvPr/>
+          </p:nvCxnSpPr>
+          <p:spPr>
+            <a:xfrm flipV="1">
+              <a:off x="2008531" y="1596479"/>
+              <a:ext cx="3400234" cy="13377"/>
+            </a:xfrm>
+            <a:prstGeom prst="straightConnector1">
+              <a:avLst/>
+            </a:prstGeom>
+            <a:ln w="44450">
+              <a:tailEnd type="triangle"/>
+            </a:ln>
+          </p:spPr>
+          <p:style>
+            <a:lnRef idx="1">
+              <a:schemeClr val="accent1"/>
+            </a:lnRef>
+            <a:fillRef idx="0">
+              <a:schemeClr val="accent1"/>
+            </a:fillRef>
+            <a:effectRef idx="0">
+              <a:schemeClr val="accent1"/>
+            </a:effectRef>
+            <a:fontRef idx="minor">
+              <a:schemeClr val="tx1"/>
+            </a:fontRef>
+          </p:style>
+        </p:cxnSp>
+      </p:grpSp>
+    </p:spTree>
+    <p:extLst>
+      <p:ext uri="{BB962C8B-B14F-4D97-AF65-F5344CB8AC3E}">
+        <p14:creationId xmlns:p14="http://schemas.microsoft.com/office/powerpoint/2010/main" val="1924939785"/>
+      </p:ext>
+    </p:extLst>
+  </p:cSld>
+  <p:clrMapOvr>
+    <a:masterClrMapping/>
+  </p:clrMapOvr>
+</p:sld>
+</file>
+
+<file path=ppt/slides/slide3.xml><?xml version="1.0" encoding="utf-8"?>
+<p:sld xmlns:a="http://schemas.openxmlformats.org/drawingml/2006/main" xmlns:r="http://schemas.openxmlformats.org/officeDocument/2006/relationships" xmlns:p="http://schemas.openxmlformats.org/presentationml/2006/main">
+  <p:cSld>
+    <p:spTree>
+      <p:nvGrpSpPr>
+        <p:cNvPr id="1" name=""/>
+        <p:cNvGrpSpPr/>
+        <p:nvPr/>
+      </p:nvGrpSpPr>
+      <p:grpSpPr>
+        <a:xfrm>
+          <a:off x="0" y="0"/>
+          <a:ext cx="0" cy="0"/>
+          <a:chOff x="0" y="0"/>
+          <a:chExt cx="0" cy="0"/>
+        </a:xfrm>
+      </p:grpSpPr>
+      <p:sp>
+        <p:nvSpPr>
+          <p:cNvPr id="4" name="TextBox 3">
+            <a:extLst>
+              <a:ext uri="{FF2B5EF4-FFF2-40B4-BE49-F238E27FC236}">
+                <a16:creationId xmlns:a16="http://schemas.microsoft.com/office/drawing/2014/main" id="{86B9CC51-2D06-7FAD-FB26-7FAE0C23C1F7}"/>
+              </a:ext>
+            </a:extLst>
+          </p:cNvPr>
+          <p:cNvSpPr txBox="1"/>
+          <p:nvPr/>
+        </p:nvSpPr>
+        <p:spPr>
+          <a:xfrm>
+            <a:off x="2231704" y="3121223"/>
+            <a:ext cx="2185745" cy="523220"/>
+          </a:xfrm>
+          <a:prstGeom prst="rect">
+            <a:avLst/>
+          </a:prstGeom>
+          <a:noFill/>
+          <a:ln>
+            <a:solidFill>
+              <a:schemeClr val="tx1"/>
+            </a:solidFill>
+          </a:ln>
+        </p:spPr>
+        <p:txBody>
+          <a:bodyPr wrap="square" rtlCol="0">
+            <a:spAutoFit/>
+          </a:bodyPr>
+          <a:lstStyle/>
+          <a:p>
+            <a:r>
+              <a:rPr lang="en-US" sz="1400" dirty="0"/>
+              <a:t>Finding suitable/matching hypotheses/explanations</a:t>
+            </a:r>
+          </a:p>
+        </p:txBody>
+      </p:sp>
+      <p:sp>
+        <p:nvSpPr>
+          <p:cNvPr id="5" name="TextBox 4">
+            <a:extLst>
+              <a:ext uri="{FF2B5EF4-FFF2-40B4-BE49-F238E27FC236}">
+                <a16:creationId xmlns:a16="http://schemas.microsoft.com/office/drawing/2014/main" id="{24D76748-9E92-9F12-296C-5DCAF6B54CC4}"/>
+              </a:ext>
+            </a:extLst>
+          </p:cNvPr>
+          <p:cNvSpPr txBox="1"/>
+          <p:nvPr/>
+        </p:nvSpPr>
+        <p:spPr>
+          <a:xfrm>
+            <a:off x="2231705" y="2190593"/>
+            <a:ext cx="2049357" cy="307777"/>
+          </a:xfrm>
+          <a:prstGeom prst="rect">
+            <a:avLst/>
+          </a:prstGeom>
+          <a:noFill/>
+          <a:ln>
+            <a:solidFill>
+              <a:schemeClr val="tx1"/>
+            </a:solidFill>
+          </a:ln>
+        </p:spPr>
+        <p:txBody>
+          <a:bodyPr wrap="square" rtlCol="0">
+            <a:spAutoFit/>
+          </a:bodyPr>
+          <a:lstStyle/>
+          <a:p>
+            <a:r>
+              <a:rPr lang="en-US" sz="1400" dirty="0"/>
+              <a:t>Exploring &amp; Analysis</a:t>
+            </a:r>
+          </a:p>
+        </p:txBody>
+      </p:sp>
+      <p:cxnSp>
+        <p:nvCxnSpPr>
+          <p:cNvPr id="6" name="Straight Arrow Connector 5">
+            <a:extLst>
+              <a:ext uri="{FF2B5EF4-FFF2-40B4-BE49-F238E27FC236}">
+                <a16:creationId xmlns:a16="http://schemas.microsoft.com/office/drawing/2014/main" id="{098DA4AF-1B10-B605-5ECF-D7099A9BC774}"/>
+              </a:ext>
+            </a:extLst>
+          </p:cNvPr>
+          <p:cNvCxnSpPr>
+            <a:cxnSpLocks/>
+          </p:cNvCxnSpPr>
+          <p:nvPr/>
+        </p:nvCxnSpPr>
+        <p:spPr>
+          <a:xfrm>
+            <a:off x="2809713" y="2598003"/>
+            <a:ext cx="0" cy="523220"/>
+          </a:xfrm>
+          <a:prstGeom prst="straightConnector1">
+            <a:avLst/>
+          </a:prstGeom>
+          <a:ln w="44450">
+            <a:tailEnd type="triangle"/>
+          </a:ln>
+        </p:spPr>
+        <p:style>
+          <a:lnRef idx="1">
+            <a:schemeClr val="accent1"/>
+          </a:lnRef>
+          <a:fillRef idx="0">
+            <a:schemeClr val="accent1"/>
+          </a:fillRef>
+          <a:effectRef idx="0">
+            <a:schemeClr val="accent1"/>
+          </a:effectRef>
+          <a:fontRef idx="minor">
+            <a:schemeClr val="tx1"/>
+          </a:fontRef>
+        </p:style>
+      </p:cxnSp>
+      <p:cxnSp>
+        <p:nvCxnSpPr>
+          <p:cNvPr id="7" name="Straight Arrow Connector 6">
+            <a:extLst>
+              <a:ext uri="{FF2B5EF4-FFF2-40B4-BE49-F238E27FC236}">
+                <a16:creationId xmlns:a16="http://schemas.microsoft.com/office/drawing/2014/main" id="{CB43CB15-F7C1-82B5-418A-02536D9C1DA6}"/>
+              </a:ext>
+            </a:extLst>
+          </p:cNvPr>
+          <p:cNvCxnSpPr>
+            <a:cxnSpLocks/>
+          </p:cNvCxnSpPr>
+          <p:nvPr/>
+        </p:nvCxnSpPr>
+        <p:spPr>
+          <a:xfrm>
+            <a:off x="2933359" y="1721508"/>
+            <a:ext cx="10241" cy="405605"/>
+          </a:xfrm>
+          <a:prstGeom prst="straightConnector1">
+            <a:avLst/>
+          </a:prstGeom>
+          <a:ln w="44450">
+            <a:tailEnd type="triangle"/>
+          </a:ln>
+        </p:spPr>
+        <p:style>
+          <a:lnRef idx="1">
+            <a:schemeClr val="accent1"/>
+          </a:lnRef>
+          <a:fillRef idx="0">
+            <a:schemeClr val="accent1"/>
+          </a:fillRef>
+          <a:effectRef idx="0">
+            <a:schemeClr val="accent1"/>
+          </a:effectRef>
+          <a:fontRef idx="minor">
+            <a:schemeClr val="tx1"/>
+          </a:fontRef>
+        </p:style>
+      </p:cxnSp>
+      <p:sp>
+        <p:nvSpPr>
+          <p:cNvPr id="8" name="TextBox 7">
+            <a:extLst>
+              <a:ext uri="{FF2B5EF4-FFF2-40B4-BE49-F238E27FC236}">
+                <a16:creationId xmlns:a16="http://schemas.microsoft.com/office/drawing/2014/main" id="{CE494E3F-A5A0-C009-E5E7-811FFCDDED0D}"/>
+              </a:ext>
+            </a:extLst>
+          </p:cNvPr>
+          <p:cNvSpPr txBox="1"/>
+          <p:nvPr/>
+        </p:nvSpPr>
+        <p:spPr>
+          <a:xfrm>
+            <a:off x="2231705" y="1390186"/>
+            <a:ext cx="1353005" cy="307777"/>
+          </a:xfrm>
+          <a:prstGeom prst="rect">
+            <a:avLst/>
+          </a:prstGeom>
+          <a:noFill/>
+          <a:ln>
+            <a:solidFill>
+              <a:schemeClr val="tx1"/>
+            </a:solidFill>
+          </a:ln>
+        </p:spPr>
+        <p:txBody>
+          <a:bodyPr wrap="square" rtlCol="0">
+            <a:spAutoFit/>
+          </a:bodyPr>
+          <a:lstStyle/>
+          <a:p>
+            <a:r>
+              <a:rPr lang="en-US" sz="1400" dirty="0"/>
+              <a:t>Dataset</a:t>
+            </a:r>
+          </a:p>
+        </p:txBody>
+      </p:sp>
+      <p:sp>
+        <p:nvSpPr>
+          <p:cNvPr id="9" name="TextBox 8">
+            <a:extLst>
+              <a:ext uri="{FF2B5EF4-FFF2-40B4-BE49-F238E27FC236}">
+                <a16:creationId xmlns:a16="http://schemas.microsoft.com/office/drawing/2014/main" id="{DF6254D0-3AC4-D1D5-7620-9BB773C0003C}"/>
+              </a:ext>
+            </a:extLst>
+          </p:cNvPr>
+          <p:cNvSpPr txBox="1"/>
+          <p:nvPr/>
+        </p:nvSpPr>
+        <p:spPr>
+          <a:xfrm>
+            <a:off x="2943600" y="2736502"/>
+            <a:ext cx="4564780" cy="246221"/>
+          </a:xfrm>
+          <a:prstGeom prst="rect">
+            <a:avLst/>
+          </a:prstGeom>
+          <a:noFill/>
+        </p:spPr>
+        <p:txBody>
+          <a:bodyPr wrap="square" rtlCol="0">
+            <a:spAutoFit/>
+          </a:bodyPr>
+          <a:lstStyle/>
+          <a:p>
+            <a:r>
+              <a:rPr lang="en-US" sz="1000" dirty="0">
+                <a:solidFill>
+                  <a:srgbClr val="FF0000"/>
+                </a:solidFill>
+              </a:rPr>
+              <a:t>Garden of the forking paths: Multiple tests and correlations until significant result</a:t>
+            </a:r>
+          </a:p>
+        </p:txBody>
+      </p:sp>
+      <p:cxnSp>
+        <p:nvCxnSpPr>
+          <p:cNvPr id="10" name="Straight Arrow Connector 9">
+            <a:extLst>
+              <a:ext uri="{FF2B5EF4-FFF2-40B4-BE49-F238E27FC236}">
+                <a16:creationId xmlns:a16="http://schemas.microsoft.com/office/drawing/2014/main" id="{46DEF9E1-B732-8C23-2764-6118D0A4BB11}"/>
+              </a:ext>
+            </a:extLst>
+          </p:cNvPr>
+          <p:cNvCxnSpPr>
+            <a:cxnSpLocks/>
+          </p:cNvCxnSpPr>
+          <p:nvPr/>
+        </p:nvCxnSpPr>
+        <p:spPr>
+          <a:xfrm>
+            <a:off x="2809713" y="3742076"/>
+            <a:ext cx="0" cy="523220"/>
+          </a:xfrm>
+          <a:prstGeom prst="straightConnector1">
+            <a:avLst/>
+          </a:prstGeom>
+          <a:ln w="44450">
+            <a:tailEnd type="triangle"/>
+          </a:ln>
+        </p:spPr>
+        <p:style>
+          <a:lnRef idx="1">
+            <a:schemeClr val="accent1"/>
+          </a:lnRef>
+          <a:fillRef idx="0">
+            <a:schemeClr val="accent1"/>
+          </a:fillRef>
+          <a:effectRef idx="0">
+            <a:schemeClr val="accent1"/>
+          </a:effectRef>
+          <a:fontRef idx="minor">
+            <a:schemeClr val="tx1"/>
+          </a:fontRef>
+        </p:style>
+      </p:cxnSp>
+      <p:sp>
+        <p:nvSpPr>
+          <p:cNvPr id="11" name="TextBox 10">
+            <a:extLst>
+              <a:ext uri="{FF2B5EF4-FFF2-40B4-BE49-F238E27FC236}">
+                <a16:creationId xmlns:a16="http://schemas.microsoft.com/office/drawing/2014/main" id="{08ECEA6E-9704-F290-55F3-1DB7CD168355}"/>
+              </a:ext>
+            </a:extLst>
+          </p:cNvPr>
+          <p:cNvSpPr txBox="1"/>
+          <p:nvPr/>
+        </p:nvSpPr>
+        <p:spPr>
+          <a:xfrm>
+            <a:off x="2095317" y="4362929"/>
+            <a:ext cx="2185745" cy="307777"/>
+          </a:xfrm>
+          <a:prstGeom prst="rect">
+            <a:avLst/>
+          </a:prstGeom>
+          <a:noFill/>
+          <a:ln>
+            <a:solidFill>
+              <a:schemeClr val="tx1"/>
+            </a:solidFill>
+          </a:ln>
+        </p:spPr>
+        <p:txBody>
+          <a:bodyPr wrap="square" rtlCol="0">
+            <a:spAutoFit/>
+          </a:bodyPr>
+          <a:lstStyle/>
+          <a:p>
+            <a:r>
+              <a:rPr lang="en-US" sz="1400" dirty="0"/>
+              <a:t>Conclusion</a:t>
+            </a:r>
+          </a:p>
+        </p:txBody>
+      </p:sp>
+      <p:sp>
+        <p:nvSpPr>
+          <p:cNvPr id="12" name="TextBox 11">
+            <a:extLst>
+              <a:ext uri="{FF2B5EF4-FFF2-40B4-BE49-F238E27FC236}">
+                <a16:creationId xmlns:a16="http://schemas.microsoft.com/office/drawing/2014/main" id="{8E2679BF-9930-120F-F391-C818FC942F2F}"/>
+              </a:ext>
+            </a:extLst>
+          </p:cNvPr>
+          <p:cNvSpPr txBox="1"/>
+          <p:nvPr/>
+        </p:nvSpPr>
+        <p:spPr>
+          <a:xfrm>
+            <a:off x="4281062" y="2243575"/>
+            <a:ext cx="4564780" cy="246221"/>
+          </a:xfrm>
+          <a:prstGeom prst="rect">
+            <a:avLst/>
+          </a:prstGeom>
+          <a:noFill/>
+        </p:spPr>
+        <p:txBody>
+          <a:bodyPr wrap="square" rtlCol="0">
+            <a:spAutoFit/>
+          </a:bodyPr>
+          <a:lstStyle/>
+          <a:p>
+            <a:r>
+              <a:rPr lang="en-US" sz="1000" dirty="0">
+                <a:solidFill>
+                  <a:srgbClr val="FF0000"/>
+                </a:solidFill>
+              </a:rPr>
+              <a:t>High replication: </a:t>
+            </a:r>
+            <a:r>
+              <a:rPr lang="en-US" sz="1000" dirty="0" err="1">
+                <a:solidFill>
+                  <a:srgbClr val="FF0000"/>
+                </a:solidFill>
+              </a:rPr>
+              <a:t>p.value</a:t>
+            </a:r>
+            <a:r>
+              <a:rPr lang="en-US" sz="1000" dirty="0">
+                <a:solidFill>
+                  <a:srgbClr val="FF0000"/>
+                </a:solidFill>
+              </a:rPr>
+              <a:t> &lt; 0.05 with very small effect size</a:t>
+            </a:r>
+          </a:p>
+        </p:txBody>
+      </p:sp>
+      <p:sp>
+        <p:nvSpPr>
+          <p:cNvPr id="13" name="TextBox 12">
+            <a:extLst>
+              <a:ext uri="{FF2B5EF4-FFF2-40B4-BE49-F238E27FC236}">
+                <a16:creationId xmlns:a16="http://schemas.microsoft.com/office/drawing/2014/main" id="{3544E416-737A-1CE7-E0B2-0A5819AA9433}"/>
+              </a:ext>
+            </a:extLst>
+          </p:cNvPr>
+          <p:cNvSpPr txBox="1"/>
+          <p:nvPr/>
+        </p:nvSpPr>
+        <p:spPr>
+          <a:xfrm>
+            <a:off x="4281062" y="2444510"/>
+            <a:ext cx="4564780" cy="246221"/>
+          </a:xfrm>
+          <a:prstGeom prst="rect">
+            <a:avLst/>
+          </a:prstGeom>
+          <a:noFill/>
+        </p:spPr>
+        <p:txBody>
+          <a:bodyPr wrap="square" rtlCol="0">
+            <a:spAutoFit/>
+          </a:bodyPr>
+          <a:lstStyle/>
+          <a:p>
+            <a:r>
+              <a:rPr lang="en-US" sz="1000" dirty="0">
+                <a:solidFill>
+                  <a:srgbClr val="FF0000"/>
+                </a:solidFill>
+              </a:rPr>
+              <a:t>Low replication: </a:t>
+            </a:r>
+            <a:r>
+              <a:rPr lang="en-US" sz="1000" dirty="0" err="1">
+                <a:solidFill>
+                  <a:srgbClr val="FF0000"/>
+                </a:solidFill>
+              </a:rPr>
+              <a:t>p.value</a:t>
+            </a:r>
+            <a:r>
+              <a:rPr lang="en-US" sz="1000" dirty="0">
+                <a:solidFill>
+                  <a:srgbClr val="FF0000"/>
+                </a:solidFill>
+              </a:rPr>
+              <a:t> &lt; 0.05 with potentially big effect size</a:t>
+            </a:r>
+          </a:p>
+        </p:txBody>
+      </p:sp>
+    </p:spTree>
+    <p:extLst>
+      <p:ext uri="{BB962C8B-B14F-4D97-AF65-F5344CB8AC3E}">
+        <p14:creationId xmlns:p14="http://schemas.microsoft.com/office/powerpoint/2010/main" val="2645039094"/>
       </p:ext>
     </p:extLst>
   </p:cSld>
@@ -5165,4 +9237,299 @@
     </a:ext>
   </a:extLst>
 </a:theme>
+</file>
+
+<file path=ppt/theme/theme2.xml><?xml version="1.0" encoding="utf-8"?>
+<a:theme xmlns:a="http://schemas.openxmlformats.org/drawingml/2006/main" name="Office Theme">
+  <a:themeElements>
+    <a:clrScheme name="Office">
+      <a:dk1>
+        <a:sysClr val="windowText" lastClr="000000"/>
+      </a:dk1>
+      <a:lt1>
+        <a:sysClr val="window" lastClr="FFFFFF"/>
+      </a:lt1>
+      <a:dk2>
+        <a:srgbClr val="44546A"/>
+      </a:dk2>
+      <a:lt2>
+        <a:srgbClr val="E7E6E6"/>
+      </a:lt2>
+      <a:accent1>
+        <a:srgbClr val="4472C4"/>
+      </a:accent1>
+      <a:accent2>
+        <a:srgbClr val="ED7D31"/>
+      </a:accent2>
+      <a:accent3>
+        <a:srgbClr val="A5A5A5"/>
+      </a:accent3>
+      <a:accent4>
+        <a:srgbClr val="FFC000"/>
+      </a:accent4>
+      <a:accent5>
+        <a:srgbClr val="5B9BD5"/>
+      </a:accent5>
+      <a:accent6>
+        <a:srgbClr val="70AD47"/>
+      </a:accent6>
+      <a:hlink>
+        <a:srgbClr val="0563C1"/>
+      </a:hlink>
+      <a:folHlink>
+        <a:srgbClr val="954F72"/>
+      </a:folHlink>
+    </a:clrScheme>
+    <a:fontScheme name="Office">
+      <a:majorFont>
+        <a:latin typeface="Calibri Light" panose="020F0302020204030204"/>
+        <a:ea typeface=""/>
+        <a:cs typeface=""/>
+        <a:font script="Jpan" typeface="游ゴシック Light"/>
+        <a:font script="Hang" typeface="맑은 고딕"/>
+        <a:font script="Hans" typeface="等线 Light"/>
+        <a:font script="Hant" typeface="新細明體"/>
+        <a:font script="Arab" typeface="Times New Roman"/>
+        <a:font script="Hebr" typeface="Times New Roman"/>
+        <a:font script="Thai" typeface="Angsana New"/>
+        <a:font script="Ethi" typeface="Nyala"/>
+        <a:font script="Beng" typeface="Vrinda"/>
+        <a:font script="Gujr" typeface="Shruti"/>
+        <a:font script="Khmr" typeface="MoolBoran"/>
+        <a:font script="Knda" typeface="Tunga"/>
+        <a:font script="Guru" typeface="Raavi"/>
+        <a:font script="Cans" typeface="Euphemia"/>
+        <a:font script="Cher" typeface="Plantagenet Cherokee"/>
+        <a:font script="Yiii" typeface="Microsoft Yi Baiti"/>
+        <a:font script="Tibt" typeface="Microsoft Himalaya"/>
+        <a:font script="Thaa" typeface="MV Boli"/>
+        <a:font script="Deva" typeface="Mangal"/>
+        <a:font script="Telu" typeface="Gautami"/>
+        <a:font script="Taml" typeface="Latha"/>
+        <a:font script="Syrc" typeface="Estrangelo Edessa"/>
+        <a:font script="Orya" typeface="Kalinga"/>
+        <a:font script="Mlym" typeface="Kartika"/>
+        <a:font script="Laoo" typeface="DokChampa"/>
+        <a:font script="Sinh" typeface="Iskoola Pota"/>
+        <a:font script="Mong" typeface="Mongolian Baiti"/>
+        <a:font script="Viet" typeface="Times New Roman"/>
+        <a:font script="Uigh" typeface="Microsoft Uighur"/>
+        <a:font script="Geor" typeface="Sylfaen"/>
+        <a:font script="Armn" typeface="Arial"/>
+        <a:font script="Bugi" typeface="Leelawadee UI"/>
+        <a:font script="Bopo" typeface="Microsoft JhengHei"/>
+        <a:font script="Java" typeface="Javanese Text"/>
+        <a:font script="Lisu" typeface="Segoe UI"/>
+        <a:font script="Mymr" typeface="Myanmar Text"/>
+        <a:font script="Nkoo" typeface="Ebrima"/>
+        <a:font script="Olck" typeface="Nirmala UI"/>
+        <a:font script="Osma" typeface="Ebrima"/>
+        <a:font script="Phag" typeface="Phagspa"/>
+        <a:font script="Syrn" typeface="Estrangelo Edessa"/>
+        <a:font script="Syrj" typeface="Estrangelo Edessa"/>
+        <a:font script="Syre" typeface="Estrangelo Edessa"/>
+        <a:font script="Sora" typeface="Nirmala UI"/>
+        <a:font script="Tale" typeface="Microsoft Tai Le"/>
+        <a:font script="Talu" typeface="Microsoft New Tai Lue"/>
+        <a:font script="Tfng" typeface="Ebrima"/>
+      </a:majorFont>
+      <a:minorFont>
+        <a:latin typeface="Calibri" panose="020F0502020204030204"/>
+        <a:ea typeface=""/>
+        <a:cs typeface=""/>
+        <a:font script="Jpan" typeface="游ゴシック"/>
+        <a:font script="Hang" typeface="맑은 고딕"/>
+        <a:font script="Hans" typeface="等线"/>
+        <a:font script="Hant" typeface="新細明體"/>
+        <a:font script="Arab" typeface="Arial"/>
+        <a:font script="Hebr" typeface="Arial"/>
+        <a:font script="Thai" typeface="Cordia New"/>
+        <a:font script="Ethi" typeface="Nyala"/>
+        <a:font script="Beng" typeface="Vrinda"/>
+        <a:font script="Gujr" typeface="Shruti"/>
+        <a:font script="Khmr" typeface="DaunPenh"/>
+        <a:font script="Knda" typeface="Tunga"/>
+        <a:font script="Guru" typeface="Raavi"/>
+        <a:font script="Cans" typeface="Euphemia"/>
+        <a:font script="Cher" typeface="Plantagenet Cherokee"/>
+        <a:font script="Yiii" typeface="Microsoft Yi Baiti"/>
+        <a:font script="Tibt" typeface="Microsoft Himalaya"/>
+        <a:font script="Thaa" typeface="MV Boli"/>
+        <a:font script="Deva" typeface="Mangal"/>
+        <a:font script="Telu" typeface="Gautami"/>
+        <a:font script="Taml" typeface="Latha"/>
+        <a:font script="Syrc" typeface="Estrangelo Edessa"/>
+        <a:font script="Orya" typeface="Kalinga"/>
+        <a:font script="Mlym" typeface="Kartika"/>
+        <a:font script="Laoo" typeface="DokChampa"/>
+        <a:font script="Sinh" typeface="Iskoola Pota"/>
+        <a:font script="Mong" typeface="Mongolian Baiti"/>
+        <a:font script="Viet" typeface="Arial"/>
+        <a:font script="Uigh" typeface="Microsoft Uighur"/>
+        <a:font script="Geor" typeface="Sylfaen"/>
+        <a:font script="Armn" typeface="Arial"/>
+        <a:font script="Bugi" typeface="Leelawadee UI"/>
+        <a:font script="Bopo" typeface="Microsoft JhengHei"/>
+        <a:font script="Java" typeface="Javanese Text"/>
+        <a:font script="Lisu" typeface="Segoe UI"/>
+        <a:font script="Mymr" typeface="Myanmar Text"/>
+        <a:font script="Nkoo" typeface="Ebrima"/>
+        <a:font script="Olck" typeface="Nirmala UI"/>
+        <a:font script="Osma" typeface="Ebrima"/>
+        <a:font script="Phag" typeface="Phagspa"/>
+        <a:font script="Syrn" typeface="Estrangelo Edessa"/>
+        <a:font script="Syrj" typeface="Estrangelo Edessa"/>
+        <a:font script="Syre" typeface="Estrangelo Edessa"/>
+        <a:font script="Sora" typeface="Nirmala UI"/>
+        <a:font script="Tale" typeface="Microsoft Tai Le"/>
+        <a:font script="Talu" typeface="Microsoft New Tai Lue"/>
+        <a:font script="Tfng" typeface="Ebrima"/>
+      </a:minorFont>
+    </a:fontScheme>
+    <a:fmtScheme name="Office">
+      <a:fillStyleLst>
+        <a:solidFill>
+          <a:schemeClr val="phClr"/>
+        </a:solidFill>
+        <a:gradFill rotWithShape="1">
+          <a:gsLst>
+            <a:gs pos="0">
+              <a:schemeClr val="phClr">
+                <a:lumMod val="110000"/>
+                <a:satMod val="105000"/>
+                <a:tint val="67000"/>
+              </a:schemeClr>
+            </a:gs>
+            <a:gs pos="50000">
+              <a:schemeClr val="phClr">
+                <a:lumMod val="105000"/>
+                <a:satMod val="103000"/>
+                <a:tint val="73000"/>
+              </a:schemeClr>
+            </a:gs>
+            <a:gs pos="100000">
+              <a:schemeClr val="phClr">
+                <a:lumMod val="105000"/>
+                <a:satMod val="109000"/>
+                <a:tint val="81000"/>
+              </a:schemeClr>
+            </a:gs>
+          </a:gsLst>
+          <a:lin ang="5400000" scaled="0"/>
+        </a:gradFill>
+        <a:gradFill rotWithShape="1">
+          <a:gsLst>
+            <a:gs pos="0">
+              <a:schemeClr val="phClr">
+                <a:satMod val="103000"/>
+                <a:lumMod val="102000"/>
+                <a:tint val="94000"/>
+              </a:schemeClr>
+            </a:gs>
+            <a:gs pos="50000">
+              <a:schemeClr val="phClr">
+                <a:satMod val="110000"/>
+                <a:lumMod val="100000"/>
+                <a:shade val="100000"/>
+              </a:schemeClr>
+            </a:gs>
+            <a:gs pos="100000">
+              <a:schemeClr val="phClr">
+                <a:lumMod val="99000"/>
+                <a:satMod val="120000"/>
+                <a:shade val="78000"/>
+              </a:schemeClr>
+            </a:gs>
+          </a:gsLst>
+          <a:lin ang="5400000" scaled="0"/>
+        </a:gradFill>
+      </a:fillStyleLst>
+      <a:lnStyleLst>
+        <a:ln w="6350" cap="flat" cmpd="sng" algn="ctr">
+          <a:solidFill>
+            <a:schemeClr val="phClr"/>
+          </a:solidFill>
+          <a:prstDash val="solid"/>
+          <a:miter lim="800000"/>
+        </a:ln>
+        <a:ln w="12700" cap="flat" cmpd="sng" algn="ctr">
+          <a:solidFill>
+            <a:schemeClr val="phClr"/>
+          </a:solidFill>
+          <a:prstDash val="solid"/>
+          <a:miter lim="800000"/>
+        </a:ln>
+        <a:ln w="19050" cap="flat" cmpd="sng" algn="ctr">
+          <a:solidFill>
+            <a:schemeClr val="phClr"/>
+          </a:solidFill>
+          <a:prstDash val="solid"/>
+          <a:miter lim="800000"/>
+        </a:ln>
+      </a:lnStyleLst>
+      <a:effectStyleLst>
+        <a:effectStyle>
+          <a:effectLst/>
+        </a:effectStyle>
+        <a:effectStyle>
+          <a:effectLst/>
+        </a:effectStyle>
+        <a:effectStyle>
+          <a:effectLst>
+            <a:outerShdw blurRad="57150" dist="19050" dir="5400000" algn="ctr" rotWithShape="0">
+              <a:srgbClr val="000000">
+                <a:alpha val="63000"/>
+              </a:srgbClr>
+            </a:outerShdw>
+          </a:effectLst>
+        </a:effectStyle>
+      </a:effectStyleLst>
+      <a:bgFillStyleLst>
+        <a:solidFill>
+          <a:schemeClr val="phClr"/>
+        </a:solidFill>
+        <a:solidFill>
+          <a:schemeClr val="phClr">
+            <a:tint val="95000"/>
+            <a:satMod val="170000"/>
+          </a:schemeClr>
+        </a:solidFill>
+        <a:gradFill rotWithShape="1">
+          <a:gsLst>
+            <a:gs pos="0">
+              <a:schemeClr val="phClr">
+                <a:tint val="93000"/>
+                <a:satMod val="150000"/>
+                <a:shade val="98000"/>
+                <a:lumMod val="102000"/>
+              </a:schemeClr>
+            </a:gs>
+            <a:gs pos="50000">
+              <a:schemeClr val="phClr">
+                <a:tint val="98000"/>
+                <a:satMod val="130000"/>
+                <a:shade val="90000"/>
+                <a:lumMod val="103000"/>
+              </a:schemeClr>
+            </a:gs>
+            <a:gs pos="100000">
+              <a:schemeClr val="phClr">
+                <a:shade val="63000"/>
+                <a:satMod val="120000"/>
+              </a:schemeClr>
+            </a:gs>
+          </a:gsLst>
+          <a:lin ang="5400000" scaled="0"/>
+        </a:gradFill>
+      </a:bgFillStyleLst>
+    </a:fmtScheme>
+  </a:themeElements>
+  <a:objectDefaults/>
+  <a:extraClrSchemeLst/>
+  <a:extLst>
+    <a:ext uri="{05A4C25C-085E-4340-85A3-A5531E510DB2}">
+      <thm15:themeFamily xmlns:thm15="http://schemas.microsoft.com/office/thememl/2012/main" name="Office Theme" id="{62F939B6-93AF-4DB8-9C6B-D6C7DFDC589F}" vid="{4A3C46E8-61CC-4603-A589-7422A47A8E4A}"/>
+    </a:ext>
+  </a:extLst>
+</a:theme>
 </file>
</xml_diff>

<commit_message>
incorporated Lizzies suggestions and improved figure
</commit_message>
<xml_diff>
--- a/analyses/figures/figures_simulation.pptx
+++ b/analyses/figures/figures_simulation.pptx
@@ -5,14 +5,13 @@
     <p:sldMasterId id="2147483648" r:id="rId1"/>
   </p:sldMasterIdLst>
   <p:notesMasterIdLst>
-    <p:notesMasterId r:id="rId7"/>
+    <p:notesMasterId r:id="rId6"/>
   </p:notesMasterIdLst>
   <p:sldIdLst>
     <p:sldId id="256" r:id="rId2"/>
     <p:sldId id="258" r:id="rId3"/>
     <p:sldId id="262" r:id="rId4"/>
-    <p:sldId id="260" r:id="rId5"/>
-    <p:sldId id="261" r:id="rId6"/>
+    <p:sldId id="261" r:id="rId5"/>
   </p:sldIdLst>
   <p:sldSz cx="12192000" cy="6858000"/>
   <p:notesSz cx="6858000" cy="9144000"/>
@@ -226,7 +225,7 @@
           <a:p>
             <a:fld id="{2F135446-6881-F24D-BECD-617636E10D62}" type="datetimeFigureOut">
               <a:rPr lang="en-US" smtClean="0"/>
-              <a:t>8/20/24</a:t>
+              <a:t>8/27/24</a:t>
             </a:fld>
             <a:endParaRPr lang="en-US"/>
           </a:p>
@@ -808,7 +807,7 @@
           <a:p>
             <a:fld id="{7A0C4CA1-6CF3-4D46-A80D-8B75430028DB}" type="datetimeFigureOut">
               <a:rPr lang="en-US" smtClean="0"/>
-              <a:t>8/20/24</a:t>
+              <a:t>8/27/24</a:t>
             </a:fld>
             <a:endParaRPr lang="en-US"/>
           </a:p>
@@ -1006,7 +1005,7 @@
           <a:p>
             <a:fld id="{7A0C4CA1-6CF3-4D46-A80D-8B75430028DB}" type="datetimeFigureOut">
               <a:rPr lang="en-US" smtClean="0"/>
-              <a:t>8/20/24</a:t>
+              <a:t>8/27/24</a:t>
             </a:fld>
             <a:endParaRPr lang="en-US"/>
           </a:p>
@@ -1214,7 +1213,7 @@
           <a:p>
             <a:fld id="{7A0C4CA1-6CF3-4D46-A80D-8B75430028DB}" type="datetimeFigureOut">
               <a:rPr lang="en-US" smtClean="0"/>
-              <a:t>8/20/24</a:t>
+              <a:t>8/27/24</a:t>
             </a:fld>
             <a:endParaRPr lang="en-US"/>
           </a:p>
@@ -1412,7 +1411,7 @@
           <a:p>
             <a:fld id="{7A0C4CA1-6CF3-4D46-A80D-8B75430028DB}" type="datetimeFigureOut">
               <a:rPr lang="en-US" smtClean="0"/>
-              <a:t>8/20/24</a:t>
+              <a:t>8/27/24</a:t>
             </a:fld>
             <a:endParaRPr lang="en-US"/>
           </a:p>
@@ -1687,7 +1686,7 @@
           <a:p>
             <a:fld id="{7A0C4CA1-6CF3-4D46-A80D-8B75430028DB}" type="datetimeFigureOut">
               <a:rPr lang="en-US" smtClean="0"/>
-              <a:t>8/20/24</a:t>
+              <a:t>8/27/24</a:t>
             </a:fld>
             <a:endParaRPr lang="en-US"/>
           </a:p>
@@ -1952,7 +1951,7 @@
           <a:p>
             <a:fld id="{7A0C4CA1-6CF3-4D46-A80D-8B75430028DB}" type="datetimeFigureOut">
               <a:rPr lang="en-US" smtClean="0"/>
-              <a:t>8/20/24</a:t>
+              <a:t>8/27/24</a:t>
             </a:fld>
             <a:endParaRPr lang="en-US"/>
           </a:p>
@@ -2364,7 +2363,7 @@
           <a:p>
             <a:fld id="{7A0C4CA1-6CF3-4D46-A80D-8B75430028DB}" type="datetimeFigureOut">
               <a:rPr lang="en-US" smtClean="0"/>
-              <a:t>8/20/24</a:t>
+              <a:t>8/27/24</a:t>
             </a:fld>
             <a:endParaRPr lang="en-US"/>
           </a:p>
@@ -2505,7 +2504,7 @@
           <a:p>
             <a:fld id="{7A0C4CA1-6CF3-4D46-A80D-8B75430028DB}" type="datetimeFigureOut">
               <a:rPr lang="en-US" smtClean="0"/>
-              <a:t>8/20/24</a:t>
+              <a:t>8/27/24</a:t>
             </a:fld>
             <a:endParaRPr lang="en-US"/>
           </a:p>
@@ -2618,7 +2617,7 @@
           <a:p>
             <a:fld id="{7A0C4CA1-6CF3-4D46-A80D-8B75430028DB}" type="datetimeFigureOut">
               <a:rPr lang="en-US" smtClean="0"/>
-              <a:t>8/20/24</a:t>
+              <a:t>8/27/24</a:t>
             </a:fld>
             <a:endParaRPr lang="en-US"/>
           </a:p>
@@ -2929,7 +2928,7 @@
           <a:p>
             <a:fld id="{7A0C4CA1-6CF3-4D46-A80D-8B75430028DB}" type="datetimeFigureOut">
               <a:rPr lang="en-US" smtClean="0"/>
-              <a:t>8/20/24</a:t>
+              <a:t>8/27/24</a:t>
             </a:fld>
             <a:endParaRPr lang="en-US"/>
           </a:p>
@@ -3217,7 +3216,7 @@
           <a:p>
             <a:fld id="{7A0C4CA1-6CF3-4D46-A80D-8B75430028DB}" type="datetimeFigureOut">
               <a:rPr lang="en-US" smtClean="0"/>
-              <a:t>8/20/24</a:t>
+              <a:t>8/27/24</a:t>
             </a:fld>
             <a:endParaRPr lang="en-US"/>
           </a:p>
@@ -3458,7 +3457,7 @@
           <a:p>
             <a:fld id="{7A0C4CA1-6CF3-4D46-A80D-8B75430028DB}" type="datetimeFigureOut">
               <a:rPr lang="en-US" smtClean="0"/>
-              <a:t>8/20/24</a:t>
+              <a:t>8/27/24</a:t>
             </a:fld>
             <a:endParaRPr lang="en-US"/>
           </a:p>
@@ -8574,10 +8573,10 @@
         </p:nvGrpSpPr>
         <p:grpSpPr>
           <a:xfrm>
-            <a:off x="-347256" y="155635"/>
-            <a:ext cx="12595747" cy="6865729"/>
-            <a:chOff x="-347256" y="155635"/>
-            <a:chExt cx="12595747" cy="6865729"/>
+            <a:off x="-574228" y="-96887"/>
+            <a:ext cx="12626743" cy="7051773"/>
+            <a:chOff x="-347256" y="-30409"/>
+            <a:chExt cx="12626743" cy="7051773"/>
           </a:xfrm>
         </p:grpSpPr>
         <p:sp>
@@ -9348,8 +9347,8 @@
           </p:nvSpPr>
           <p:spPr>
             <a:xfrm>
-              <a:off x="7527737" y="3416959"/>
-              <a:ext cx="1511602" cy="523220"/>
+              <a:off x="7398277" y="3400848"/>
+              <a:ext cx="1960392" cy="523220"/>
             </a:xfrm>
             <a:prstGeom prst="rect">
               <a:avLst/>
@@ -9371,7 +9370,7 @@
             <a:p>
               <a:r>
                 <a:rPr lang="en-US" sz="1400" dirty="0"/>
-                <a:t>Verbal/conceptual hypothesis</a:t>
+                <a:t>Descriptive/conceptual hypothesis</a:t>
               </a:r>
             </a:p>
           </p:txBody>
@@ -9738,8 +9737,8 @@
           </p:nvSpPr>
           <p:spPr>
             <a:xfrm>
-              <a:off x="4864751" y="4692463"/>
-              <a:ext cx="2924015" cy="523220"/>
+              <a:off x="5114711" y="4706465"/>
+              <a:ext cx="2408601" cy="738664"/>
             </a:xfrm>
             <a:prstGeom prst="rect">
               <a:avLst/>
@@ -9754,17 +9753,19 @@
             <a:p>
               <a:r>
                 <a:rPr lang="en-US" sz="1400" dirty="0"/>
-                <a:t>Formulation of mathematical model</a:t>
-              </a:r>
-            </a:p>
-            <a:p>
-              <a:r>
-                <a:rPr lang="en-US" sz="1400" dirty="0" err="1"/>
-                <a:t>Objectivising</a:t>
-              </a:r>
+                <a:t>Convert hypothesis into </a:t>
+              </a:r>
+            </a:p>
+            <a:p>
               <a:r>
                 <a:rPr lang="en-US" sz="1400" dirty="0"/>
-                <a:t> the hypothesis</a:t>
+                <a:t>a mathematical formula</a:t>
+              </a:r>
+            </a:p>
+            <a:p>
+              <a:r>
+                <a:rPr lang="en-US" sz="1400" dirty="0"/>
+                <a:t>Set model parameters</a:t>
               </a:r>
             </a:p>
           </p:txBody>
@@ -9783,8 +9784,8 @@
           </p:nvSpPr>
           <p:spPr>
             <a:xfrm>
-              <a:off x="5281503" y="4395058"/>
-              <a:ext cx="1564447" cy="307777"/>
+              <a:off x="5199132" y="4410640"/>
+              <a:ext cx="1830325" cy="307777"/>
             </a:xfrm>
             <a:prstGeom prst="rect">
               <a:avLst/>
@@ -9805,8 +9806,8 @@
             <a:lstStyle/>
             <a:p>
               <a:r>
-                <a:rPr lang="en-US" sz="1400" dirty="0"/>
-                <a:t>Mechanistic model</a:t>
+                <a:rPr lang="en-US" sz="1400" b="1" dirty="0"/>
+                <a:t>1. Mechanistic model</a:t>
               </a:r>
             </a:p>
           </p:txBody>
@@ -9825,8 +9826,8 @@
           </p:nvSpPr>
           <p:spPr>
             <a:xfrm>
-              <a:off x="4147998" y="3408751"/>
-              <a:ext cx="2120475" cy="738664"/>
+              <a:off x="4400499" y="3394486"/>
+              <a:ext cx="3314586" cy="738664"/>
             </a:xfrm>
             <a:prstGeom prst="rect">
               <a:avLst/>
@@ -9847,7 +9848,13 @@
             <a:p>
               <a:r>
                 <a:rPr lang="en-US" sz="1400" dirty="0"/>
-                <a:t>manipulating sample size, effect size, variance, etc.</a:t>
+                <a:t>Set sample size and x values</a:t>
+              </a:r>
+            </a:p>
+            <a:p>
+              <a:r>
+                <a:rPr lang="en-US" sz="1400" dirty="0"/>
+                <a:t>Generate y-values from the model.</a:t>
               </a:r>
             </a:p>
           </p:txBody>
@@ -9866,8 +9873,8 @@
           </p:nvSpPr>
           <p:spPr>
             <a:xfrm>
-              <a:off x="5295462" y="2211061"/>
-              <a:ext cx="2665288" cy="738664"/>
+              <a:off x="4834583" y="2103037"/>
+              <a:ext cx="2744726" cy="738664"/>
             </a:xfrm>
             <a:prstGeom prst="rect">
               <a:avLst/>
@@ -9882,14 +9889,15 @@
             <a:p>
               <a:r>
                 <a:rPr lang="en-US" sz="1400" dirty="0"/>
-                <a:t>Explore potential and limitations</a:t>
-              </a:r>
-            </a:p>
-            <a:p>
-              <a:endParaRPr lang="en-US" sz="1400" dirty="0"/>
-            </a:p>
-            <a:p>
-              <a:endParaRPr lang="en-US" sz="1400" dirty="0"/>
+                <a:t>Explore potential and limitations:</a:t>
+              </a:r>
+              <a:br>
+                <a:rPr lang="en-US" sz="1400" dirty="0"/>
+              </a:br>
+              <a:r>
+                <a:rPr lang="en-US" sz="1400" dirty="0"/>
+                <a:t>manipulate and play with parameter settings</a:t>
+              </a:r>
             </a:p>
           </p:txBody>
         </p:sp>
@@ -9907,8 +9915,8 @@
           </p:nvSpPr>
           <p:spPr>
             <a:xfrm>
-              <a:off x="4600706" y="3091299"/>
-              <a:ext cx="1215060" cy="307777"/>
+              <a:off x="4491107" y="3116990"/>
+              <a:ext cx="2476171" cy="307777"/>
             </a:xfrm>
             <a:prstGeom prst="rect">
               <a:avLst/>
@@ -9929,8 +9937,8 @@
             <a:lstStyle/>
             <a:p>
               <a:r>
-                <a:rPr lang="en-US" sz="1400" dirty="0"/>
-                <a:t>Fake dataset</a:t>
+                <a:rPr lang="en-US" sz="1400" b="1" dirty="0"/>
+                <a:t>2. Simulation &amp; Visualization</a:t>
               </a:r>
             </a:p>
           </p:txBody>
@@ -9949,8 +9957,8 @@
           </p:nvSpPr>
           <p:spPr>
             <a:xfrm>
-              <a:off x="5423776" y="1795195"/>
-              <a:ext cx="2132623" cy="307777"/>
+              <a:off x="4919718" y="1793954"/>
+              <a:ext cx="2744727" cy="307777"/>
             </a:xfrm>
             <a:prstGeom prst="rect">
               <a:avLst/>
@@ -9971,8 +9979,8 @@
             <a:lstStyle/>
             <a:p>
               <a:r>
-                <a:rPr lang="en-US" sz="1400" dirty="0"/>
-                <a:t>Model check &amp; predictions</a:t>
+                <a:rPr lang="en-US" sz="1400" b="1" dirty="0"/>
+                <a:t>3. Model check &amp; power analysis</a:t>
               </a:r>
             </a:p>
           </p:txBody>
@@ -9991,8 +9999,8 @@
           </p:nvSpPr>
           <p:spPr>
             <a:xfrm>
-              <a:off x="9127601" y="155635"/>
-              <a:ext cx="2901400" cy="3273365"/>
+              <a:off x="9283335" y="-30409"/>
+              <a:ext cx="2996152" cy="3273365"/>
             </a:xfrm>
             <a:prstGeom prst="rect">
               <a:avLst/>
@@ -10030,25 +10038,23 @@
                     <a:schemeClr val="tx1"/>
                   </a:solidFill>
                 </a:rPr>
-                <a:t>Hypothesis = Mechanistic model</a:t>
-              </a:r>
-            </a:p>
-            <a:p>
-              <a:endParaRPr lang="en-US" sz="500" b="1" dirty="0">
+                <a:t>Guiding questions</a:t>
+              </a:r>
+            </a:p>
+            <a:p>
+              <a:r>
+                <a:rPr lang="en-US" sz="1400" b="1" i="1" dirty="0">
+                  <a:solidFill>
+                    <a:schemeClr val="tx1"/>
+                  </a:solidFill>
+                </a:rPr>
+                <a:t>1. Step: Build mechanistic model</a:t>
+              </a:r>
+              <a:endParaRPr lang="en-US" sz="500" b="1" i="1" dirty="0">
                 <a:solidFill>
                   <a:schemeClr val="tx1"/>
                 </a:solidFill>
               </a:endParaRPr>
-            </a:p>
-            <a:p>
-              <a:r>
-                <a:rPr lang="en-US" sz="1400" i="1" dirty="0">
-                  <a:solidFill>
-                    <a:schemeClr val="tx1"/>
-                  </a:solidFill>
-                </a:rPr>
-                <a:t>based on current knowledge:</a:t>
-              </a:r>
             </a:p>
             <a:p>
               <a:pPr marL="285750" indent="-285750">
@@ -10075,7 +10081,7 @@
                     <a:schemeClr val="tx1"/>
                   </a:solidFill>
                 </a:rPr>
-                <a:t>In what way? Linear/non-linear relationship?</a:t>
+                <a:t>In what way? Linear/non-linear?</a:t>
               </a:r>
             </a:p>
             <a:p>
@@ -10103,17 +10109,55 @@
                     <a:schemeClr val="tx1"/>
                   </a:solidFill>
                 </a:rPr>
-                <a:t>How consistent ? e.g. variance, background noise</a:t>
-              </a:r>
-            </a:p>
-            <a:p>
+                <a:t>How consistent? e.g. variance, background noise (error term)</a:t>
+              </a:r>
+            </a:p>
+            <a:p>
+              <a:r>
+                <a:rPr lang="en-US" sz="1400" b="1" i="1" dirty="0">
+                  <a:solidFill>
+                    <a:schemeClr val="tx1"/>
+                  </a:solidFill>
+                </a:rPr>
+                <a:t>2. Step: Generate fake data and plot</a:t>
+              </a:r>
+            </a:p>
+            <a:p>
+              <a:pPr marL="285750" indent="-285750">
+                <a:buFont typeface="Arial" panose="020B0604020202020204" pitchFamily="34" charset="0"/>
+                <a:buChar char="•"/>
+              </a:pPr>
               <a:r>
                 <a:rPr lang="en-US" sz="1400" i="1" dirty="0">
                   <a:solidFill>
                     <a:schemeClr val="tx1"/>
                   </a:solidFill>
                 </a:rPr>
-                <a:t>based on specific study:</a:t>
+                <a:t>Does this match your predictions?</a:t>
+              </a:r>
+            </a:p>
+            <a:p>
+              <a:pPr marL="285750" indent="-285750">
+                <a:buFont typeface="Arial" panose="020B0604020202020204" pitchFamily="34" charset="0"/>
+                <a:buChar char="•"/>
+              </a:pPr>
+              <a:r>
+                <a:rPr lang="en-US" sz="1400" i="1" dirty="0">
+                  <a:solidFill>
+                    <a:schemeClr val="tx1"/>
+                  </a:solidFill>
+                </a:rPr>
+                <a:t>Is this a reasonable hypothesis?</a:t>
+              </a:r>
+            </a:p>
+            <a:p>
+              <a:r>
+                <a:rPr lang="en-US" sz="1400" b="1" i="1" dirty="0">
+                  <a:solidFill>
+                    <a:schemeClr val="tx1"/>
+                  </a:solidFill>
+                </a:rPr>
+                <a:t>3. Step: Explore and play</a:t>
               </a:r>
             </a:p>
             <a:p>
@@ -10128,20 +10172,6 @@
                   </a:solidFill>
                 </a:rPr>
                 <a:t>Enough statistical power? </a:t>
-              </a:r>
-            </a:p>
-            <a:p>
-              <a:pPr marL="285750" indent="-285750">
-                <a:buFont typeface="Arial" panose="020B0604020202020204" pitchFamily="34" charset="0"/>
-                <a:buChar char="•"/>
-              </a:pPr>
-              <a:r>
-                <a:rPr lang="en-US" sz="1400" dirty="0">
-                  <a:solidFill>
-                    <a:schemeClr val="tx1"/>
-                  </a:solidFill>
-                </a:rPr>
-                <a:t>What are the model predictions?</a:t>
               </a:r>
             </a:p>
             <a:p>
@@ -10224,8 +10254,8 @@
           </p:nvCxnSpPr>
           <p:spPr>
             <a:xfrm flipH="1">
-              <a:off x="8110038" y="3429000"/>
-              <a:ext cx="2468263" cy="692219"/>
+              <a:off x="8438108" y="3242956"/>
+              <a:ext cx="2343303" cy="692219"/>
             </a:xfrm>
             <a:prstGeom prst="straightConnector1">
               <a:avLst/>
@@ -10303,41 +10333,6 @@
           </p:txBody>
         </p:sp>
       </p:grpSp>
-      <p:sp>
-        <p:nvSpPr>
-          <p:cNvPr id="63" name="TextBox 62">
-            <a:extLst>
-              <a:ext uri="{FF2B5EF4-FFF2-40B4-BE49-F238E27FC236}">
-                <a16:creationId xmlns:a16="http://schemas.microsoft.com/office/drawing/2014/main" id="{76BDD5D7-6C8F-9F51-79E7-40831A07D9A6}"/>
-              </a:ext>
-            </a:extLst>
-          </p:cNvPr>
-          <p:cNvSpPr txBox="1"/>
-          <p:nvPr/>
-        </p:nvSpPr>
-        <p:spPr>
-          <a:xfrm>
-            <a:off x="4222985" y="2693301"/>
-            <a:ext cx="1283533" cy="307777"/>
-          </a:xfrm>
-          <a:prstGeom prst="rect">
-            <a:avLst/>
-          </a:prstGeom>
-          <a:noFill/>
-        </p:spPr>
-        <p:txBody>
-          <a:bodyPr wrap="square">
-            <a:spAutoFit/>
-          </a:bodyPr>
-          <a:lstStyle/>
-          <a:p>
-            <a:r>
-              <a:rPr lang="en-US" sz="1400" dirty="0"/>
-              <a:t>Power analysis</a:t>
-            </a:r>
-          </a:p>
-        </p:txBody>
-      </p:sp>
     </p:spTree>
     <p:extLst>
       <p:ext uri="{BB962C8B-B14F-4D97-AF65-F5344CB8AC3E}">
@@ -10352,468 +10347,6 @@
 </file>
 
 <file path=ppt/slides/slide4.xml><?xml version="1.0" encoding="utf-8"?>
-<p:sld xmlns:a="http://schemas.openxmlformats.org/drawingml/2006/main" xmlns:r="http://schemas.openxmlformats.org/officeDocument/2006/relationships" xmlns:p="http://schemas.openxmlformats.org/presentationml/2006/main">
-  <p:cSld>
-    <p:spTree>
-      <p:nvGrpSpPr>
-        <p:cNvPr id="1" name=""/>
-        <p:cNvGrpSpPr/>
-        <p:nvPr/>
-      </p:nvGrpSpPr>
-      <p:grpSpPr>
-        <a:xfrm>
-          <a:off x="0" y="0"/>
-          <a:ext cx="0" cy="0"/>
-          <a:chOff x="0" y="0"/>
-          <a:chExt cx="0" cy="0"/>
-        </a:xfrm>
-      </p:grpSpPr>
-      <p:sp>
-        <p:nvSpPr>
-          <p:cNvPr id="4" name="TextBox 3">
-            <a:extLst>
-              <a:ext uri="{FF2B5EF4-FFF2-40B4-BE49-F238E27FC236}">
-                <a16:creationId xmlns:a16="http://schemas.microsoft.com/office/drawing/2014/main" id="{86B9CC51-2D06-7FAD-FB26-7FAE0C23C1F7}"/>
-              </a:ext>
-            </a:extLst>
-          </p:cNvPr>
-          <p:cNvSpPr txBox="1"/>
-          <p:nvPr/>
-        </p:nvSpPr>
-        <p:spPr>
-          <a:xfrm>
-            <a:off x="2231704" y="3121223"/>
-            <a:ext cx="2185745" cy="523220"/>
-          </a:xfrm>
-          <a:prstGeom prst="rect">
-            <a:avLst/>
-          </a:prstGeom>
-          <a:noFill/>
-          <a:ln>
-            <a:solidFill>
-              <a:schemeClr val="tx1"/>
-            </a:solidFill>
-          </a:ln>
-        </p:spPr>
-        <p:txBody>
-          <a:bodyPr wrap="square" rtlCol="0">
-            <a:spAutoFit/>
-          </a:bodyPr>
-          <a:lstStyle/>
-          <a:p>
-            <a:r>
-              <a:rPr lang="en-US" sz="1400" dirty="0"/>
-              <a:t>Finding suitable/matching hypotheses/explanations</a:t>
-            </a:r>
-          </a:p>
-        </p:txBody>
-      </p:sp>
-      <p:sp>
-        <p:nvSpPr>
-          <p:cNvPr id="5" name="TextBox 4">
-            <a:extLst>
-              <a:ext uri="{FF2B5EF4-FFF2-40B4-BE49-F238E27FC236}">
-                <a16:creationId xmlns:a16="http://schemas.microsoft.com/office/drawing/2014/main" id="{24D76748-9E92-9F12-296C-5DCAF6B54CC4}"/>
-              </a:ext>
-            </a:extLst>
-          </p:cNvPr>
-          <p:cNvSpPr txBox="1"/>
-          <p:nvPr/>
-        </p:nvSpPr>
-        <p:spPr>
-          <a:xfrm>
-            <a:off x="2231705" y="2190593"/>
-            <a:ext cx="2049357" cy="307777"/>
-          </a:xfrm>
-          <a:prstGeom prst="rect">
-            <a:avLst/>
-          </a:prstGeom>
-          <a:noFill/>
-          <a:ln>
-            <a:solidFill>
-              <a:schemeClr val="tx1"/>
-            </a:solidFill>
-          </a:ln>
-        </p:spPr>
-        <p:txBody>
-          <a:bodyPr wrap="square" rtlCol="0">
-            <a:spAutoFit/>
-          </a:bodyPr>
-          <a:lstStyle/>
-          <a:p>
-            <a:r>
-              <a:rPr lang="en-US" sz="1400" dirty="0"/>
-              <a:t>Exploring &amp; Analysis</a:t>
-            </a:r>
-          </a:p>
-        </p:txBody>
-      </p:sp>
-      <p:cxnSp>
-        <p:nvCxnSpPr>
-          <p:cNvPr id="6" name="Straight Arrow Connector 5">
-            <a:extLst>
-              <a:ext uri="{FF2B5EF4-FFF2-40B4-BE49-F238E27FC236}">
-                <a16:creationId xmlns:a16="http://schemas.microsoft.com/office/drawing/2014/main" id="{098DA4AF-1B10-B605-5ECF-D7099A9BC774}"/>
-              </a:ext>
-            </a:extLst>
-          </p:cNvPr>
-          <p:cNvCxnSpPr>
-            <a:cxnSpLocks/>
-          </p:cNvCxnSpPr>
-          <p:nvPr/>
-        </p:nvCxnSpPr>
-        <p:spPr>
-          <a:xfrm>
-            <a:off x="2809713" y="2598003"/>
-            <a:ext cx="0" cy="523220"/>
-          </a:xfrm>
-          <a:prstGeom prst="straightConnector1">
-            <a:avLst/>
-          </a:prstGeom>
-          <a:ln w="44450">
-            <a:tailEnd type="triangle"/>
-          </a:ln>
-        </p:spPr>
-        <p:style>
-          <a:lnRef idx="1">
-            <a:schemeClr val="accent1"/>
-          </a:lnRef>
-          <a:fillRef idx="0">
-            <a:schemeClr val="accent1"/>
-          </a:fillRef>
-          <a:effectRef idx="0">
-            <a:schemeClr val="accent1"/>
-          </a:effectRef>
-          <a:fontRef idx="minor">
-            <a:schemeClr val="tx1"/>
-          </a:fontRef>
-        </p:style>
-      </p:cxnSp>
-      <p:cxnSp>
-        <p:nvCxnSpPr>
-          <p:cNvPr id="7" name="Straight Arrow Connector 6">
-            <a:extLst>
-              <a:ext uri="{FF2B5EF4-FFF2-40B4-BE49-F238E27FC236}">
-                <a16:creationId xmlns:a16="http://schemas.microsoft.com/office/drawing/2014/main" id="{CB43CB15-F7C1-82B5-418A-02536D9C1DA6}"/>
-              </a:ext>
-            </a:extLst>
-          </p:cNvPr>
-          <p:cNvCxnSpPr>
-            <a:cxnSpLocks/>
-          </p:cNvCxnSpPr>
-          <p:nvPr/>
-        </p:nvCxnSpPr>
-        <p:spPr>
-          <a:xfrm>
-            <a:off x="2933359" y="1721508"/>
-            <a:ext cx="10241" cy="405605"/>
-          </a:xfrm>
-          <a:prstGeom prst="straightConnector1">
-            <a:avLst/>
-          </a:prstGeom>
-          <a:ln w="44450">
-            <a:tailEnd type="triangle"/>
-          </a:ln>
-        </p:spPr>
-        <p:style>
-          <a:lnRef idx="1">
-            <a:schemeClr val="accent1"/>
-          </a:lnRef>
-          <a:fillRef idx="0">
-            <a:schemeClr val="accent1"/>
-          </a:fillRef>
-          <a:effectRef idx="0">
-            <a:schemeClr val="accent1"/>
-          </a:effectRef>
-          <a:fontRef idx="minor">
-            <a:schemeClr val="tx1"/>
-          </a:fontRef>
-        </p:style>
-      </p:cxnSp>
-      <p:sp>
-        <p:nvSpPr>
-          <p:cNvPr id="8" name="TextBox 7">
-            <a:extLst>
-              <a:ext uri="{FF2B5EF4-FFF2-40B4-BE49-F238E27FC236}">
-                <a16:creationId xmlns:a16="http://schemas.microsoft.com/office/drawing/2014/main" id="{CE494E3F-A5A0-C009-E5E7-811FFCDDED0D}"/>
-              </a:ext>
-            </a:extLst>
-          </p:cNvPr>
-          <p:cNvSpPr txBox="1"/>
-          <p:nvPr/>
-        </p:nvSpPr>
-        <p:spPr>
-          <a:xfrm>
-            <a:off x="2231705" y="1390186"/>
-            <a:ext cx="1353005" cy="307777"/>
-          </a:xfrm>
-          <a:prstGeom prst="rect">
-            <a:avLst/>
-          </a:prstGeom>
-          <a:noFill/>
-          <a:ln>
-            <a:solidFill>
-              <a:schemeClr val="tx1"/>
-            </a:solidFill>
-          </a:ln>
-        </p:spPr>
-        <p:txBody>
-          <a:bodyPr wrap="square" rtlCol="0">
-            <a:spAutoFit/>
-          </a:bodyPr>
-          <a:lstStyle/>
-          <a:p>
-            <a:r>
-              <a:rPr lang="en-US" sz="1400" dirty="0"/>
-              <a:t>Dataset</a:t>
-            </a:r>
-          </a:p>
-        </p:txBody>
-      </p:sp>
-      <p:sp>
-        <p:nvSpPr>
-          <p:cNvPr id="9" name="TextBox 8">
-            <a:extLst>
-              <a:ext uri="{FF2B5EF4-FFF2-40B4-BE49-F238E27FC236}">
-                <a16:creationId xmlns:a16="http://schemas.microsoft.com/office/drawing/2014/main" id="{DF6254D0-3AC4-D1D5-7620-9BB773C0003C}"/>
-              </a:ext>
-            </a:extLst>
-          </p:cNvPr>
-          <p:cNvSpPr txBox="1"/>
-          <p:nvPr/>
-        </p:nvSpPr>
-        <p:spPr>
-          <a:xfrm>
-            <a:off x="2943600" y="2736502"/>
-            <a:ext cx="4564780" cy="246221"/>
-          </a:xfrm>
-          <a:prstGeom prst="rect">
-            <a:avLst/>
-          </a:prstGeom>
-          <a:noFill/>
-        </p:spPr>
-        <p:txBody>
-          <a:bodyPr wrap="square" rtlCol="0">
-            <a:spAutoFit/>
-          </a:bodyPr>
-          <a:lstStyle/>
-          <a:p>
-            <a:r>
-              <a:rPr lang="en-US" sz="1000" dirty="0">
-                <a:solidFill>
-                  <a:srgbClr val="FF0000"/>
-                </a:solidFill>
-              </a:rPr>
-              <a:t>Garden of the forking paths: Multiple tests and correlations until significant result</a:t>
-            </a:r>
-          </a:p>
-        </p:txBody>
-      </p:sp>
-      <p:cxnSp>
-        <p:nvCxnSpPr>
-          <p:cNvPr id="10" name="Straight Arrow Connector 9">
-            <a:extLst>
-              <a:ext uri="{FF2B5EF4-FFF2-40B4-BE49-F238E27FC236}">
-                <a16:creationId xmlns:a16="http://schemas.microsoft.com/office/drawing/2014/main" id="{46DEF9E1-B732-8C23-2764-6118D0A4BB11}"/>
-              </a:ext>
-            </a:extLst>
-          </p:cNvPr>
-          <p:cNvCxnSpPr>
-            <a:cxnSpLocks/>
-          </p:cNvCxnSpPr>
-          <p:nvPr/>
-        </p:nvCxnSpPr>
-        <p:spPr>
-          <a:xfrm>
-            <a:off x="2809713" y="3742076"/>
-            <a:ext cx="0" cy="523220"/>
-          </a:xfrm>
-          <a:prstGeom prst="straightConnector1">
-            <a:avLst/>
-          </a:prstGeom>
-          <a:ln w="44450">
-            <a:tailEnd type="triangle"/>
-          </a:ln>
-        </p:spPr>
-        <p:style>
-          <a:lnRef idx="1">
-            <a:schemeClr val="accent1"/>
-          </a:lnRef>
-          <a:fillRef idx="0">
-            <a:schemeClr val="accent1"/>
-          </a:fillRef>
-          <a:effectRef idx="0">
-            <a:schemeClr val="accent1"/>
-          </a:effectRef>
-          <a:fontRef idx="minor">
-            <a:schemeClr val="tx1"/>
-          </a:fontRef>
-        </p:style>
-      </p:cxnSp>
-      <p:sp>
-        <p:nvSpPr>
-          <p:cNvPr id="11" name="TextBox 10">
-            <a:extLst>
-              <a:ext uri="{FF2B5EF4-FFF2-40B4-BE49-F238E27FC236}">
-                <a16:creationId xmlns:a16="http://schemas.microsoft.com/office/drawing/2014/main" id="{08ECEA6E-9704-F290-55F3-1DB7CD168355}"/>
-              </a:ext>
-            </a:extLst>
-          </p:cNvPr>
-          <p:cNvSpPr txBox="1"/>
-          <p:nvPr/>
-        </p:nvSpPr>
-        <p:spPr>
-          <a:xfrm>
-            <a:off x="2095317" y="4362929"/>
-            <a:ext cx="2185745" cy="307777"/>
-          </a:xfrm>
-          <a:prstGeom prst="rect">
-            <a:avLst/>
-          </a:prstGeom>
-          <a:noFill/>
-          <a:ln>
-            <a:solidFill>
-              <a:schemeClr val="tx1"/>
-            </a:solidFill>
-          </a:ln>
-        </p:spPr>
-        <p:txBody>
-          <a:bodyPr wrap="square" rtlCol="0">
-            <a:spAutoFit/>
-          </a:bodyPr>
-          <a:lstStyle/>
-          <a:p>
-            <a:r>
-              <a:rPr lang="en-US" sz="1400" dirty="0"/>
-              <a:t>Conclusion</a:t>
-            </a:r>
-          </a:p>
-        </p:txBody>
-      </p:sp>
-      <p:sp>
-        <p:nvSpPr>
-          <p:cNvPr id="12" name="TextBox 11">
-            <a:extLst>
-              <a:ext uri="{FF2B5EF4-FFF2-40B4-BE49-F238E27FC236}">
-                <a16:creationId xmlns:a16="http://schemas.microsoft.com/office/drawing/2014/main" id="{8E2679BF-9930-120F-F391-C818FC942F2F}"/>
-              </a:ext>
-            </a:extLst>
-          </p:cNvPr>
-          <p:cNvSpPr txBox="1"/>
-          <p:nvPr/>
-        </p:nvSpPr>
-        <p:spPr>
-          <a:xfrm>
-            <a:off x="4281062" y="2243575"/>
-            <a:ext cx="4564780" cy="246221"/>
-          </a:xfrm>
-          <a:prstGeom prst="rect">
-            <a:avLst/>
-          </a:prstGeom>
-          <a:noFill/>
-        </p:spPr>
-        <p:txBody>
-          <a:bodyPr wrap="square" rtlCol="0">
-            <a:spAutoFit/>
-          </a:bodyPr>
-          <a:lstStyle/>
-          <a:p>
-            <a:r>
-              <a:rPr lang="en-US" sz="1000" dirty="0">
-                <a:solidFill>
-                  <a:srgbClr val="FF0000"/>
-                </a:solidFill>
-              </a:rPr>
-              <a:t>High replication: </a:t>
-            </a:r>
-            <a:r>
-              <a:rPr lang="en-US" sz="1000" dirty="0" err="1">
-                <a:solidFill>
-                  <a:srgbClr val="FF0000"/>
-                </a:solidFill>
-              </a:rPr>
-              <a:t>p.value</a:t>
-            </a:r>
-            <a:r>
-              <a:rPr lang="en-US" sz="1000" dirty="0">
-                <a:solidFill>
-                  <a:srgbClr val="FF0000"/>
-                </a:solidFill>
-              </a:rPr>
-              <a:t> &lt; 0.05 with very small effect size</a:t>
-            </a:r>
-          </a:p>
-        </p:txBody>
-      </p:sp>
-      <p:sp>
-        <p:nvSpPr>
-          <p:cNvPr id="13" name="TextBox 12">
-            <a:extLst>
-              <a:ext uri="{FF2B5EF4-FFF2-40B4-BE49-F238E27FC236}">
-                <a16:creationId xmlns:a16="http://schemas.microsoft.com/office/drawing/2014/main" id="{3544E416-737A-1CE7-E0B2-0A5819AA9433}"/>
-              </a:ext>
-            </a:extLst>
-          </p:cNvPr>
-          <p:cNvSpPr txBox="1"/>
-          <p:nvPr/>
-        </p:nvSpPr>
-        <p:spPr>
-          <a:xfrm>
-            <a:off x="4281062" y="2444510"/>
-            <a:ext cx="4564780" cy="246221"/>
-          </a:xfrm>
-          <a:prstGeom prst="rect">
-            <a:avLst/>
-          </a:prstGeom>
-          <a:noFill/>
-        </p:spPr>
-        <p:txBody>
-          <a:bodyPr wrap="square" rtlCol="0">
-            <a:spAutoFit/>
-          </a:bodyPr>
-          <a:lstStyle/>
-          <a:p>
-            <a:r>
-              <a:rPr lang="en-US" sz="1000" dirty="0">
-                <a:solidFill>
-                  <a:srgbClr val="FF0000"/>
-                </a:solidFill>
-              </a:rPr>
-              <a:t>Low replication: </a:t>
-            </a:r>
-            <a:r>
-              <a:rPr lang="en-US" sz="1000" dirty="0" err="1">
-                <a:solidFill>
-                  <a:srgbClr val="FF0000"/>
-                </a:solidFill>
-              </a:rPr>
-              <a:t>p.value</a:t>
-            </a:r>
-            <a:r>
-              <a:rPr lang="en-US" sz="1000" dirty="0">
-                <a:solidFill>
-                  <a:srgbClr val="FF0000"/>
-                </a:solidFill>
-              </a:rPr>
-              <a:t> &lt; 0.05 with potentially big effect size</a:t>
-            </a:r>
-          </a:p>
-        </p:txBody>
-      </p:sp>
-    </p:spTree>
-    <p:extLst>
-      <p:ext uri="{BB962C8B-B14F-4D97-AF65-F5344CB8AC3E}">
-        <p14:creationId xmlns:p14="http://schemas.microsoft.com/office/powerpoint/2010/main" val="2645039094"/>
-      </p:ext>
-    </p:extLst>
-  </p:cSld>
-  <p:clrMapOvr>
-    <a:masterClrMapping/>
-  </p:clrMapOvr>
-</p:sld>
-</file>
-
-<file path=ppt/slides/slide5.xml><?xml version="1.0" encoding="utf-8"?>
 <p:sld xmlns:a="http://schemas.openxmlformats.org/drawingml/2006/main" xmlns:r="http://schemas.openxmlformats.org/officeDocument/2006/relationships" xmlns:p="http://schemas.openxmlformats.org/presentationml/2006/main">
   <p:cSld>
     <p:spTree>

</xml_diff>